<commit_message>
Update presentation with summary on first experiments with U-Net on slp real world data
</commit_message>
<xml_diff>
--- a/presentations/unet_4conv_slp_realworld.pptx
+++ b/presentations/unet_4conv_slp_realworld.pptx
@@ -5,15 +5,19 @@
     <p:sldMasterId id="2147483648" r:id="rId1"/>
   </p:sldMasterIdLst>
   <p:notesMasterIdLst>
-    <p:notesMasterId r:id="rId8"/>
+    <p:notesMasterId r:id="rId12"/>
   </p:notesMasterIdLst>
   <p:sldIdLst>
     <p:sldId id="256" r:id="rId2"/>
     <p:sldId id="257" r:id="rId3"/>
-    <p:sldId id="258" r:id="rId4"/>
-    <p:sldId id="259" r:id="rId5"/>
-    <p:sldId id="260" r:id="rId6"/>
-    <p:sldId id="261" r:id="rId7"/>
+    <p:sldId id="262" r:id="rId4"/>
+    <p:sldId id="264" r:id="rId5"/>
+    <p:sldId id="258" r:id="rId6"/>
+    <p:sldId id="259" r:id="rId7"/>
+    <p:sldId id="260" r:id="rId8"/>
+    <p:sldId id="261" r:id="rId9"/>
+    <p:sldId id="265" r:id="rId10"/>
+    <p:sldId id="266" r:id="rId11"/>
   </p:sldIdLst>
   <p:sldSz cx="12192000" cy="6858000"/>
   <p:notesSz cx="6858000" cy="9144000"/>
@@ -112,6 +116,11 @@
       </a:defRPr>
     </a:lvl9pPr>
   </p:defaultTextStyle>
+  <p:extLst>
+    <p:ext uri="{EFAFB233-063F-42B5-8137-9DF3F51BA10A}">
+      <p15:sldGuideLst xmlns:p15="http://schemas.microsoft.com/office/powerpoint/2012/main"/>
+    </p:ext>
+  </p:extLst>
 </p:presentation>
 </file>
 
@@ -196,7 +205,7 @@
           </a:lstStyle>
           <a:p>
             <a:fld id="{B35BE548-DE05-8149-9395-93E03CC73C13}" type="datetimeFigureOut">
-              <a:t>13.01.23</a:t>
+              <a:t>17.01.23</a:t>
             </a:fld>
             <a:endParaRPr lang="de-DE"/>
           </a:p>
@@ -526,7 +535,7 @@
           <a:lstStyle/>
           <a:p>
             <a:fld id="{8676B46A-5025-BA4D-A49D-5D1F5DB78F39}" type="slidenum">
-              <a:t>3</a:t>
+              <a:t>5</a:t>
             </a:fld>
             <a:endParaRPr lang="de-DE"/>
           </a:p>
@@ -691,7 +700,7 @@
           <a:lstStyle/>
           <a:p>
             <a:fld id="{F7A3446A-3617-0E4A-A439-6DD0C73FFDE1}" type="datetimeFigureOut">
-              <a:t>13.01.23</a:t>
+              <a:t>17.01.23</a:t>
             </a:fld>
             <a:endParaRPr lang="de-DE"/>
           </a:p>
@@ -887,7 +896,7 @@
           <a:lstStyle/>
           <a:p>
             <a:fld id="{F7A3446A-3617-0E4A-A439-6DD0C73FFDE1}" type="datetimeFigureOut">
-              <a:t>13.01.23</a:t>
+              <a:t>17.01.23</a:t>
             </a:fld>
             <a:endParaRPr lang="de-DE"/>
           </a:p>
@@ -1093,7 +1102,7 @@
           <a:lstStyle/>
           <a:p>
             <a:fld id="{F7A3446A-3617-0E4A-A439-6DD0C73FFDE1}" type="datetimeFigureOut">
-              <a:t>13.01.23</a:t>
+              <a:t>17.01.23</a:t>
             </a:fld>
             <a:endParaRPr lang="de-DE"/>
           </a:p>
@@ -1289,7 +1298,7 @@
           <a:lstStyle/>
           <a:p>
             <a:fld id="{F7A3446A-3617-0E4A-A439-6DD0C73FFDE1}" type="datetimeFigureOut">
-              <a:t>13.01.23</a:t>
+              <a:t>17.01.23</a:t>
             </a:fld>
             <a:endParaRPr lang="de-DE"/>
           </a:p>
@@ -1562,7 +1571,7 @@
           <a:lstStyle/>
           <a:p>
             <a:fld id="{F7A3446A-3617-0E4A-A439-6DD0C73FFDE1}" type="datetimeFigureOut">
-              <a:t>13.01.23</a:t>
+              <a:t>17.01.23</a:t>
             </a:fld>
             <a:endParaRPr lang="de-DE"/>
           </a:p>
@@ -1825,7 +1834,7 @@
           <a:lstStyle/>
           <a:p>
             <a:fld id="{F7A3446A-3617-0E4A-A439-6DD0C73FFDE1}" type="datetimeFigureOut">
-              <a:t>13.01.23</a:t>
+              <a:t>17.01.23</a:t>
             </a:fld>
             <a:endParaRPr lang="de-DE"/>
           </a:p>
@@ -2235,7 +2244,7 @@
           <a:lstStyle/>
           <a:p>
             <a:fld id="{F7A3446A-3617-0E4A-A439-6DD0C73FFDE1}" type="datetimeFigureOut">
-              <a:t>13.01.23</a:t>
+              <a:t>17.01.23</a:t>
             </a:fld>
             <a:endParaRPr lang="de-DE"/>
           </a:p>
@@ -2374,7 +2383,7 @@
           <a:lstStyle/>
           <a:p>
             <a:fld id="{F7A3446A-3617-0E4A-A439-6DD0C73FFDE1}" type="datetimeFigureOut">
-              <a:t>13.01.23</a:t>
+              <a:t>17.01.23</a:t>
             </a:fld>
             <a:endParaRPr lang="de-DE"/>
           </a:p>
@@ -2485,7 +2494,7 @@
           <a:lstStyle/>
           <a:p>
             <a:fld id="{F7A3446A-3617-0E4A-A439-6DD0C73FFDE1}" type="datetimeFigureOut">
-              <a:t>13.01.23</a:t>
+              <a:t>17.01.23</a:t>
             </a:fld>
             <a:endParaRPr lang="de-DE"/>
           </a:p>
@@ -2794,7 +2803,7 @@
           <a:lstStyle/>
           <a:p>
             <a:fld id="{F7A3446A-3617-0E4A-A439-6DD0C73FFDE1}" type="datetimeFigureOut">
-              <a:t>13.01.23</a:t>
+              <a:t>17.01.23</a:t>
             </a:fld>
             <a:endParaRPr lang="de-DE"/>
           </a:p>
@@ -3080,7 +3089,7 @@
           <a:lstStyle/>
           <a:p>
             <a:fld id="{F7A3446A-3617-0E4A-A439-6DD0C73FFDE1}" type="datetimeFigureOut">
-              <a:t>13.01.23</a:t>
+              <a:t>17.01.23</a:t>
             </a:fld>
             <a:endParaRPr lang="de-DE"/>
           </a:p>
@@ -3319,7 +3328,7 @@
           </a:lstStyle>
           <a:p>
             <a:fld id="{F7A3446A-3617-0E4A-A439-6DD0C73FFDE1}" type="datetimeFigureOut">
-              <a:t>13.01.23</a:t>
+              <a:t>17.01.23</a:t>
             </a:fld>
             <a:endParaRPr lang="de-DE"/>
           </a:p>
@@ -3786,14 +3795,30 @@
             <p:ph type="subTitle" idx="1"/>
           </p:nvPr>
         </p:nvSpPr>
-        <p:spPr/>
-        <p:txBody>
-          <a:bodyPr/>
-          <a:lstStyle/>
-          <a:p>
-            <a:r>
-              <a:rPr lang="de-DE"/>
-              <a:t>Results with variable random sparsity mask</a:t>
+        <p:spPr>
+          <a:xfrm>
+            <a:off x="2253049" y="3602038"/>
+            <a:ext cx="7471719" cy="1655762"/>
+          </a:xfrm>
+        </p:spPr>
+        <p:txBody>
+          <a:bodyPr>
+            <a:normAutofit lnSpcReduction="10000"/>
+          </a:bodyPr>
+          <a:lstStyle/>
+          <a:p>
+            <a:r>
+              <a:rPr lang="de-DE"/>
+              <a:t>Compare results with ‚fixed‘ and ‚variable‘ sparsity masks and data augmentation.</a:t>
+            </a:r>
+          </a:p>
+          <a:p>
+            <a:endParaRPr lang="de-DE"/>
+          </a:p>
+          <a:p>
+            <a:r>
+              <a:rPr lang="de-DE"/>
+              <a:t>Jan, 17th 2023</a:t>
             </a:r>
           </a:p>
         </p:txBody>
@@ -3802,6 +3827,167 @@
     <p:extLst>
       <p:ext uri="{BB962C8B-B14F-4D97-AF65-F5344CB8AC3E}">
         <p14:creationId xmlns:p14="http://schemas.microsoft.com/office/powerpoint/2010/main" val="1627649820"/>
+      </p:ext>
+    </p:extLst>
+  </p:cSld>
+  <p:clrMapOvr>
+    <a:masterClrMapping/>
+  </p:clrMapOvr>
+</p:sld>
+</file>
+
+<file path=ppt/slides/slide10.xml><?xml version="1.0" encoding="utf-8"?>
+<p:sld xmlns:a="http://schemas.openxmlformats.org/drawingml/2006/main" xmlns:r="http://schemas.openxmlformats.org/officeDocument/2006/relationships" xmlns:p="http://schemas.openxmlformats.org/presentationml/2006/main">
+  <p:cSld>
+    <p:spTree>
+      <p:nvGrpSpPr>
+        <p:cNvPr id="1" name=""/>
+        <p:cNvGrpSpPr/>
+        <p:nvPr/>
+      </p:nvGrpSpPr>
+      <p:grpSpPr>
+        <a:xfrm>
+          <a:off x="0" y="0"/>
+          <a:ext cx="0" cy="0"/>
+          <a:chOff x="0" y="0"/>
+          <a:chExt cx="0" cy="0"/>
+        </a:xfrm>
+      </p:grpSpPr>
+      <p:sp>
+        <p:nvSpPr>
+          <p:cNvPr id="5" name="Textfeld 4">
+            <a:extLst>
+              <a:ext uri="{FF2B5EF4-FFF2-40B4-BE49-F238E27FC236}">
+                <a16:creationId xmlns:a16="http://schemas.microsoft.com/office/drawing/2014/main" id="{CF75F770-AFBA-8297-A32D-C666E405A1E6}"/>
+              </a:ext>
+            </a:extLst>
+          </p:cNvPr>
+          <p:cNvSpPr txBox="1"/>
+          <p:nvPr/>
+        </p:nvSpPr>
+        <p:spPr>
+          <a:xfrm>
+            <a:off x="395416" y="172995"/>
+            <a:ext cx="11442357" cy="707886"/>
+          </a:xfrm>
+          <a:prstGeom prst="rect">
+            <a:avLst/>
+          </a:prstGeom>
+          <a:noFill/>
+        </p:spPr>
+        <p:txBody>
+          <a:bodyPr wrap="square" rtlCol="0">
+            <a:spAutoFit/>
+          </a:bodyPr>
+          <a:lstStyle/>
+          <a:p>
+            <a:r>
+              <a:rPr lang="de-DE" sz="2000" b="1"/>
+              <a:t>Sensitivity experiment</a:t>
+            </a:r>
+          </a:p>
+          <a:p>
+            <a:r>
+              <a:rPr lang="de-DE" sz="2000"/>
+              <a:t>Use pre-trained model on sparsity=0.9</a:t>
+            </a:r>
+          </a:p>
+        </p:txBody>
+      </p:sp>
+      <p:pic>
+        <p:nvPicPr>
+          <p:cNvPr id="2" name="Grafik 1">
+            <a:extLst>
+              <a:ext uri="{FF2B5EF4-FFF2-40B4-BE49-F238E27FC236}">
+                <a16:creationId xmlns:a16="http://schemas.microsoft.com/office/drawing/2014/main" id="{837EB077-ACE5-DC9B-A8E9-549BD038CAA6}"/>
+              </a:ext>
+            </a:extLst>
+          </p:cNvPr>
+          <p:cNvPicPr>
+            <a:picLocks noChangeAspect="1"/>
+          </p:cNvPicPr>
+          <p:nvPr/>
+        </p:nvPicPr>
+        <p:blipFill>
+          <a:blip r:embed="rId2"/>
+          <a:stretch>
+            <a:fillRect/>
+          </a:stretch>
+        </p:blipFill>
+        <p:spPr>
+          <a:xfrm>
+            <a:off x="7787142" y="172995"/>
+            <a:ext cx="3912022" cy="1853513"/>
+          </a:xfrm>
+          <a:prstGeom prst="rect">
+            <a:avLst/>
+          </a:prstGeom>
+        </p:spPr>
+      </p:pic>
+      <p:pic>
+        <p:nvPicPr>
+          <p:cNvPr id="4" name="Grafik 3">
+            <a:extLst>
+              <a:ext uri="{FF2B5EF4-FFF2-40B4-BE49-F238E27FC236}">
+                <a16:creationId xmlns:a16="http://schemas.microsoft.com/office/drawing/2014/main" id="{D00268E1-BADA-7F34-341E-DDD08FDFC786}"/>
+              </a:ext>
+            </a:extLst>
+          </p:cNvPr>
+          <p:cNvPicPr>
+            <a:picLocks noChangeAspect="1"/>
+          </p:cNvPicPr>
+          <p:nvPr/>
+        </p:nvPicPr>
+        <p:blipFill>
+          <a:blip r:embed="rId3"/>
+          <a:stretch>
+            <a:fillRect/>
+          </a:stretch>
+        </p:blipFill>
+        <p:spPr>
+          <a:xfrm>
+            <a:off x="395416" y="1238536"/>
+            <a:ext cx="3700526" cy="5239265"/>
+          </a:xfrm>
+          <a:prstGeom prst="rect">
+            <a:avLst/>
+          </a:prstGeom>
+        </p:spPr>
+      </p:pic>
+      <p:pic>
+        <p:nvPicPr>
+          <p:cNvPr id="6" name="Grafik 5">
+            <a:extLst>
+              <a:ext uri="{FF2B5EF4-FFF2-40B4-BE49-F238E27FC236}">
+                <a16:creationId xmlns:a16="http://schemas.microsoft.com/office/drawing/2014/main" id="{339B4AB7-3F5B-8A74-5141-6160325CC5CA}"/>
+              </a:ext>
+            </a:extLst>
+          </p:cNvPr>
+          <p:cNvPicPr>
+            <a:picLocks noChangeAspect="1"/>
+          </p:cNvPicPr>
+          <p:nvPr/>
+        </p:nvPicPr>
+        <p:blipFill>
+          <a:blip r:embed="rId4"/>
+          <a:stretch>
+            <a:fillRect/>
+          </a:stretch>
+        </p:blipFill>
+        <p:spPr>
+          <a:xfrm>
+            <a:off x="4226011" y="2648562"/>
+            <a:ext cx="4090086" cy="3829239"/>
+          </a:xfrm>
+          <a:prstGeom prst="rect">
+            <a:avLst/>
+          </a:prstGeom>
+        </p:spPr>
+      </p:pic>
+    </p:spTree>
+    <p:extLst>
+      <p:ext uri="{BB962C8B-B14F-4D97-AF65-F5344CB8AC3E}">
+        <p14:creationId xmlns:p14="http://schemas.microsoft.com/office/powerpoint/2010/main" val="1591056582"/>
       </p:ext>
     </p:extLst>
   </p:cSld>
@@ -3830,10 +4016,10 @@
       </p:grpSpPr>
       <p:pic>
         <p:nvPicPr>
-          <p:cNvPr id="4" name="Grafik 3">
-            <a:extLst>
-              <a:ext uri="{FF2B5EF4-FFF2-40B4-BE49-F238E27FC236}">
-                <a16:creationId xmlns:a16="http://schemas.microsoft.com/office/drawing/2014/main" id="{395270AB-BC64-789D-8B58-B33376E0BEDF}"/>
+          <p:cNvPr id="2" name="Grafik 1">
+            <a:extLst>
+              <a:ext uri="{FF2B5EF4-FFF2-40B4-BE49-F238E27FC236}">
+                <a16:creationId xmlns:a16="http://schemas.microsoft.com/office/drawing/2014/main" id="{97448886-51E4-0D87-41BB-A3C1708E4E5B}"/>
               </a:ext>
             </a:extLst>
           </p:cNvPr>
@@ -3850,8 +4036,8 @@
         </p:blipFill>
         <p:spPr>
           <a:xfrm>
-            <a:off x="582468" y="843396"/>
-            <a:ext cx="4696114" cy="3230010"/>
+            <a:off x="152400" y="993346"/>
+            <a:ext cx="5943600" cy="5588000"/>
           </a:xfrm>
           <a:prstGeom prst="rect">
             <a:avLst/>
@@ -3860,10 +4046,10 @@
       </p:pic>
       <p:sp>
         <p:nvSpPr>
-          <p:cNvPr id="6" name="Textfeld 5">
-            <a:extLst>
-              <a:ext uri="{FF2B5EF4-FFF2-40B4-BE49-F238E27FC236}">
-                <a16:creationId xmlns:a16="http://schemas.microsoft.com/office/drawing/2014/main" id="{43BDBBCA-2D64-E13D-E511-E8953ECB5E22}"/>
+          <p:cNvPr id="3" name="Textfeld 2">
+            <a:extLst>
+              <a:ext uri="{FF2B5EF4-FFF2-40B4-BE49-F238E27FC236}">
+                <a16:creationId xmlns:a16="http://schemas.microsoft.com/office/drawing/2014/main" id="{20EDAFC6-2282-F2E0-9FB8-48EBE3E34541}"/>
               </a:ext>
             </a:extLst>
           </p:cNvPr>
@@ -3872,8 +4058,8 @@
         </p:nvSpPr>
         <p:spPr>
           <a:xfrm>
-            <a:off x="6096000" y="1274618"/>
-            <a:ext cx="4710545" cy="646331"/>
+            <a:off x="6285470" y="1447612"/>
+            <a:ext cx="5754130" cy="3416320"/>
           </a:xfrm>
           <a:prstGeom prst="rect">
             <a:avLst/>
@@ -3886,9 +4072,134 @@
           </a:bodyPr>
           <a:lstStyle/>
           <a:p>
-            <a:r>
-              <a:rPr lang="de-DE"/>
-              <a:t>Models train well, close to saturation after 3 epochs. Nevertheless, trained over 10 epochs.</a:t>
+            <a:pPr marL="285750" indent="-285750">
+              <a:buFont typeface="Arial" panose="020B0604020202020204" pitchFamily="34" charset="0"/>
+              <a:buChar char="•"/>
+            </a:pPr>
+            <a:r>
+              <a:rPr lang="de-DE"/>
+              <a:t>Work with monthly 2D real world </a:t>
+            </a:r>
+            <a:r>
+              <a:rPr lang="de-DE" b="1"/>
+              <a:t>sea level pressure </a:t>
+            </a:r>
+            <a:r>
+              <a:rPr lang="de-DE"/>
+              <a:t>(slp) anomaly fields, as targets.</a:t>
+            </a:r>
+          </a:p>
+          <a:p>
+            <a:pPr marL="285750" indent="-285750">
+              <a:buFont typeface="Arial" panose="020B0604020202020204" pitchFamily="34" charset="0"/>
+              <a:buChar char="•"/>
+            </a:pPr>
+            <a:r>
+              <a:rPr lang="de-DE"/>
+              <a:t>Train </a:t>
+            </a:r>
+            <a:r>
+              <a:rPr lang="de-DE" b="1"/>
+              <a:t>U-Net </a:t>
+            </a:r>
+            <a:r>
+              <a:rPr lang="de-DE"/>
+              <a:t>models with 4 convolutions on sparse inputs with specified </a:t>
+            </a:r>
+            <a:r>
+              <a:rPr lang="de-DE" b="1"/>
+              <a:t>sparsity</a:t>
+            </a:r>
+            <a:r>
+              <a:rPr lang="de-DE"/>
+              <a:t> from [0.99, 0.9, 0.95, 0.75, 0.5], over 10 epochs.</a:t>
+            </a:r>
+          </a:p>
+          <a:p>
+            <a:pPr marL="285750" indent="-285750">
+              <a:buFont typeface="Arial" panose="020B0604020202020204" pitchFamily="34" charset="0"/>
+              <a:buChar char="•"/>
+            </a:pPr>
+            <a:r>
+              <a:rPr lang="de-DE"/>
+              <a:t>Sparsity masks can be identical for ALL samples (‚fixed‘), or randomly and individually for each sample (‚variable‘).</a:t>
+            </a:r>
+          </a:p>
+          <a:p>
+            <a:pPr marL="285750" indent="-285750">
+              <a:buFont typeface="Arial" panose="020B0604020202020204" pitchFamily="34" charset="0"/>
+              <a:buChar char="•"/>
+            </a:pPr>
+            <a:r>
+              <a:rPr lang="de-DE"/>
+              <a:t>For ‚variable‘ masks, allow to use each sample multiple times (</a:t>
+            </a:r>
+            <a:r>
+              <a:rPr lang="de-DE" b="1"/>
+              <a:t>data autmentation</a:t>
+            </a:r>
+            <a:r>
+              <a:rPr lang="de-DE"/>
+              <a:t>) according to some factor.</a:t>
+            </a:r>
+          </a:p>
+          <a:p>
+            <a:pPr marL="285750" indent="-285750">
+              <a:buFont typeface="Arial" panose="020B0604020202020204" pitchFamily="34" charset="0"/>
+              <a:buChar char="•"/>
+            </a:pPr>
+            <a:r>
+              <a:rPr lang="de-DE"/>
+              <a:t>Inputs and targets are scaled to [0,1], since we work with ReLU activations in our CNN model.</a:t>
+            </a:r>
+          </a:p>
+          <a:p>
+            <a:pPr marL="285750" indent="-285750">
+              <a:buFont typeface="Arial" panose="020B0604020202020204" pitchFamily="34" charset="0"/>
+              <a:buChar char="•"/>
+            </a:pPr>
+            <a:r>
+              <a:rPr lang="de-DE" b="1"/>
+              <a:t>Missing values </a:t>
+            </a:r>
+            <a:r>
+              <a:rPr lang="de-DE"/>
+              <a:t>are set to zero, AFTER scaling!</a:t>
+            </a:r>
+          </a:p>
+        </p:txBody>
+      </p:sp>
+      <p:sp>
+        <p:nvSpPr>
+          <p:cNvPr id="5" name="Textfeld 4">
+            <a:extLst>
+              <a:ext uri="{FF2B5EF4-FFF2-40B4-BE49-F238E27FC236}">
+                <a16:creationId xmlns:a16="http://schemas.microsoft.com/office/drawing/2014/main" id="{5BAA446D-3655-6CAE-A0CD-E1546661AAB3}"/>
+              </a:ext>
+            </a:extLst>
+          </p:cNvPr>
+          <p:cNvSpPr txBox="1"/>
+          <p:nvPr/>
+        </p:nvSpPr>
+        <p:spPr>
+          <a:xfrm>
+            <a:off x="395416" y="172995"/>
+            <a:ext cx="11442357" cy="400110"/>
+          </a:xfrm>
+          <a:prstGeom prst="rect">
+            <a:avLst/>
+          </a:prstGeom>
+          <a:noFill/>
+        </p:spPr>
+        <p:txBody>
+          <a:bodyPr wrap="square" rtlCol="0">
+            <a:spAutoFit/>
+          </a:bodyPr>
+          <a:lstStyle/>
+          <a:p>
+            <a:r>
+              <a:rPr lang="de-DE" sz="2000" b="1"/>
+              <a:t>Get an impression of inputs and targets: What do we deal with?</a:t>
             </a:r>
           </a:p>
         </p:txBody>
@@ -3923,132 +4234,12 @@
           <a:chExt cx="0" cy="0"/>
         </a:xfrm>
       </p:grpSpPr>
-      <p:pic>
-        <p:nvPicPr>
-          <p:cNvPr id="2" name="Grafik 1">
-            <a:extLst>
-              <a:ext uri="{FF2B5EF4-FFF2-40B4-BE49-F238E27FC236}">
-                <a16:creationId xmlns:a16="http://schemas.microsoft.com/office/drawing/2014/main" id="{EF1B9BFE-636F-EB2B-6C34-7A124A8D210C}"/>
-              </a:ext>
-            </a:extLst>
-          </p:cNvPr>
-          <p:cNvPicPr>
-            <a:picLocks noChangeAspect="1"/>
-          </p:cNvPicPr>
-          <p:nvPr/>
-        </p:nvPicPr>
-        <p:blipFill>
-          <a:blip r:embed="rId3"/>
-          <a:stretch>
-            <a:fillRect/>
-          </a:stretch>
-        </p:blipFill>
-        <p:spPr>
-          <a:xfrm>
-            <a:off x="1072573" y="573809"/>
-            <a:ext cx="2870200" cy="2717800"/>
-          </a:xfrm>
-          <a:prstGeom prst="rect">
-            <a:avLst/>
-          </a:prstGeom>
-        </p:spPr>
-      </p:pic>
-      <p:pic>
-        <p:nvPicPr>
-          <p:cNvPr id="3" name="Grafik 2">
-            <a:extLst>
-              <a:ext uri="{FF2B5EF4-FFF2-40B4-BE49-F238E27FC236}">
-                <a16:creationId xmlns:a16="http://schemas.microsoft.com/office/drawing/2014/main" id="{62F88E87-745E-4416-0BEC-80BC6D09EB8F}"/>
-              </a:ext>
-            </a:extLst>
-          </p:cNvPr>
-          <p:cNvPicPr>
-            <a:picLocks noChangeAspect="1"/>
-          </p:cNvPicPr>
-          <p:nvPr/>
-        </p:nvPicPr>
-        <p:blipFill>
-          <a:blip r:embed="rId4"/>
-          <a:stretch>
-            <a:fillRect/>
-          </a:stretch>
-        </p:blipFill>
-        <p:spPr>
-          <a:xfrm>
-            <a:off x="4496958" y="573809"/>
-            <a:ext cx="2946400" cy="2717800"/>
-          </a:xfrm>
-          <a:prstGeom prst="rect">
-            <a:avLst/>
-          </a:prstGeom>
-        </p:spPr>
-      </p:pic>
-      <p:pic>
-        <p:nvPicPr>
-          <p:cNvPr id="7" name="Grafik 6">
-            <a:extLst>
-              <a:ext uri="{FF2B5EF4-FFF2-40B4-BE49-F238E27FC236}">
-                <a16:creationId xmlns:a16="http://schemas.microsoft.com/office/drawing/2014/main" id="{B55DFE43-5A98-59A7-42FF-D56C30F4FE84}"/>
-              </a:ext>
-            </a:extLst>
-          </p:cNvPr>
-          <p:cNvPicPr>
-            <a:picLocks noChangeAspect="1"/>
-          </p:cNvPicPr>
-          <p:nvPr/>
-        </p:nvPicPr>
-        <p:blipFill>
-          <a:blip r:embed="rId5"/>
-          <a:stretch>
-            <a:fillRect/>
-          </a:stretch>
-        </p:blipFill>
-        <p:spPr>
-          <a:xfrm>
-            <a:off x="4496958" y="4950691"/>
-            <a:ext cx="2895600" cy="1511300"/>
-          </a:xfrm>
-          <a:prstGeom prst="rect">
-            <a:avLst/>
-          </a:prstGeom>
-        </p:spPr>
-      </p:pic>
-      <p:pic>
-        <p:nvPicPr>
-          <p:cNvPr id="8" name="Grafik 7">
-            <a:extLst>
-              <a:ext uri="{FF2B5EF4-FFF2-40B4-BE49-F238E27FC236}">
-                <a16:creationId xmlns:a16="http://schemas.microsoft.com/office/drawing/2014/main" id="{B626E868-BFBA-4FA1-F538-A997BED696C8}"/>
-              </a:ext>
-            </a:extLst>
-          </p:cNvPr>
-          <p:cNvPicPr>
-            <a:picLocks noChangeAspect="1"/>
-          </p:cNvPicPr>
-          <p:nvPr/>
-        </p:nvPicPr>
-        <p:blipFill>
-          <a:blip r:embed="rId6"/>
-          <a:stretch>
-            <a:fillRect/>
-          </a:stretch>
-        </p:blipFill>
-        <p:spPr>
-          <a:xfrm>
-            <a:off x="4496958" y="3429000"/>
-            <a:ext cx="2895600" cy="1384300"/>
-          </a:xfrm>
-          <a:prstGeom prst="rect">
-            <a:avLst/>
-          </a:prstGeom>
-        </p:spPr>
-      </p:pic>
-      <p:sp>
-        <p:nvSpPr>
-          <p:cNvPr id="9" name="Textfeld 8">
-            <a:extLst>
-              <a:ext uri="{FF2B5EF4-FFF2-40B4-BE49-F238E27FC236}">
-                <a16:creationId xmlns:a16="http://schemas.microsoft.com/office/drawing/2014/main" id="{2EC73A9B-4BE8-70BB-C45F-7E76896A219A}"/>
+      <p:sp>
+        <p:nvSpPr>
+          <p:cNvPr id="6" name="Textfeld 5">
+            <a:extLst>
+              <a:ext uri="{FF2B5EF4-FFF2-40B4-BE49-F238E27FC236}">
+                <a16:creationId xmlns:a16="http://schemas.microsoft.com/office/drawing/2014/main" id="{43BDBBCA-2D64-E13D-E511-E8953ECB5E22}"/>
               </a:ext>
             </a:extLst>
           </p:cNvPr>
@@ -4057,8 +4248,8 @@
         </p:nvSpPr>
         <p:spPr>
           <a:xfrm>
-            <a:off x="890161" y="3726873"/>
-            <a:ext cx="2809002" cy="1477328"/>
+            <a:off x="560174" y="1215387"/>
+            <a:ext cx="11191102" cy="3416320"/>
           </a:xfrm>
           <a:prstGeom prst="rect">
             <a:avLst/>
@@ -4071,19 +4262,129 @@
           </a:bodyPr>
           <a:lstStyle/>
           <a:p>
-            <a:r>
-              <a:rPr lang="de-DE"/>
-              <a:t>Show examplary TRAIN input sample (sparse and scaled data) and corresponding target (complete and scaled data).</a:t>
-            </a:r>
-          </a:p>
-        </p:txBody>
-      </p:sp>
-      <p:sp>
-        <p:nvSpPr>
-          <p:cNvPr id="10" name="Textfeld 9">
-            <a:extLst>
-              <a:ext uri="{FF2B5EF4-FFF2-40B4-BE49-F238E27FC236}">
-                <a16:creationId xmlns:a16="http://schemas.microsoft.com/office/drawing/2014/main" id="{1B0C69E0-AB46-4A9B-5CB5-7197A5D078F5}"/>
+            <a:pPr marL="342900" indent="-342900">
+              <a:buFont typeface="+mj-lt"/>
+              <a:buAutoNum type="arabicPeriod"/>
+            </a:pPr>
+            <a:r>
+              <a:rPr lang="de-DE"/>
+              <a:t>mask_type=</a:t>
+            </a:r>
+            <a:r>
+              <a:rPr lang="de-DE">
+                <a:solidFill>
+                  <a:srgbClr val="FF0000"/>
+                </a:solidFill>
+              </a:rPr>
+              <a:t>'fixed</a:t>
+            </a:r>
+            <a:r>
+              <a:rPr lang="de-DE"/>
+              <a:t>', augmentation_factor=1: </a:t>
+            </a:r>
+            <a:r>
+              <a:rPr lang="de-DE" b="1"/>
+              <a:t>Base experiment</a:t>
+            </a:r>
+            <a:r>
+              <a:rPr lang="de-DE"/>
+              <a:t>, according to szenario to have limitet number of measurements from stations, that are fixed in their location. Fast to train, low ressources required.</a:t>
+            </a:r>
+          </a:p>
+          <a:p>
+            <a:pPr marL="342900" indent="-342900">
+              <a:buFont typeface="+mj-lt"/>
+              <a:buAutoNum type="arabicPeriod"/>
+            </a:pPr>
+            <a:endParaRPr lang="de-DE"/>
+          </a:p>
+          <a:p>
+            <a:pPr marL="342900" indent="-342900">
+              <a:buFont typeface="+mj-lt"/>
+              <a:buAutoNum type="arabicPeriod"/>
+            </a:pPr>
+            <a:r>
+              <a:rPr lang="de-DE"/>
+              <a:t>mask_type=</a:t>
+            </a:r>
+            <a:r>
+              <a:rPr lang="de-DE">
+                <a:solidFill>
+                  <a:srgbClr val="FF0000"/>
+                </a:solidFill>
+              </a:rPr>
+              <a:t>'variable</a:t>
+            </a:r>
+            <a:r>
+              <a:rPr lang="de-DE"/>
+              <a:t>', augmentation_factor=1: </a:t>
+            </a:r>
+            <a:r>
+              <a:rPr lang="de-DE" b="1"/>
+              <a:t>Extends base experiment</a:t>
+            </a:r>
+            <a:r>
+              <a:rPr lang="de-DE"/>
+              <a:t>, </a:t>
+            </a:r>
+            <a:r>
+              <a:rPr lang="de-DE">
+                <a:solidFill>
+                  <a:srgbClr val="FF0000"/>
+                </a:solidFill>
+              </a:rPr>
+              <a:t>can handle variable inputs with fixed sparsity</a:t>
+            </a:r>
+            <a:r>
+              <a:rPr lang="de-DE"/>
+              <a:t> in single model. Fits to observations from e.g. argo floats on their trajectory or well suited for e.g. sea surface temperature measurements, where varying cloud coverage limits infrared observations. In its simplest form, use each sample only once. Expect worse performance, compared to base experiment, but increased flexibility.</a:t>
+            </a:r>
+          </a:p>
+          <a:p>
+            <a:pPr marL="342900" indent="-342900">
+              <a:buFont typeface="+mj-lt"/>
+              <a:buAutoNum type="arabicPeriod"/>
+            </a:pPr>
+            <a:endParaRPr lang="de-DE"/>
+          </a:p>
+          <a:p>
+            <a:pPr marL="342900" indent="-342900">
+              <a:buFont typeface="+mj-lt"/>
+              <a:buAutoNum type="arabicPeriod"/>
+            </a:pPr>
+            <a:r>
+              <a:rPr lang="de-DE"/>
+              <a:t>mask_type='variable', </a:t>
+            </a:r>
+            <a:r>
+              <a:rPr lang="de-DE">
+                <a:solidFill>
+                  <a:srgbClr val="FF0000"/>
+                </a:solidFill>
+              </a:rPr>
+              <a:t>augmentation_factor=2</a:t>
+            </a:r>
+            <a:r>
+              <a:rPr lang="de-DE"/>
+              <a:t>: </a:t>
+            </a:r>
+            <a:r>
+              <a:rPr lang="de-DE" b="1"/>
+              <a:t>Improve performance </a:t>
+            </a:r>
+            <a:r>
+              <a:rPr lang="de-DE"/>
+              <a:t>by using each input sample multiple times, due to random sparsity. Try to reduce overfitting and increase generalization on unseen data. Comes at the expense of increased training time.</a:t>
+            </a:r>
+          </a:p>
+        </p:txBody>
+      </p:sp>
+      <p:sp>
+        <p:nvSpPr>
+          <p:cNvPr id="3" name="Textfeld 2">
+            <a:extLst>
+              <a:ext uri="{FF2B5EF4-FFF2-40B4-BE49-F238E27FC236}">
+                <a16:creationId xmlns:a16="http://schemas.microsoft.com/office/drawing/2014/main" id="{C318182B-364D-C9F7-D1BC-5FD4D9781852}"/>
               </a:ext>
             </a:extLst>
           </p:cNvPr>
@@ -4092,8 +4393,8 @@
         </p:nvSpPr>
         <p:spPr>
           <a:xfrm>
-            <a:off x="8310425" y="1607127"/>
-            <a:ext cx="2809002" cy="1200329"/>
+            <a:off x="395416" y="172995"/>
+            <a:ext cx="11442357" cy="400110"/>
           </a:xfrm>
           <a:prstGeom prst="rect">
             <a:avLst/>
@@ -4107,8 +4408,8 @@
           <a:lstStyle/>
           <a:p>
             <a:r>
-              <a:rPr lang="de-DE"/>
-              <a:t>Clearly see training progress in predictions from untrained model and after 1, 5, 10 epochs.</a:t>
+              <a:rPr lang="de-DE" sz="2000" b="1"/>
+              <a:t>Define experiments</a:t>
             </a:r>
           </a:p>
         </p:txBody>
@@ -4116,7 +4417,7 @@
     </p:spTree>
     <p:extLst>
       <p:ext uri="{BB962C8B-B14F-4D97-AF65-F5344CB8AC3E}">
-        <p14:creationId xmlns:p14="http://schemas.microsoft.com/office/powerpoint/2010/main" val="3593153322"/>
+        <p14:creationId xmlns:p14="http://schemas.microsoft.com/office/powerpoint/2010/main" val="4110455848"/>
       </p:ext>
     </p:extLst>
   </p:cSld>
@@ -4143,12 +4444,69 @@
           <a:chExt cx="0" cy="0"/>
         </a:xfrm>
       </p:grpSpPr>
+      <p:sp>
+        <p:nvSpPr>
+          <p:cNvPr id="6" name="Textfeld 5">
+            <a:extLst>
+              <a:ext uri="{FF2B5EF4-FFF2-40B4-BE49-F238E27FC236}">
+                <a16:creationId xmlns:a16="http://schemas.microsoft.com/office/drawing/2014/main" id="{43BDBBCA-2D64-E13D-E511-E8953ECB5E22}"/>
+              </a:ext>
+            </a:extLst>
+          </p:cNvPr>
+          <p:cNvSpPr txBox="1"/>
+          <p:nvPr/>
+        </p:nvSpPr>
+        <p:spPr>
+          <a:xfrm>
+            <a:off x="745525" y="4798847"/>
+            <a:ext cx="8942172" cy="646331"/>
+          </a:xfrm>
+          <a:prstGeom prst="rect">
+            <a:avLst/>
+          </a:prstGeom>
+          <a:noFill/>
+        </p:spPr>
+        <p:txBody>
+          <a:bodyPr wrap="square" rtlCol="0">
+            <a:spAutoFit/>
+          </a:bodyPr>
+          <a:lstStyle/>
+          <a:p>
+            <a:r>
+              <a:rPr lang="de-DE">
+                <a:sym typeface="Wingdings" pitchFamily="2" charset="2"/>
+              </a:rPr>
+              <a:t> </a:t>
+            </a:r>
+            <a:r>
+              <a:rPr lang="de-DE"/>
+              <a:t>With </a:t>
+            </a:r>
+            <a:r>
+              <a:rPr lang="de-DE" b="1"/>
+              <a:t>data augmentation </a:t>
+            </a:r>
+            <a:r>
+              <a:rPr lang="de-DE"/>
+              <a:t>(factor=2), we already </a:t>
+            </a:r>
+            <a:r>
+              <a:rPr lang="de-DE" b="1"/>
+              <a:t>beat the baseline</a:t>
+            </a:r>
+            <a:r>
+              <a:rPr lang="de-DE"/>
+              <a:t>. And are free to choose, which inputs to use, at least if we respect the specified sparsity, used to train the model.</a:t>
+            </a:r>
+          </a:p>
+        </p:txBody>
+      </p:sp>
       <p:pic>
         <p:nvPicPr>
-          <p:cNvPr id="4" name="Grafik 3">
-            <a:extLst>
-              <a:ext uri="{FF2B5EF4-FFF2-40B4-BE49-F238E27FC236}">
-                <a16:creationId xmlns:a16="http://schemas.microsoft.com/office/drawing/2014/main" id="{1B902B96-D60E-C8E4-619F-459782A88BAA}"/>
+          <p:cNvPr id="2" name="Grafik 1">
+            <a:extLst>
+              <a:ext uri="{FF2B5EF4-FFF2-40B4-BE49-F238E27FC236}">
+                <a16:creationId xmlns:a16="http://schemas.microsoft.com/office/drawing/2014/main" id="{14CD924E-0995-4610-2BAE-F5FACD6C1E49}"/>
               </a:ext>
             </a:extLst>
           </p:cNvPr>
@@ -4165,110 +4523,20 @@
         </p:blipFill>
         <p:spPr>
           <a:xfrm>
-            <a:off x="1572491" y="523587"/>
-            <a:ext cx="2895600" cy="2679700"/>
+            <a:off x="504568" y="1133684"/>
+            <a:ext cx="10295238" cy="3427750"/>
           </a:xfrm>
           <a:prstGeom prst="rect">
             <a:avLst/>
           </a:prstGeom>
         </p:spPr>
       </p:pic>
-      <p:pic>
-        <p:nvPicPr>
-          <p:cNvPr id="6" name="Grafik 5">
-            <a:extLst>
-              <a:ext uri="{FF2B5EF4-FFF2-40B4-BE49-F238E27FC236}">
-                <a16:creationId xmlns:a16="http://schemas.microsoft.com/office/drawing/2014/main" id="{92B92DED-C8E8-0B10-818E-0BC559E3C716}"/>
-              </a:ext>
-            </a:extLst>
-          </p:cNvPr>
-          <p:cNvPicPr>
-            <a:picLocks noChangeAspect="1"/>
-          </p:cNvPicPr>
-          <p:nvPr/>
-        </p:nvPicPr>
-        <p:blipFill>
-          <a:blip r:embed="rId3"/>
-          <a:stretch>
-            <a:fillRect/>
-          </a:stretch>
-        </p:blipFill>
-        <p:spPr>
-          <a:xfrm>
-            <a:off x="5095009" y="523587"/>
-            <a:ext cx="2971800" cy="2717800"/>
-          </a:xfrm>
-          <a:prstGeom prst="rect">
-            <a:avLst/>
-          </a:prstGeom>
-        </p:spPr>
-      </p:pic>
-      <p:pic>
-        <p:nvPicPr>
-          <p:cNvPr id="9" name="Grafik 8">
-            <a:extLst>
-              <a:ext uri="{FF2B5EF4-FFF2-40B4-BE49-F238E27FC236}">
-                <a16:creationId xmlns:a16="http://schemas.microsoft.com/office/drawing/2014/main" id="{86823B62-1BE1-A8D7-AEDF-E2796AC09D2A}"/>
-              </a:ext>
-            </a:extLst>
-          </p:cNvPr>
-          <p:cNvPicPr>
-            <a:picLocks noChangeAspect="1"/>
-          </p:cNvPicPr>
-          <p:nvPr/>
-        </p:nvPicPr>
-        <p:blipFill>
-          <a:blip r:embed="rId4"/>
-          <a:stretch>
-            <a:fillRect/>
-          </a:stretch>
-        </p:blipFill>
-        <p:spPr>
-          <a:xfrm>
-            <a:off x="5095009" y="3271405"/>
-            <a:ext cx="2971800" cy="1308100"/>
-          </a:xfrm>
-          <a:prstGeom prst="rect">
-            <a:avLst/>
-          </a:prstGeom>
-        </p:spPr>
-      </p:pic>
-      <p:pic>
-        <p:nvPicPr>
-          <p:cNvPr id="10" name="Grafik 9">
-            <a:extLst>
-              <a:ext uri="{FF2B5EF4-FFF2-40B4-BE49-F238E27FC236}">
-                <a16:creationId xmlns:a16="http://schemas.microsoft.com/office/drawing/2014/main" id="{F42E7FC2-EE6B-9137-0E46-7517C4BB8BDF}"/>
-              </a:ext>
-            </a:extLst>
-          </p:cNvPr>
-          <p:cNvPicPr>
-            <a:picLocks noChangeAspect="1"/>
-          </p:cNvPicPr>
-          <p:nvPr/>
-        </p:nvPicPr>
-        <p:blipFill>
-          <a:blip r:embed="rId5"/>
-          <a:stretch>
-            <a:fillRect/>
-          </a:stretch>
-        </p:blipFill>
-        <p:spPr>
-          <a:xfrm>
-            <a:off x="5081154" y="4632124"/>
-            <a:ext cx="2971800" cy="1435100"/>
-          </a:xfrm>
-          <a:prstGeom prst="rect">
-            <a:avLst/>
-          </a:prstGeom>
-        </p:spPr>
-      </p:pic>
-      <p:sp>
-        <p:nvSpPr>
-          <p:cNvPr id="11" name="Textfeld 10">
-            <a:extLst>
-              <a:ext uri="{FF2B5EF4-FFF2-40B4-BE49-F238E27FC236}">
-                <a16:creationId xmlns:a16="http://schemas.microsoft.com/office/drawing/2014/main" id="{A6778348-60E8-4CEF-9755-B0F01E5C5297}"/>
+      <p:sp>
+        <p:nvSpPr>
+          <p:cNvPr id="3" name="Textfeld 2">
+            <a:extLst>
+              <a:ext uri="{FF2B5EF4-FFF2-40B4-BE49-F238E27FC236}">
+                <a16:creationId xmlns:a16="http://schemas.microsoft.com/office/drawing/2014/main" id="{C318182B-364D-C9F7-D1BC-5FD4D9781852}"/>
               </a:ext>
             </a:extLst>
           </p:cNvPr>
@@ -4277,8 +4545,8 @@
         </p:nvSpPr>
         <p:spPr>
           <a:xfrm>
-            <a:off x="890161" y="3726873"/>
-            <a:ext cx="2895600" cy="1477328"/>
+            <a:off x="395416" y="172995"/>
+            <a:ext cx="11442357" cy="400110"/>
           </a:xfrm>
           <a:prstGeom prst="rect">
             <a:avLst/>
@@ -4292,43 +4560,8 @@
           <a:lstStyle/>
           <a:p>
             <a:r>
-              <a:rPr lang="de-DE"/>
-              <a:t>Show examplary VALIDATION input sample (sparse and scaled data) and corresponding target (complete and scaled data).</a:t>
-            </a:r>
-          </a:p>
-        </p:txBody>
-      </p:sp>
-      <p:sp>
-        <p:nvSpPr>
-          <p:cNvPr id="12" name="Textfeld 11">
-            <a:extLst>
-              <a:ext uri="{FF2B5EF4-FFF2-40B4-BE49-F238E27FC236}">
-                <a16:creationId xmlns:a16="http://schemas.microsoft.com/office/drawing/2014/main" id="{93106DC1-71F1-34B2-36EE-942406B4C5E3}"/>
-              </a:ext>
-            </a:extLst>
-          </p:cNvPr>
-          <p:cNvSpPr txBox="1"/>
-          <p:nvPr/>
-        </p:nvSpPr>
-        <p:spPr>
-          <a:xfrm>
-            <a:off x="8310425" y="1607127"/>
-            <a:ext cx="2809002" cy="1200329"/>
-          </a:xfrm>
-          <a:prstGeom prst="rect">
-            <a:avLst/>
-          </a:prstGeom>
-          <a:noFill/>
-        </p:spPr>
-        <p:txBody>
-          <a:bodyPr wrap="square" rtlCol="0">
-            <a:spAutoFit/>
-          </a:bodyPr>
-          <a:lstStyle/>
-          <a:p>
-            <a:r>
-              <a:rPr lang="de-DE"/>
-              <a:t>Clearly see training progress in predictions from untrained model and after 1, 5, 10 epochs.</a:t>
+              <a:rPr lang="de-DE" sz="2000" b="1"/>
+              <a:t>Find the U-Net to act in a reasonable way during training process.</a:t>
             </a:r>
           </a:p>
         </p:txBody>
@@ -4336,7 +4569,7 @@
     </p:spTree>
     <p:extLst>
       <p:ext uri="{BB962C8B-B14F-4D97-AF65-F5344CB8AC3E}">
-        <p14:creationId xmlns:p14="http://schemas.microsoft.com/office/powerpoint/2010/main" val="1361541068"/>
+        <p14:creationId xmlns:p14="http://schemas.microsoft.com/office/powerpoint/2010/main" val="1636154665"/>
       </p:ext>
     </p:extLst>
   </p:cSld>
@@ -4368,37 +4601,7 @@
           <p:cNvPr id="2" name="Grafik 1">
             <a:extLst>
               <a:ext uri="{FF2B5EF4-FFF2-40B4-BE49-F238E27FC236}">
-                <a16:creationId xmlns:a16="http://schemas.microsoft.com/office/drawing/2014/main" id="{88C7AF3D-FDC6-0504-500E-4B94515858B0}"/>
-              </a:ext>
-            </a:extLst>
-          </p:cNvPr>
-          <p:cNvPicPr>
-            <a:picLocks noChangeAspect="1"/>
-          </p:cNvPicPr>
-          <p:nvPr/>
-        </p:nvPicPr>
-        <p:blipFill>
-          <a:blip r:embed="rId2"/>
-          <a:stretch>
-            <a:fillRect/>
-          </a:stretch>
-        </p:blipFill>
-        <p:spPr>
-          <a:xfrm>
-            <a:off x="4610100" y="7500"/>
-            <a:ext cx="2971800" cy="4127500"/>
-          </a:xfrm>
-          <a:prstGeom prst="rect">
-            <a:avLst/>
-          </a:prstGeom>
-        </p:spPr>
-      </p:pic>
-      <p:pic>
-        <p:nvPicPr>
-          <p:cNvPr id="3" name="Grafik 2">
-            <a:extLst>
-              <a:ext uri="{FF2B5EF4-FFF2-40B4-BE49-F238E27FC236}">
-                <a16:creationId xmlns:a16="http://schemas.microsoft.com/office/drawing/2014/main" id="{96E4B1C0-B20E-7D56-8774-5D1460FBDBE5}"/>
+                <a16:creationId xmlns:a16="http://schemas.microsoft.com/office/drawing/2014/main" id="{EF1B9BFE-636F-EB2B-6C34-7A124A8D210C}"/>
               </a:ext>
             </a:extLst>
           </p:cNvPr>
@@ -4415,8 +4618,8 @@
         </p:blipFill>
         <p:spPr>
           <a:xfrm>
-            <a:off x="4610100" y="4066310"/>
-            <a:ext cx="2971800" cy="2819400"/>
+            <a:off x="951946" y="729004"/>
+            <a:ext cx="2870200" cy="2717800"/>
           </a:xfrm>
           <a:prstGeom prst="rect">
             <a:avLst/>
@@ -4425,10 +4628,10 @@
       </p:pic>
       <p:pic>
         <p:nvPicPr>
-          <p:cNvPr id="5" name="Grafik 4">
-            <a:extLst>
-              <a:ext uri="{FF2B5EF4-FFF2-40B4-BE49-F238E27FC236}">
-                <a16:creationId xmlns:a16="http://schemas.microsoft.com/office/drawing/2014/main" id="{1C066422-39C0-5984-C02D-5BB705A637E6}"/>
+          <p:cNvPr id="3" name="Grafik 2">
+            <a:extLst>
+              <a:ext uri="{FF2B5EF4-FFF2-40B4-BE49-F238E27FC236}">
+                <a16:creationId xmlns:a16="http://schemas.microsoft.com/office/drawing/2014/main" id="{62F88E87-745E-4416-0BEC-80BC6D09EB8F}"/>
               </a:ext>
             </a:extLst>
           </p:cNvPr>
@@ -4445,20 +4648,80 @@
         </p:blipFill>
         <p:spPr>
           <a:xfrm>
-            <a:off x="1354282" y="7500"/>
-            <a:ext cx="2971800" cy="1320800"/>
+            <a:off x="4558743" y="729004"/>
+            <a:ext cx="2946400" cy="2717800"/>
           </a:xfrm>
           <a:prstGeom prst="rect">
             <a:avLst/>
           </a:prstGeom>
         </p:spPr>
       </p:pic>
-      <p:sp>
-        <p:nvSpPr>
-          <p:cNvPr id="7" name="Textfeld 6">
-            <a:extLst>
-              <a:ext uri="{FF2B5EF4-FFF2-40B4-BE49-F238E27FC236}">
-                <a16:creationId xmlns:a16="http://schemas.microsoft.com/office/drawing/2014/main" id="{A19631FC-6F47-9FCD-D26D-7A5D25D5CA95}"/>
+      <p:pic>
+        <p:nvPicPr>
+          <p:cNvPr id="7" name="Grafik 6">
+            <a:extLst>
+              <a:ext uri="{FF2B5EF4-FFF2-40B4-BE49-F238E27FC236}">
+                <a16:creationId xmlns:a16="http://schemas.microsoft.com/office/drawing/2014/main" id="{B55DFE43-5A98-59A7-42FF-D56C30F4FE84}"/>
+              </a:ext>
+            </a:extLst>
+          </p:cNvPr>
+          <p:cNvPicPr>
+            <a:picLocks noChangeAspect="1"/>
+          </p:cNvPicPr>
+          <p:nvPr/>
+        </p:nvPicPr>
+        <p:blipFill>
+          <a:blip r:embed="rId5"/>
+          <a:stretch>
+            <a:fillRect/>
+          </a:stretch>
+        </p:blipFill>
+        <p:spPr>
+          <a:xfrm>
+            <a:off x="4609543" y="4968494"/>
+            <a:ext cx="2895600" cy="1511300"/>
+          </a:xfrm>
+          <a:prstGeom prst="rect">
+            <a:avLst/>
+          </a:prstGeom>
+        </p:spPr>
+      </p:pic>
+      <p:pic>
+        <p:nvPicPr>
+          <p:cNvPr id="8" name="Grafik 7">
+            <a:extLst>
+              <a:ext uri="{FF2B5EF4-FFF2-40B4-BE49-F238E27FC236}">
+                <a16:creationId xmlns:a16="http://schemas.microsoft.com/office/drawing/2014/main" id="{B626E868-BFBA-4FA1-F538-A997BED696C8}"/>
+              </a:ext>
+            </a:extLst>
+          </p:cNvPr>
+          <p:cNvPicPr>
+            <a:picLocks noChangeAspect="1"/>
+          </p:cNvPicPr>
+          <p:nvPr/>
+        </p:nvPicPr>
+        <p:blipFill>
+          <a:blip r:embed="rId6"/>
+          <a:stretch>
+            <a:fillRect/>
+          </a:stretch>
+        </p:blipFill>
+        <p:spPr>
+          <a:xfrm>
+            <a:off x="4598344" y="3515499"/>
+            <a:ext cx="2895600" cy="1384300"/>
+          </a:xfrm>
+          <a:prstGeom prst="rect">
+            <a:avLst/>
+          </a:prstGeom>
+        </p:spPr>
+      </p:pic>
+      <p:sp>
+        <p:nvSpPr>
+          <p:cNvPr id="9" name="Textfeld 8">
+            <a:extLst>
+              <a:ext uri="{FF2B5EF4-FFF2-40B4-BE49-F238E27FC236}">
+                <a16:creationId xmlns:a16="http://schemas.microsoft.com/office/drawing/2014/main" id="{2EC73A9B-4BE8-70BB-C45F-7E76896A219A}"/>
               </a:ext>
             </a:extLst>
           </p:cNvPr>
@@ -4467,8 +4730,8 @@
         </p:nvSpPr>
         <p:spPr>
           <a:xfrm>
-            <a:off x="654633" y="2369128"/>
-            <a:ext cx="2971800" cy="2585323"/>
+            <a:off x="890161" y="3726873"/>
+            <a:ext cx="2809002" cy="1477328"/>
           </a:xfrm>
           <a:prstGeom prst="rect">
             <a:avLst/>
@@ -4483,16 +4746,89 @@
           <a:p>
             <a:r>
               <a:rPr lang="de-DE"/>
-              <a:t>Show examplary TRAIN target (complete and scaled data) and model prediction after 10 epochs for different sparsity settings.</a:t>
-            </a:r>
-          </a:p>
-          <a:p>
-            <a:endParaRPr lang="de-DE"/>
-          </a:p>
-          <a:p>
-            <a:r>
-              <a:rPr lang="de-DE"/>
-              <a:t>Main structure in slp anomalies is already captured for extreme sparsity (0.99).</a:t>
+              <a:t>Show examplary </a:t>
+            </a:r>
+            <a:r>
+              <a:rPr lang="de-DE">
+                <a:solidFill>
+                  <a:srgbClr val="FF0000"/>
+                </a:solidFill>
+              </a:rPr>
+              <a:t>TRAIN</a:t>
+            </a:r>
+            <a:r>
+              <a:rPr lang="de-DE"/>
+              <a:t> input sample (sparse and scaled data) and corresponding target (complete and scaled data).</a:t>
+            </a:r>
+          </a:p>
+        </p:txBody>
+      </p:sp>
+      <p:sp>
+        <p:nvSpPr>
+          <p:cNvPr id="10" name="Textfeld 9">
+            <a:extLst>
+              <a:ext uri="{FF2B5EF4-FFF2-40B4-BE49-F238E27FC236}">
+                <a16:creationId xmlns:a16="http://schemas.microsoft.com/office/drawing/2014/main" id="{1B0C69E0-AB46-4A9B-5CB5-7197A5D078F5}"/>
+              </a:ext>
+            </a:extLst>
+          </p:cNvPr>
+          <p:cNvSpPr txBox="1"/>
+          <p:nvPr/>
+        </p:nvSpPr>
+        <p:spPr>
+          <a:xfrm>
+            <a:off x="8310425" y="1607127"/>
+            <a:ext cx="2809002" cy="1200329"/>
+          </a:xfrm>
+          <a:prstGeom prst="rect">
+            <a:avLst/>
+          </a:prstGeom>
+          <a:noFill/>
+        </p:spPr>
+        <p:txBody>
+          <a:bodyPr wrap="square" rtlCol="0">
+            <a:spAutoFit/>
+          </a:bodyPr>
+          <a:lstStyle/>
+          <a:p>
+            <a:r>
+              <a:rPr lang="de-DE"/>
+              <a:t>Clearly see training progress in predictions from untrained model and after 1, 5, 10 epochs.</a:t>
+            </a:r>
+          </a:p>
+        </p:txBody>
+      </p:sp>
+      <p:sp>
+        <p:nvSpPr>
+          <p:cNvPr id="4" name="Textfeld 3">
+            <a:extLst>
+              <a:ext uri="{FF2B5EF4-FFF2-40B4-BE49-F238E27FC236}">
+                <a16:creationId xmlns:a16="http://schemas.microsoft.com/office/drawing/2014/main" id="{3E8271E0-8BF0-E2EA-EA91-55ACE65E5B3C}"/>
+              </a:ext>
+            </a:extLst>
+          </p:cNvPr>
+          <p:cNvSpPr txBox="1"/>
+          <p:nvPr/>
+        </p:nvSpPr>
+        <p:spPr>
+          <a:xfrm>
+            <a:off x="395416" y="172995"/>
+            <a:ext cx="11442357" cy="400110"/>
+          </a:xfrm>
+          <a:prstGeom prst="rect">
+            <a:avLst/>
+          </a:prstGeom>
+          <a:noFill/>
+        </p:spPr>
+        <p:txBody>
+          <a:bodyPr wrap="square" rtlCol="0">
+            <a:spAutoFit/>
+          </a:bodyPr>
+          <a:lstStyle/>
+          <a:p>
+            <a:r>
+              <a:rPr lang="de-DE" sz="2000" b="1"/>
+              <a:t>Translate loss curves to real predictions: Visualize training progress over epochs</a:t>
             </a:r>
           </a:p>
         </p:txBody>
@@ -4500,7 +4836,7 @@
     </p:spTree>
     <p:extLst>
       <p:ext uri="{BB962C8B-B14F-4D97-AF65-F5344CB8AC3E}">
-        <p14:creationId xmlns:p14="http://schemas.microsoft.com/office/powerpoint/2010/main" val="1359212192"/>
+        <p14:creationId xmlns:p14="http://schemas.microsoft.com/office/powerpoint/2010/main" val="3593153322"/>
       </p:ext>
     </p:extLst>
   </p:cSld>
@@ -4532,7 +4868,7 @@
           <p:cNvPr id="4" name="Grafik 3">
             <a:extLst>
               <a:ext uri="{FF2B5EF4-FFF2-40B4-BE49-F238E27FC236}">
-                <a16:creationId xmlns:a16="http://schemas.microsoft.com/office/drawing/2014/main" id="{C6337D89-8604-4876-95A3-65823FE39821}"/>
+                <a16:creationId xmlns:a16="http://schemas.microsoft.com/office/drawing/2014/main" id="{1B902B96-D60E-C8E4-619F-459782A88BAA}"/>
               </a:ext>
             </a:extLst>
           </p:cNvPr>
@@ -4549,8 +4885,8 @@
         </p:blipFill>
         <p:spPr>
           <a:xfrm>
-            <a:off x="1465116" y="1383141"/>
-            <a:ext cx="2971800" cy="1320800"/>
+            <a:off x="1087582" y="724586"/>
+            <a:ext cx="2895600" cy="2679700"/>
           </a:xfrm>
           <a:prstGeom prst="rect">
             <a:avLst/>
@@ -4562,7 +4898,7 @@
           <p:cNvPr id="6" name="Grafik 5">
             <a:extLst>
               <a:ext uri="{FF2B5EF4-FFF2-40B4-BE49-F238E27FC236}">
-                <a16:creationId xmlns:a16="http://schemas.microsoft.com/office/drawing/2014/main" id="{7F1FE91D-D56A-D4A0-2B3B-7B323B273875}"/>
+                <a16:creationId xmlns:a16="http://schemas.microsoft.com/office/drawing/2014/main" id="{92B92DED-C8E8-0B10-818E-0BC559E3C716}"/>
               </a:ext>
             </a:extLst>
           </p:cNvPr>
@@ -4579,8 +4915,8 @@
         </p:blipFill>
         <p:spPr>
           <a:xfrm>
-            <a:off x="4748646" y="11541"/>
-            <a:ext cx="2971800" cy="4064000"/>
+            <a:off x="4623951" y="686486"/>
+            <a:ext cx="2971800" cy="2717800"/>
           </a:xfrm>
           <a:prstGeom prst="rect">
             <a:avLst/>
@@ -4589,10 +4925,10 @@
       </p:pic>
       <p:pic>
         <p:nvPicPr>
-          <p:cNvPr id="7" name="Grafik 6">
-            <a:extLst>
-              <a:ext uri="{FF2B5EF4-FFF2-40B4-BE49-F238E27FC236}">
-                <a16:creationId xmlns:a16="http://schemas.microsoft.com/office/drawing/2014/main" id="{1DE14BB0-35CE-7624-67B1-E3184B947DF2}"/>
+          <p:cNvPr id="9" name="Grafik 8">
+            <a:extLst>
+              <a:ext uri="{FF2B5EF4-FFF2-40B4-BE49-F238E27FC236}">
+                <a16:creationId xmlns:a16="http://schemas.microsoft.com/office/drawing/2014/main" id="{86823B62-1BE1-A8D7-AEDF-E2796AC09D2A}"/>
               </a:ext>
             </a:extLst>
           </p:cNvPr>
@@ -4609,20 +4945,50 @@
         </p:blipFill>
         <p:spPr>
           <a:xfrm>
-            <a:off x="4748646" y="4054753"/>
-            <a:ext cx="2971800" cy="2794000"/>
+            <a:off x="4623951" y="3449280"/>
+            <a:ext cx="2971800" cy="1308100"/>
           </a:xfrm>
           <a:prstGeom prst="rect">
             <a:avLst/>
           </a:prstGeom>
         </p:spPr>
       </p:pic>
-      <p:sp>
-        <p:nvSpPr>
-          <p:cNvPr id="8" name="Textfeld 7">
-            <a:extLst>
-              <a:ext uri="{FF2B5EF4-FFF2-40B4-BE49-F238E27FC236}">
-                <a16:creationId xmlns:a16="http://schemas.microsoft.com/office/drawing/2014/main" id="{88153A3A-5B45-EA3C-FD64-7036DFA9C11C}"/>
+      <p:pic>
+        <p:nvPicPr>
+          <p:cNvPr id="10" name="Grafik 9">
+            <a:extLst>
+              <a:ext uri="{FF2B5EF4-FFF2-40B4-BE49-F238E27FC236}">
+                <a16:creationId xmlns:a16="http://schemas.microsoft.com/office/drawing/2014/main" id="{F42E7FC2-EE6B-9137-0E46-7517C4BB8BDF}"/>
+              </a:ext>
+            </a:extLst>
+          </p:cNvPr>
+          <p:cNvPicPr>
+            <a:picLocks noChangeAspect="1"/>
+          </p:cNvPicPr>
+          <p:nvPr/>
+        </p:nvPicPr>
+        <p:blipFill>
+          <a:blip r:embed="rId5"/>
+          <a:stretch>
+            <a:fillRect/>
+          </a:stretch>
+        </p:blipFill>
+        <p:spPr>
+          <a:xfrm>
+            <a:off x="4623951" y="4802374"/>
+            <a:ext cx="2971800" cy="1435100"/>
+          </a:xfrm>
+          <a:prstGeom prst="rect">
+            <a:avLst/>
+          </a:prstGeom>
+        </p:spPr>
+      </p:pic>
+      <p:sp>
+        <p:nvSpPr>
+          <p:cNvPr id="11" name="Textfeld 10">
+            <a:extLst>
+              <a:ext uri="{FF2B5EF4-FFF2-40B4-BE49-F238E27FC236}">
+                <a16:creationId xmlns:a16="http://schemas.microsoft.com/office/drawing/2014/main" id="{A6778348-60E8-4CEF-9755-B0F01E5C5297}"/>
               </a:ext>
             </a:extLst>
           </p:cNvPr>
@@ -4631,8 +4997,8 @@
         </p:nvSpPr>
         <p:spPr>
           <a:xfrm>
-            <a:off x="1465116" y="3228110"/>
-            <a:ext cx="2971800" cy="2585323"/>
+            <a:off x="890161" y="3726873"/>
+            <a:ext cx="2895600" cy="1477328"/>
           </a:xfrm>
           <a:prstGeom prst="rect">
             <a:avLst/>
@@ -4647,7 +5013,432 @@
           <a:p>
             <a:r>
               <a:rPr lang="de-DE"/>
-              <a:t>Show examplary VALIDATION target (complete and scaled data) and model prediction after 10 epochs for different sparsity settings.</a:t>
+              <a:t>Show examplary </a:t>
+            </a:r>
+            <a:r>
+              <a:rPr lang="de-DE">
+                <a:solidFill>
+                  <a:srgbClr val="FF0000"/>
+                </a:solidFill>
+              </a:rPr>
+              <a:t>VALIDATION</a:t>
+            </a:r>
+            <a:r>
+              <a:rPr lang="de-DE"/>
+              <a:t> input sample (sparse and scaled data) and corresponding target (complete and scaled data).</a:t>
+            </a:r>
+          </a:p>
+        </p:txBody>
+      </p:sp>
+      <p:sp>
+        <p:nvSpPr>
+          <p:cNvPr id="12" name="Textfeld 11">
+            <a:extLst>
+              <a:ext uri="{FF2B5EF4-FFF2-40B4-BE49-F238E27FC236}">
+                <a16:creationId xmlns:a16="http://schemas.microsoft.com/office/drawing/2014/main" id="{93106DC1-71F1-34B2-36EE-942406B4C5E3}"/>
+              </a:ext>
+            </a:extLst>
+          </p:cNvPr>
+          <p:cNvSpPr txBox="1"/>
+          <p:nvPr/>
+        </p:nvSpPr>
+        <p:spPr>
+          <a:xfrm>
+            <a:off x="8310425" y="1607127"/>
+            <a:ext cx="2809002" cy="1200329"/>
+          </a:xfrm>
+          <a:prstGeom prst="rect">
+            <a:avLst/>
+          </a:prstGeom>
+          <a:noFill/>
+        </p:spPr>
+        <p:txBody>
+          <a:bodyPr wrap="square" rtlCol="0">
+            <a:spAutoFit/>
+          </a:bodyPr>
+          <a:lstStyle/>
+          <a:p>
+            <a:r>
+              <a:rPr lang="de-DE"/>
+              <a:t>Clearly see training progress in predictions from untrained model and after 1, 5, 10 epochs.</a:t>
+            </a:r>
+          </a:p>
+        </p:txBody>
+      </p:sp>
+      <p:sp>
+        <p:nvSpPr>
+          <p:cNvPr id="2" name="Textfeld 1">
+            <a:extLst>
+              <a:ext uri="{FF2B5EF4-FFF2-40B4-BE49-F238E27FC236}">
+                <a16:creationId xmlns:a16="http://schemas.microsoft.com/office/drawing/2014/main" id="{845321D4-CCF1-D69D-75AC-5DAE951146E3}"/>
+              </a:ext>
+            </a:extLst>
+          </p:cNvPr>
+          <p:cNvSpPr txBox="1"/>
+          <p:nvPr/>
+        </p:nvSpPr>
+        <p:spPr>
+          <a:xfrm>
+            <a:off x="395416" y="172995"/>
+            <a:ext cx="11442357" cy="400110"/>
+          </a:xfrm>
+          <a:prstGeom prst="rect">
+            <a:avLst/>
+          </a:prstGeom>
+          <a:noFill/>
+        </p:spPr>
+        <p:txBody>
+          <a:bodyPr wrap="square" rtlCol="0">
+            <a:spAutoFit/>
+          </a:bodyPr>
+          <a:lstStyle/>
+          <a:p>
+            <a:r>
+              <a:rPr lang="de-DE" sz="2000" b="1"/>
+              <a:t>Translate loss curves to real predictions: Visualize training progress over epochs</a:t>
+            </a:r>
+          </a:p>
+        </p:txBody>
+      </p:sp>
+    </p:spTree>
+    <p:extLst>
+      <p:ext uri="{BB962C8B-B14F-4D97-AF65-F5344CB8AC3E}">
+        <p14:creationId xmlns:p14="http://schemas.microsoft.com/office/powerpoint/2010/main" val="1361541068"/>
+      </p:ext>
+    </p:extLst>
+  </p:cSld>
+  <p:clrMapOvr>
+    <a:masterClrMapping/>
+  </p:clrMapOvr>
+</p:sld>
+</file>
+
+<file path=ppt/slides/slide7.xml><?xml version="1.0" encoding="utf-8"?>
+<p:sld xmlns:a="http://schemas.openxmlformats.org/drawingml/2006/main" xmlns:r="http://schemas.openxmlformats.org/officeDocument/2006/relationships" xmlns:p="http://schemas.openxmlformats.org/presentationml/2006/main">
+  <p:cSld>
+    <p:spTree>
+      <p:nvGrpSpPr>
+        <p:cNvPr id="1" name=""/>
+        <p:cNvGrpSpPr/>
+        <p:nvPr/>
+      </p:nvGrpSpPr>
+      <p:grpSpPr>
+        <a:xfrm>
+          <a:off x="0" y="0"/>
+          <a:ext cx="0" cy="0"/>
+          <a:chOff x="0" y="0"/>
+          <a:chExt cx="0" cy="0"/>
+        </a:xfrm>
+      </p:grpSpPr>
+      <p:pic>
+        <p:nvPicPr>
+          <p:cNvPr id="2" name="Grafik 1">
+            <a:extLst>
+              <a:ext uri="{FF2B5EF4-FFF2-40B4-BE49-F238E27FC236}">
+                <a16:creationId xmlns:a16="http://schemas.microsoft.com/office/drawing/2014/main" id="{88C7AF3D-FDC6-0504-500E-4B94515858B0}"/>
+              </a:ext>
+            </a:extLst>
+          </p:cNvPr>
+          <p:cNvPicPr>
+            <a:picLocks noChangeAspect="1"/>
+          </p:cNvPicPr>
+          <p:nvPr/>
+        </p:nvPicPr>
+        <p:blipFill>
+          <a:blip r:embed="rId2"/>
+          <a:stretch>
+            <a:fillRect/>
+          </a:stretch>
+        </p:blipFill>
+        <p:spPr>
+          <a:xfrm>
+            <a:off x="4610100" y="7500"/>
+            <a:ext cx="2971800" cy="4127500"/>
+          </a:xfrm>
+          <a:prstGeom prst="rect">
+            <a:avLst/>
+          </a:prstGeom>
+        </p:spPr>
+      </p:pic>
+      <p:pic>
+        <p:nvPicPr>
+          <p:cNvPr id="3" name="Grafik 2">
+            <a:extLst>
+              <a:ext uri="{FF2B5EF4-FFF2-40B4-BE49-F238E27FC236}">
+                <a16:creationId xmlns:a16="http://schemas.microsoft.com/office/drawing/2014/main" id="{96E4B1C0-B20E-7D56-8774-5D1460FBDBE5}"/>
+              </a:ext>
+            </a:extLst>
+          </p:cNvPr>
+          <p:cNvPicPr>
+            <a:picLocks noChangeAspect="1"/>
+          </p:cNvPicPr>
+          <p:nvPr/>
+        </p:nvPicPr>
+        <p:blipFill>
+          <a:blip r:embed="rId3"/>
+          <a:stretch>
+            <a:fillRect/>
+          </a:stretch>
+        </p:blipFill>
+        <p:spPr>
+          <a:xfrm>
+            <a:off x="4610100" y="4066310"/>
+            <a:ext cx="2971800" cy="2819400"/>
+          </a:xfrm>
+          <a:prstGeom prst="rect">
+            <a:avLst/>
+          </a:prstGeom>
+        </p:spPr>
+      </p:pic>
+      <p:pic>
+        <p:nvPicPr>
+          <p:cNvPr id="5" name="Grafik 4">
+            <a:extLst>
+              <a:ext uri="{FF2B5EF4-FFF2-40B4-BE49-F238E27FC236}">
+                <a16:creationId xmlns:a16="http://schemas.microsoft.com/office/drawing/2014/main" id="{1C066422-39C0-5984-C02D-5BB705A637E6}"/>
+              </a:ext>
+            </a:extLst>
+          </p:cNvPr>
+          <p:cNvPicPr>
+            <a:picLocks noChangeAspect="1"/>
+          </p:cNvPicPr>
+          <p:nvPr/>
+        </p:nvPicPr>
+        <p:blipFill>
+          <a:blip r:embed="rId4"/>
+          <a:stretch>
+            <a:fillRect/>
+          </a:stretch>
+        </p:blipFill>
+        <p:spPr>
+          <a:xfrm>
+            <a:off x="1354282" y="7500"/>
+            <a:ext cx="2971800" cy="1320800"/>
+          </a:xfrm>
+          <a:prstGeom prst="rect">
+            <a:avLst/>
+          </a:prstGeom>
+        </p:spPr>
+      </p:pic>
+      <p:sp>
+        <p:nvSpPr>
+          <p:cNvPr id="7" name="Textfeld 6">
+            <a:extLst>
+              <a:ext uri="{FF2B5EF4-FFF2-40B4-BE49-F238E27FC236}">
+                <a16:creationId xmlns:a16="http://schemas.microsoft.com/office/drawing/2014/main" id="{A19631FC-6F47-9FCD-D26D-7A5D25D5CA95}"/>
+              </a:ext>
+            </a:extLst>
+          </p:cNvPr>
+          <p:cNvSpPr txBox="1"/>
+          <p:nvPr/>
+        </p:nvSpPr>
+        <p:spPr>
+          <a:xfrm>
+            <a:off x="654633" y="2369128"/>
+            <a:ext cx="2971800" cy="2585323"/>
+          </a:xfrm>
+          <a:prstGeom prst="rect">
+            <a:avLst/>
+          </a:prstGeom>
+          <a:noFill/>
+        </p:spPr>
+        <p:txBody>
+          <a:bodyPr wrap="square" rtlCol="0">
+            <a:spAutoFit/>
+          </a:bodyPr>
+          <a:lstStyle/>
+          <a:p>
+            <a:r>
+              <a:rPr lang="de-DE"/>
+              <a:t>Show examplary </a:t>
+            </a:r>
+            <a:r>
+              <a:rPr lang="de-DE">
+                <a:solidFill>
+                  <a:srgbClr val="FF0000"/>
+                </a:solidFill>
+              </a:rPr>
+              <a:t>TRAIN</a:t>
+            </a:r>
+            <a:r>
+              <a:rPr lang="de-DE"/>
+              <a:t> target (complete and scaled data) and model prediction after 10 epochs for different sparsity settings.</a:t>
+            </a:r>
+          </a:p>
+          <a:p>
+            <a:endParaRPr lang="de-DE"/>
+          </a:p>
+          <a:p>
+            <a:r>
+              <a:rPr lang="de-DE"/>
+              <a:t>Main structure in slp anomalies is already captured for extreme sparsity (0.99).</a:t>
+            </a:r>
+          </a:p>
+        </p:txBody>
+      </p:sp>
+    </p:spTree>
+    <p:extLst>
+      <p:ext uri="{BB962C8B-B14F-4D97-AF65-F5344CB8AC3E}">
+        <p14:creationId xmlns:p14="http://schemas.microsoft.com/office/powerpoint/2010/main" val="1359212192"/>
+      </p:ext>
+    </p:extLst>
+  </p:cSld>
+  <p:clrMapOvr>
+    <a:masterClrMapping/>
+  </p:clrMapOvr>
+</p:sld>
+</file>
+
+<file path=ppt/slides/slide8.xml><?xml version="1.0" encoding="utf-8"?>
+<p:sld xmlns:a="http://schemas.openxmlformats.org/drawingml/2006/main" xmlns:r="http://schemas.openxmlformats.org/officeDocument/2006/relationships" xmlns:p="http://schemas.openxmlformats.org/presentationml/2006/main">
+  <p:cSld>
+    <p:spTree>
+      <p:nvGrpSpPr>
+        <p:cNvPr id="1" name=""/>
+        <p:cNvGrpSpPr/>
+        <p:nvPr/>
+      </p:nvGrpSpPr>
+      <p:grpSpPr>
+        <a:xfrm>
+          <a:off x="0" y="0"/>
+          <a:ext cx="0" cy="0"/>
+          <a:chOff x="0" y="0"/>
+          <a:chExt cx="0" cy="0"/>
+        </a:xfrm>
+      </p:grpSpPr>
+      <p:pic>
+        <p:nvPicPr>
+          <p:cNvPr id="4" name="Grafik 3">
+            <a:extLst>
+              <a:ext uri="{FF2B5EF4-FFF2-40B4-BE49-F238E27FC236}">
+                <a16:creationId xmlns:a16="http://schemas.microsoft.com/office/drawing/2014/main" id="{C6337D89-8604-4876-95A3-65823FE39821}"/>
+              </a:ext>
+            </a:extLst>
+          </p:cNvPr>
+          <p:cNvPicPr>
+            <a:picLocks noChangeAspect="1"/>
+          </p:cNvPicPr>
+          <p:nvPr/>
+        </p:nvPicPr>
+        <p:blipFill>
+          <a:blip r:embed="rId2"/>
+          <a:stretch>
+            <a:fillRect/>
+          </a:stretch>
+        </p:blipFill>
+        <p:spPr>
+          <a:xfrm>
+            <a:off x="1620981" y="11541"/>
+            <a:ext cx="2971800" cy="1320800"/>
+          </a:xfrm>
+          <a:prstGeom prst="rect">
+            <a:avLst/>
+          </a:prstGeom>
+        </p:spPr>
+      </p:pic>
+      <p:pic>
+        <p:nvPicPr>
+          <p:cNvPr id="6" name="Grafik 5">
+            <a:extLst>
+              <a:ext uri="{FF2B5EF4-FFF2-40B4-BE49-F238E27FC236}">
+                <a16:creationId xmlns:a16="http://schemas.microsoft.com/office/drawing/2014/main" id="{7F1FE91D-D56A-D4A0-2B3B-7B323B273875}"/>
+              </a:ext>
+            </a:extLst>
+          </p:cNvPr>
+          <p:cNvPicPr>
+            <a:picLocks noChangeAspect="1"/>
+          </p:cNvPicPr>
+          <p:nvPr/>
+        </p:nvPicPr>
+        <p:blipFill>
+          <a:blip r:embed="rId3"/>
+          <a:stretch>
+            <a:fillRect/>
+          </a:stretch>
+        </p:blipFill>
+        <p:spPr>
+          <a:xfrm>
+            <a:off x="4748646" y="11541"/>
+            <a:ext cx="2971800" cy="4064000"/>
+          </a:xfrm>
+          <a:prstGeom prst="rect">
+            <a:avLst/>
+          </a:prstGeom>
+        </p:spPr>
+      </p:pic>
+      <p:pic>
+        <p:nvPicPr>
+          <p:cNvPr id="7" name="Grafik 6">
+            <a:extLst>
+              <a:ext uri="{FF2B5EF4-FFF2-40B4-BE49-F238E27FC236}">
+                <a16:creationId xmlns:a16="http://schemas.microsoft.com/office/drawing/2014/main" id="{1DE14BB0-35CE-7624-67B1-E3184B947DF2}"/>
+              </a:ext>
+            </a:extLst>
+          </p:cNvPr>
+          <p:cNvPicPr>
+            <a:picLocks noChangeAspect="1"/>
+          </p:cNvPicPr>
+          <p:nvPr/>
+        </p:nvPicPr>
+        <p:blipFill>
+          <a:blip r:embed="rId4"/>
+          <a:stretch>
+            <a:fillRect/>
+          </a:stretch>
+        </p:blipFill>
+        <p:spPr>
+          <a:xfrm>
+            <a:off x="4748646" y="4054753"/>
+            <a:ext cx="2971800" cy="2794000"/>
+          </a:xfrm>
+          <a:prstGeom prst="rect">
+            <a:avLst/>
+          </a:prstGeom>
+        </p:spPr>
+      </p:pic>
+      <p:sp>
+        <p:nvSpPr>
+          <p:cNvPr id="8" name="Textfeld 7">
+            <a:extLst>
+              <a:ext uri="{FF2B5EF4-FFF2-40B4-BE49-F238E27FC236}">
+                <a16:creationId xmlns:a16="http://schemas.microsoft.com/office/drawing/2014/main" id="{88153A3A-5B45-EA3C-FD64-7036DFA9C11C}"/>
+              </a:ext>
+            </a:extLst>
+          </p:cNvPr>
+          <p:cNvSpPr txBox="1"/>
+          <p:nvPr/>
+        </p:nvSpPr>
+        <p:spPr>
+          <a:xfrm>
+            <a:off x="1465116" y="3228110"/>
+            <a:ext cx="2971800" cy="2585323"/>
+          </a:xfrm>
+          <a:prstGeom prst="rect">
+            <a:avLst/>
+          </a:prstGeom>
+          <a:noFill/>
+        </p:spPr>
+        <p:txBody>
+          <a:bodyPr wrap="square" rtlCol="0">
+            <a:spAutoFit/>
+          </a:bodyPr>
+          <a:lstStyle/>
+          <a:p>
+            <a:r>
+              <a:rPr lang="de-DE"/>
+              <a:t>Show examplary </a:t>
+            </a:r>
+            <a:r>
+              <a:rPr lang="de-DE">
+                <a:solidFill>
+                  <a:srgbClr val="FF0000"/>
+                </a:solidFill>
+              </a:rPr>
+              <a:t>VALIDATION</a:t>
+            </a:r>
+            <a:r>
+              <a:rPr lang="de-DE"/>
+              <a:t> target (complete and scaled data) and model prediction after 10 epochs for different sparsity settings.</a:t>
             </a:r>
           </a:p>
           <a:p>
@@ -4665,6 +5456,227 @@
     <p:extLst>
       <p:ext uri="{BB962C8B-B14F-4D97-AF65-F5344CB8AC3E}">
         <p14:creationId xmlns:p14="http://schemas.microsoft.com/office/powerpoint/2010/main" val="2505157189"/>
+      </p:ext>
+    </p:extLst>
+  </p:cSld>
+  <p:clrMapOvr>
+    <a:masterClrMapping/>
+  </p:clrMapOvr>
+</p:sld>
+</file>
+
+<file path=ppt/slides/slide9.xml><?xml version="1.0" encoding="utf-8"?>
+<p:sld xmlns:a="http://schemas.openxmlformats.org/drawingml/2006/main" xmlns:r="http://schemas.openxmlformats.org/officeDocument/2006/relationships" xmlns:p="http://schemas.openxmlformats.org/presentationml/2006/main">
+  <p:cSld>
+    <p:spTree>
+      <p:nvGrpSpPr>
+        <p:cNvPr id="1" name=""/>
+        <p:cNvGrpSpPr/>
+        <p:nvPr/>
+      </p:nvGrpSpPr>
+      <p:grpSpPr>
+        <a:xfrm>
+          <a:off x="0" y="0"/>
+          <a:ext cx="0" cy="0"/>
+          <a:chOff x="0" y="0"/>
+          <a:chExt cx="0" cy="0"/>
+        </a:xfrm>
+      </p:grpSpPr>
+      <p:sp>
+        <p:nvSpPr>
+          <p:cNvPr id="3" name="Textfeld 2">
+            <a:extLst>
+              <a:ext uri="{FF2B5EF4-FFF2-40B4-BE49-F238E27FC236}">
+                <a16:creationId xmlns:a16="http://schemas.microsoft.com/office/drawing/2014/main" id="{5564CD61-1569-2469-2A8C-5A732BE4D0CE}"/>
+              </a:ext>
+            </a:extLst>
+          </p:cNvPr>
+          <p:cNvSpPr txBox="1"/>
+          <p:nvPr/>
+        </p:nvSpPr>
+        <p:spPr>
+          <a:xfrm>
+            <a:off x="676532" y="752453"/>
+            <a:ext cx="9295370" cy="1200329"/>
+          </a:xfrm>
+          <a:prstGeom prst="rect">
+            <a:avLst/>
+          </a:prstGeom>
+          <a:noFill/>
+        </p:spPr>
+        <p:txBody>
+          <a:bodyPr wrap="square">
+            <a:spAutoFit/>
+          </a:bodyPr>
+          <a:lstStyle/>
+          <a:p>
+            <a:pPr marL="285750" indent="-285750">
+              <a:buFont typeface="Arial" panose="020B0604020202020204" pitchFamily="34" charset="0"/>
+              <a:buChar char="•"/>
+            </a:pPr>
+            <a:r>
+              <a:rPr lang="de-DE"/>
+              <a:t>Now we have U-Net models that are trained to predict on samples with specified sparsity but allow to arbitrarily choose, </a:t>
+            </a:r>
+            <a:r>
+              <a:rPr lang="de-DE" i="1"/>
+              <a:t>which </a:t>
+            </a:r>
+            <a:r>
+              <a:rPr lang="de-DE"/>
+              <a:t>inputs we present. </a:t>
+            </a:r>
+          </a:p>
+          <a:p>
+            <a:pPr marL="285750" indent="-285750">
+              <a:buFont typeface="Arial" panose="020B0604020202020204" pitchFamily="34" charset="0"/>
+              <a:buChar char="•"/>
+            </a:pPr>
+            <a:r>
+              <a:rPr lang="de-DE"/>
+              <a:t>The next question is: Can we use e.g. a model pretrained on sparsity=0.95 and feed samples with different sparsity? How does validation loss change? </a:t>
+            </a:r>
+          </a:p>
+        </p:txBody>
+      </p:sp>
+      <p:sp>
+        <p:nvSpPr>
+          <p:cNvPr id="5" name="Textfeld 4">
+            <a:extLst>
+              <a:ext uri="{FF2B5EF4-FFF2-40B4-BE49-F238E27FC236}">
+                <a16:creationId xmlns:a16="http://schemas.microsoft.com/office/drawing/2014/main" id="{CF75F770-AFBA-8297-A32D-C666E405A1E6}"/>
+              </a:ext>
+            </a:extLst>
+          </p:cNvPr>
+          <p:cNvSpPr txBox="1"/>
+          <p:nvPr/>
+        </p:nvSpPr>
+        <p:spPr>
+          <a:xfrm>
+            <a:off x="395416" y="172995"/>
+            <a:ext cx="11442357" cy="400110"/>
+          </a:xfrm>
+          <a:prstGeom prst="rect">
+            <a:avLst/>
+          </a:prstGeom>
+          <a:noFill/>
+        </p:spPr>
+        <p:txBody>
+          <a:bodyPr wrap="square" rtlCol="0">
+            <a:spAutoFit/>
+          </a:bodyPr>
+          <a:lstStyle/>
+          <a:p>
+            <a:r>
+              <a:rPr lang="de-DE" sz="2000" b="1"/>
+              <a:t>Sensitivity experiment</a:t>
+            </a:r>
+          </a:p>
+        </p:txBody>
+      </p:sp>
+      <p:pic>
+        <p:nvPicPr>
+          <p:cNvPr id="9" name="Grafik 8">
+            <a:extLst>
+              <a:ext uri="{FF2B5EF4-FFF2-40B4-BE49-F238E27FC236}">
+                <a16:creationId xmlns:a16="http://schemas.microsoft.com/office/drawing/2014/main" id="{C7F3A938-5A6F-4787-3BB3-2240109F0C3E}"/>
+              </a:ext>
+            </a:extLst>
+          </p:cNvPr>
+          <p:cNvPicPr>
+            <a:picLocks noChangeAspect="1"/>
+          </p:cNvPicPr>
+          <p:nvPr/>
+        </p:nvPicPr>
+        <p:blipFill>
+          <a:blip r:embed="rId2"/>
+          <a:stretch>
+            <a:fillRect/>
+          </a:stretch>
+        </p:blipFill>
+        <p:spPr>
+          <a:xfrm>
+            <a:off x="197709" y="2175993"/>
+            <a:ext cx="5343925" cy="3286801"/>
+          </a:xfrm>
+          <a:prstGeom prst="rect">
+            <a:avLst/>
+          </a:prstGeom>
+        </p:spPr>
+      </p:pic>
+      <p:pic>
+        <p:nvPicPr>
+          <p:cNvPr id="10" name="Grafik 9">
+            <a:extLst>
+              <a:ext uri="{FF2B5EF4-FFF2-40B4-BE49-F238E27FC236}">
+                <a16:creationId xmlns:a16="http://schemas.microsoft.com/office/drawing/2014/main" id="{E73BF498-D9C4-B952-6F98-279BE169DCA7}"/>
+              </a:ext>
+            </a:extLst>
+          </p:cNvPr>
+          <p:cNvPicPr>
+            <a:picLocks noChangeAspect="1"/>
+          </p:cNvPicPr>
+          <p:nvPr/>
+        </p:nvPicPr>
+        <p:blipFill>
+          <a:blip r:embed="rId3"/>
+          <a:stretch>
+            <a:fillRect/>
+          </a:stretch>
+        </p:blipFill>
+        <p:spPr>
+          <a:xfrm>
+            <a:off x="6116594" y="2175993"/>
+            <a:ext cx="5343925" cy="3286801"/>
+          </a:xfrm>
+          <a:prstGeom prst="rect">
+            <a:avLst/>
+          </a:prstGeom>
+        </p:spPr>
+      </p:pic>
+      <p:sp>
+        <p:nvSpPr>
+          <p:cNvPr id="11" name="Textfeld 10">
+            <a:extLst>
+              <a:ext uri="{FF2B5EF4-FFF2-40B4-BE49-F238E27FC236}">
+                <a16:creationId xmlns:a16="http://schemas.microsoft.com/office/drawing/2014/main" id="{07A80F2C-FCA5-BF83-F6CB-600E140ED19A}"/>
+              </a:ext>
+            </a:extLst>
+          </p:cNvPr>
+          <p:cNvSpPr txBox="1"/>
+          <p:nvPr/>
+        </p:nvSpPr>
+        <p:spPr>
+          <a:xfrm>
+            <a:off x="569440" y="5647213"/>
+            <a:ext cx="11082982" cy="923330"/>
+          </a:xfrm>
+          <a:prstGeom prst="rect">
+            <a:avLst/>
+          </a:prstGeom>
+          <a:noFill/>
+        </p:spPr>
+        <p:txBody>
+          <a:bodyPr wrap="square">
+            <a:spAutoFit/>
+          </a:bodyPr>
+          <a:lstStyle/>
+          <a:p>
+            <a:pPr marL="285750" indent="-285750">
+              <a:buFont typeface="Arial" panose="020B0604020202020204" pitchFamily="34" charset="0"/>
+              <a:buChar char="•"/>
+            </a:pPr>
+            <a:r>
+              <a:rPr lang="de-DE"/>
+              <a:t>That works quite nice: Especially for fixed sparsity=0.9, we find that model to almost perfectly perform in the sparsity range of [0.95, 0.75]. Our flexibility is hence further increased: Can not only freely choose, which inputs to use, but can also use a varying number of inputs, at least in a certain range!</a:t>
+            </a:r>
+          </a:p>
+        </p:txBody>
+      </p:sp>
+    </p:spTree>
+    <p:extLst>
+      <p:ext uri="{BB962C8B-B14F-4D97-AF65-F5344CB8AC3E}">
+        <p14:creationId xmlns:p14="http://schemas.microsoft.com/office/powerpoint/2010/main" val="3809826001"/>
       </p:ext>
     </p:extLst>
   </p:cSld>

</xml_diff>

<commit_message>
Update presentation slides with results from first experiments with U-Net on slp real world data
</commit_message>
<xml_diff>
--- a/presentations/unet_4conv_slp_realworld.pptx
+++ b/presentations/unet_4conv_slp_realworld.pptx
@@ -5,7 +5,7 @@
     <p:sldMasterId id="2147483648" r:id="rId1"/>
   </p:sldMasterIdLst>
   <p:notesMasterIdLst>
-    <p:notesMasterId r:id="rId14"/>
+    <p:notesMasterId r:id="rId15"/>
   </p:notesMasterIdLst>
   <p:sldIdLst>
     <p:sldId id="256" r:id="rId2"/>
@@ -16,10 +16,11 @@
     <p:sldId id="258" r:id="rId7"/>
     <p:sldId id="259" r:id="rId8"/>
     <p:sldId id="260" r:id="rId9"/>
-    <p:sldId id="261" r:id="rId10"/>
-    <p:sldId id="265" r:id="rId11"/>
-    <p:sldId id="266" r:id="rId12"/>
-    <p:sldId id="268" r:id="rId13"/>
+    <p:sldId id="269" r:id="rId10"/>
+    <p:sldId id="261" r:id="rId11"/>
+    <p:sldId id="265" r:id="rId12"/>
+    <p:sldId id="266" r:id="rId13"/>
+    <p:sldId id="268" r:id="rId14"/>
   </p:sldIdLst>
   <p:sldSz cx="12192000" cy="6858000"/>
   <p:notesSz cx="6858000" cy="9144000"/>
@@ -207,7 +208,7 @@
           </a:lstStyle>
           <a:p>
             <a:fld id="{B35BE548-DE05-8149-9395-93E03CC73C13}" type="datetimeFigureOut">
-              <a:t>18.01.23</a:t>
+              <a:t>19.01.23</a:t>
             </a:fld>
             <a:endParaRPr lang="de-DE"/>
           </a:p>
@@ -786,7 +787,7 @@
           <a:lstStyle/>
           <a:p>
             <a:fld id="{F7A3446A-3617-0E4A-A439-6DD0C73FFDE1}" type="datetimeFigureOut">
-              <a:t>18.01.23</a:t>
+              <a:t>19.01.23</a:t>
             </a:fld>
             <a:endParaRPr lang="de-DE"/>
           </a:p>
@@ -982,7 +983,7 @@
           <a:lstStyle/>
           <a:p>
             <a:fld id="{F7A3446A-3617-0E4A-A439-6DD0C73FFDE1}" type="datetimeFigureOut">
-              <a:t>18.01.23</a:t>
+              <a:t>19.01.23</a:t>
             </a:fld>
             <a:endParaRPr lang="de-DE"/>
           </a:p>
@@ -1188,7 +1189,7 @@
           <a:lstStyle/>
           <a:p>
             <a:fld id="{F7A3446A-3617-0E4A-A439-6DD0C73FFDE1}" type="datetimeFigureOut">
-              <a:t>18.01.23</a:t>
+              <a:t>19.01.23</a:t>
             </a:fld>
             <a:endParaRPr lang="de-DE"/>
           </a:p>
@@ -1384,7 +1385,7 @@
           <a:lstStyle/>
           <a:p>
             <a:fld id="{F7A3446A-3617-0E4A-A439-6DD0C73FFDE1}" type="datetimeFigureOut">
-              <a:t>18.01.23</a:t>
+              <a:t>19.01.23</a:t>
             </a:fld>
             <a:endParaRPr lang="de-DE"/>
           </a:p>
@@ -1657,7 +1658,7 @@
           <a:lstStyle/>
           <a:p>
             <a:fld id="{F7A3446A-3617-0E4A-A439-6DD0C73FFDE1}" type="datetimeFigureOut">
-              <a:t>18.01.23</a:t>
+              <a:t>19.01.23</a:t>
             </a:fld>
             <a:endParaRPr lang="de-DE"/>
           </a:p>
@@ -1920,7 +1921,7 @@
           <a:lstStyle/>
           <a:p>
             <a:fld id="{F7A3446A-3617-0E4A-A439-6DD0C73FFDE1}" type="datetimeFigureOut">
-              <a:t>18.01.23</a:t>
+              <a:t>19.01.23</a:t>
             </a:fld>
             <a:endParaRPr lang="de-DE"/>
           </a:p>
@@ -2330,7 +2331,7 @@
           <a:lstStyle/>
           <a:p>
             <a:fld id="{F7A3446A-3617-0E4A-A439-6DD0C73FFDE1}" type="datetimeFigureOut">
-              <a:t>18.01.23</a:t>
+              <a:t>19.01.23</a:t>
             </a:fld>
             <a:endParaRPr lang="de-DE"/>
           </a:p>
@@ -2469,7 +2470,7 @@
           <a:lstStyle/>
           <a:p>
             <a:fld id="{F7A3446A-3617-0E4A-A439-6DD0C73FFDE1}" type="datetimeFigureOut">
-              <a:t>18.01.23</a:t>
+              <a:t>19.01.23</a:t>
             </a:fld>
             <a:endParaRPr lang="de-DE"/>
           </a:p>
@@ -2580,7 +2581,7 @@
           <a:lstStyle/>
           <a:p>
             <a:fld id="{F7A3446A-3617-0E4A-A439-6DD0C73FFDE1}" type="datetimeFigureOut">
-              <a:t>18.01.23</a:t>
+              <a:t>19.01.23</a:t>
             </a:fld>
             <a:endParaRPr lang="de-DE"/>
           </a:p>
@@ -2889,7 +2890,7 @@
           <a:lstStyle/>
           <a:p>
             <a:fld id="{F7A3446A-3617-0E4A-A439-6DD0C73FFDE1}" type="datetimeFigureOut">
-              <a:t>18.01.23</a:t>
+              <a:t>19.01.23</a:t>
             </a:fld>
             <a:endParaRPr lang="de-DE"/>
           </a:p>
@@ -3175,7 +3176,7 @@
           <a:lstStyle/>
           <a:p>
             <a:fld id="{F7A3446A-3617-0E4A-A439-6DD0C73FFDE1}" type="datetimeFigureOut">
-              <a:t>18.01.23</a:t>
+              <a:t>19.01.23</a:t>
             </a:fld>
             <a:endParaRPr lang="de-DE"/>
           </a:p>
@@ -3414,7 +3415,7 @@
           </a:lstStyle>
           <a:p>
             <a:fld id="{F7A3446A-3617-0E4A-A439-6DD0C73FFDE1}" type="datetimeFigureOut">
-              <a:t>18.01.23</a:t>
+              <a:t>19.01.23</a:t>
             </a:fld>
             <a:endParaRPr lang="de-DE"/>
           </a:p>
@@ -3939,104 +3940,12 @@
           <a:chExt cx="0" cy="0"/>
         </a:xfrm>
       </p:grpSpPr>
-      <p:sp>
-        <p:nvSpPr>
-          <p:cNvPr id="3" name="Textfeld 2">
-            <a:extLst>
-              <a:ext uri="{FF2B5EF4-FFF2-40B4-BE49-F238E27FC236}">
-                <a16:creationId xmlns:a16="http://schemas.microsoft.com/office/drawing/2014/main" id="{5564CD61-1569-2469-2A8C-5A732BE4D0CE}"/>
-              </a:ext>
-            </a:extLst>
-          </p:cNvPr>
-          <p:cNvSpPr txBox="1"/>
-          <p:nvPr/>
-        </p:nvSpPr>
-        <p:spPr>
-          <a:xfrm>
-            <a:off x="676532" y="752453"/>
-            <a:ext cx="9295370" cy="1200329"/>
-          </a:xfrm>
-          <a:prstGeom prst="rect">
-            <a:avLst/>
-          </a:prstGeom>
-          <a:noFill/>
-        </p:spPr>
-        <p:txBody>
-          <a:bodyPr wrap="square">
-            <a:spAutoFit/>
-          </a:bodyPr>
-          <a:lstStyle/>
-          <a:p>
-            <a:pPr marL="285750" indent="-285750">
-              <a:buFont typeface="Arial" panose="020B0604020202020204" pitchFamily="34" charset="0"/>
-              <a:buChar char="•"/>
-            </a:pPr>
-            <a:r>
-              <a:rPr lang="de-DE"/>
-              <a:t>Now we have U-Net models that are trained to predict on samples with specified sparsity but allow to arbitrarily choose, </a:t>
-            </a:r>
-            <a:r>
-              <a:rPr lang="de-DE" i="1"/>
-              <a:t>which </a:t>
-            </a:r>
-            <a:r>
-              <a:rPr lang="de-DE"/>
-              <a:t>inputs we present. </a:t>
-            </a:r>
-          </a:p>
-          <a:p>
-            <a:pPr marL="285750" indent="-285750">
-              <a:buFont typeface="Arial" panose="020B0604020202020204" pitchFamily="34" charset="0"/>
-              <a:buChar char="•"/>
-            </a:pPr>
-            <a:r>
-              <a:rPr lang="de-DE"/>
-              <a:t>The next question is: Can we use e.g. a model pretrained on sparsity=0.95 and feed samples with different sparsity? How does validation loss change? </a:t>
-            </a:r>
-          </a:p>
-        </p:txBody>
-      </p:sp>
-      <p:sp>
-        <p:nvSpPr>
-          <p:cNvPr id="5" name="Textfeld 4">
-            <a:extLst>
-              <a:ext uri="{FF2B5EF4-FFF2-40B4-BE49-F238E27FC236}">
-                <a16:creationId xmlns:a16="http://schemas.microsoft.com/office/drawing/2014/main" id="{CF75F770-AFBA-8297-A32D-C666E405A1E6}"/>
-              </a:ext>
-            </a:extLst>
-          </p:cNvPr>
-          <p:cNvSpPr txBox="1"/>
-          <p:nvPr/>
-        </p:nvSpPr>
-        <p:spPr>
-          <a:xfrm>
-            <a:off x="395416" y="172995"/>
-            <a:ext cx="11442357" cy="400110"/>
-          </a:xfrm>
-          <a:prstGeom prst="rect">
-            <a:avLst/>
-          </a:prstGeom>
-          <a:noFill/>
-        </p:spPr>
-        <p:txBody>
-          <a:bodyPr wrap="square" rtlCol="0">
-            <a:spAutoFit/>
-          </a:bodyPr>
-          <a:lstStyle/>
-          <a:p>
-            <a:r>
-              <a:rPr lang="de-DE" sz="2000" b="1"/>
-              <a:t>Sensitivity experiment</a:t>
-            </a:r>
-          </a:p>
-        </p:txBody>
-      </p:sp>
       <p:pic>
         <p:nvPicPr>
-          <p:cNvPr id="9" name="Grafik 8">
-            <a:extLst>
-              <a:ext uri="{FF2B5EF4-FFF2-40B4-BE49-F238E27FC236}">
-                <a16:creationId xmlns:a16="http://schemas.microsoft.com/office/drawing/2014/main" id="{C7F3A938-5A6F-4787-3BB3-2240109F0C3E}"/>
+          <p:cNvPr id="4" name="Grafik 3">
+            <a:extLst>
+              <a:ext uri="{FF2B5EF4-FFF2-40B4-BE49-F238E27FC236}">
+                <a16:creationId xmlns:a16="http://schemas.microsoft.com/office/drawing/2014/main" id="{C6337D89-8604-4876-95A3-65823FE39821}"/>
               </a:ext>
             </a:extLst>
           </p:cNvPr>
@@ -4053,8 +3962,8 @@
         </p:blipFill>
         <p:spPr>
           <a:xfrm>
-            <a:off x="197709" y="2175993"/>
-            <a:ext cx="5343925" cy="3286801"/>
+            <a:off x="1620981" y="11541"/>
+            <a:ext cx="2971800" cy="1320800"/>
           </a:xfrm>
           <a:prstGeom prst="rect">
             <a:avLst/>
@@ -4063,10 +3972,10 @@
       </p:pic>
       <p:pic>
         <p:nvPicPr>
-          <p:cNvPr id="10" name="Grafik 9">
-            <a:extLst>
-              <a:ext uri="{FF2B5EF4-FFF2-40B4-BE49-F238E27FC236}">
-                <a16:creationId xmlns:a16="http://schemas.microsoft.com/office/drawing/2014/main" id="{E73BF498-D9C4-B952-6F98-279BE169DCA7}"/>
+          <p:cNvPr id="6" name="Grafik 5">
+            <a:extLst>
+              <a:ext uri="{FF2B5EF4-FFF2-40B4-BE49-F238E27FC236}">
+                <a16:creationId xmlns:a16="http://schemas.microsoft.com/office/drawing/2014/main" id="{7F1FE91D-D56A-D4A0-2B3B-7B323B273875}"/>
               </a:ext>
             </a:extLst>
           </p:cNvPr>
@@ -4083,20 +3992,50 @@
         </p:blipFill>
         <p:spPr>
           <a:xfrm>
-            <a:off x="6116594" y="2175993"/>
-            <a:ext cx="5343925" cy="3286801"/>
+            <a:off x="4748646" y="11541"/>
+            <a:ext cx="2971800" cy="4064000"/>
           </a:xfrm>
           <a:prstGeom prst="rect">
             <a:avLst/>
           </a:prstGeom>
         </p:spPr>
       </p:pic>
-      <p:sp>
-        <p:nvSpPr>
-          <p:cNvPr id="11" name="Textfeld 10">
-            <a:extLst>
-              <a:ext uri="{FF2B5EF4-FFF2-40B4-BE49-F238E27FC236}">
-                <a16:creationId xmlns:a16="http://schemas.microsoft.com/office/drawing/2014/main" id="{07A80F2C-FCA5-BF83-F6CB-600E140ED19A}"/>
+      <p:pic>
+        <p:nvPicPr>
+          <p:cNvPr id="7" name="Grafik 6">
+            <a:extLst>
+              <a:ext uri="{FF2B5EF4-FFF2-40B4-BE49-F238E27FC236}">
+                <a16:creationId xmlns:a16="http://schemas.microsoft.com/office/drawing/2014/main" id="{1DE14BB0-35CE-7624-67B1-E3184B947DF2}"/>
+              </a:ext>
+            </a:extLst>
+          </p:cNvPr>
+          <p:cNvPicPr>
+            <a:picLocks noChangeAspect="1"/>
+          </p:cNvPicPr>
+          <p:nvPr/>
+        </p:nvPicPr>
+        <p:blipFill>
+          <a:blip r:embed="rId4"/>
+          <a:stretch>
+            <a:fillRect/>
+          </a:stretch>
+        </p:blipFill>
+        <p:spPr>
+          <a:xfrm>
+            <a:off x="4748646" y="4054753"/>
+            <a:ext cx="2971800" cy="2794000"/>
+          </a:xfrm>
+          <a:prstGeom prst="rect">
+            <a:avLst/>
+          </a:prstGeom>
+        </p:spPr>
+      </p:pic>
+      <p:sp>
+        <p:nvSpPr>
+          <p:cNvPr id="8" name="Textfeld 7">
+            <a:extLst>
+              <a:ext uri="{FF2B5EF4-FFF2-40B4-BE49-F238E27FC236}">
+                <a16:creationId xmlns:a16="http://schemas.microsoft.com/office/drawing/2014/main" id="{88153A3A-5B45-EA3C-FD64-7036DFA9C11C}"/>
               </a:ext>
             </a:extLst>
           </p:cNvPr>
@@ -4105,8 +4044,8 @@
         </p:nvSpPr>
         <p:spPr>
           <a:xfrm>
-            <a:off x="569440" y="5647213"/>
-            <a:ext cx="11082982" cy="923330"/>
+            <a:off x="1465116" y="3228110"/>
+            <a:ext cx="2971800" cy="2585323"/>
           </a:xfrm>
           <a:prstGeom prst="rect">
             <a:avLst/>
@@ -4114,18 +4053,35 @@
           <a:noFill/>
         </p:spPr>
         <p:txBody>
-          <a:bodyPr wrap="square">
+          <a:bodyPr wrap="square" rtlCol="0">
             <a:spAutoFit/>
           </a:bodyPr>
           <a:lstStyle/>
           <a:p>
-            <a:pPr marL="285750" indent="-285750">
-              <a:buFont typeface="Arial" panose="020B0604020202020204" pitchFamily="34" charset="0"/>
-              <a:buChar char="•"/>
-            </a:pPr>
-            <a:r>
-              <a:rPr lang="de-DE"/>
-              <a:t>That works quite nice: Especially for fixed sparsity=0.9, we find that model to almost perfectly perform in the sparsity range of [0.95, 0.75]. Our flexibility is hence further increased: Can not only freely choose, which inputs to use, but can also use a varying number of inputs, at least in a certain range!</a:t>
+            <a:r>
+              <a:rPr lang="de-DE"/>
+              <a:t>Show examplary </a:t>
+            </a:r>
+            <a:r>
+              <a:rPr lang="de-DE">
+                <a:solidFill>
+                  <a:srgbClr val="FF0000"/>
+                </a:solidFill>
+              </a:rPr>
+              <a:t>VALIDATION</a:t>
+            </a:r>
+            <a:r>
+              <a:rPr lang="de-DE"/>
+              <a:t> target (complete and scaled data) and model prediction after 10 epochs for different sparsity settings.</a:t>
+            </a:r>
+          </a:p>
+          <a:p>
+            <a:endParaRPr lang="de-DE"/>
+          </a:p>
+          <a:p>
+            <a:r>
+              <a:rPr lang="de-DE"/>
+              <a:t>Main structure in slp anomalies is only captured from sparsity &gt;= 0.95.</a:t>
             </a:r>
           </a:p>
         </p:txBody>
@@ -4133,7 +4089,7 @@
     </p:spTree>
     <p:extLst>
       <p:ext uri="{BB962C8B-B14F-4D97-AF65-F5344CB8AC3E}">
-        <p14:creationId xmlns:p14="http://schemas.microsoft.com/office/powerpoint/2010/main" val="3809826001"/>
+        <p14:creationId xmlns:p14="http://schemas.microsoft.com/office/powerpoint/2010/main" val="2505157189"/>
       </p:ext>
     </p:extLst>
   </p:cSld>
@@ -4162,10 +4118,10 @@
       </p:grpSpPr>
       <p:sp>
         <p:nvSpPr>
-          <p:cNvPr id="5" name="Textfeld 4">
-            <a:extLst>
-              <a:ext uri="{FF2B5EF4-FFF2-40B4-BE49-F238E27FC236}">
-                <a16:creationId xmlns:a16="http://schemas.microsoft.com/office/drawing/2014/main" id="{CF75F770-AFBA-8297-A32D-C666E405A1E6}"/>
+          <p:cNvPr id="3" name="Textfeld 2">
+            <a:extLst>
+              <a:ext uri="{FF2B5EF4-FFF2-40B4-BE49-F238E27FC236}">
+                <a16:creationId xmlns:a16="http://schemas.microsoft.com/office/drawing/2014/main" id="{5564CD61-1569-2469-2A8C-5A732BE4D0CE}"/>
               </a:ext>
             </a:extLst>
           </p:cNvPr>
@@ -4174,8 +4130,8 @@
         </p:nvSpPr>
         <p:spPr>
           <a:xfrm>
-            <a:off x="395416" y="172995"/>
-            <a:ext cx="11442357" cy="707886"/>
+            <a:off x="676532" y="752453"/>
+            <a:ext cx="9295370" cy="1200329"/>
           </a:xfrm>
           <a:prstGeom prst="rect">
             <a:avLst/>
@@ -4183,6 +4139,63 @@
           <a:noFill/>
         </p:spPr>
         <p:txBody>
+          <a:bodyPr wrap="square">
+            <a:spAutoFit/>
+          </a:bodyPr>
+          <a:lstStyle/>
+          <a:p>
+            <a:pPr marL="285750" indent="-285750">
+              <a:buFont typeface="Arial" panose="020B0604020202020204" pitchFamily="34" charset="0"/>
+              <a:buChar char="•"/>
+            </a:pPr>
+            <a:r>
+              <a:rPr lang="de-DE"/>
+              <a:t>Now we have U-Net models that are trained to predict on samples with specified sparsity but allow to arbitrarily choose, </a:t>
+            </a:r>
+            <a:r>
+              <a:rPr lang="de-DE" i="1"/>
+              <a:t>which </a:t>
+            </a:r>
+            <a:r>
+              <a:rPr lang="de-DE"/>
+              <a:t>inputs we present. </a:t>
+            </a:r>
+          </a:p>
+          <a:p>
+            <a:pPr marL="285750" indent="-285750">
+              <a:buFont typeface="Arial" panose="020B0604020202020204" pitchFamily="34" charset="0"/>
+              <a:buChar char="•"/>
+            </a:pPr>
+            <a:r>
+              <a:rPr lang="de-DE"/>
+              <a:t>The next question is: Can we use e.g. a model pretrained on sparsity=0.95 and feed samples with different sparsity? How does validation loss change? </a:t>
+            </a:r>
+          </a:p>
+        </p:txBody>
+      </p:sp>
+      <p:sp>
+        <p:nvSpPr>
+          <p:cNvPr id="5" name="Textfeld 4">
+            <a:extLst>
+              <a:ext uri="{FF2B5EF4-FFF2-40B4-BE49-F238E27FC236}">
+                <a16:creationId xmlns:a16="http://schemas.microsoft.com/office/drawing/2014/main" id="{CF75F770-AFBA-8297-A32D-C666E405A1E6}"/>
+              </a:ext>
+            </a:extLst>
+          </p:cNvPr>
+          <p:cNvSpPr txBox="1"/>
+          <p:nvPr/>
+        </p:nvSpPr>
+        <p:spPr>
+          <a:xfrm>
+            <a:off x="395416" y="172995"/>
+            <a:ext cx="11442357" cy="400110"/>
+          </a:xfrm>
+          <a:prstGeom prst="rect">
+            <a:avLst/>
+          </a:prstGeom>
+          <a:noFill/>
+        </p:spPr>
+        <p:txBody>
           <a:bodyPr wrap="square" rtlCol="0">
             <a:spAutoFit/>
           </a:bodyPr>
@@ -4193,20 +4206,14 @@
               <a:t>Sensitivity experiment</a:t>
             </a:r>
           </a:p>
-          <a:p>
-            <a:r>
-              <a:rPr lang="de-DE" sz="2000"/>
-              <a:t>Use pre-trained model on sparsity=0.9</a:t>
-            </a:r>
-          </a:p>
         </p:txBody>
       </p:sp>
       <p:pic>
         <p:nvPicPr>
-          <p:cNvPr id="2" name="Grafik 1">
-            <a:extLst>
-              <a:ext uri="{FF2B5EF4-FFF2-40B4-BE49-F238E27FC236}">
-                <a16:creationId xmlns:a16="http://schemas.microsoft.com/office/drawing/2014/main" id="{837EB077-ACE5-DC9B-A8E9-549BD038CAA6}"/>
+          <p:cNvPr id="9" name="Grafik 8">
+            <a:extLst>
+              <a:ext uri="{FF2B5EF4-FFF2-40B4-BE49-F238E27FC236}">
+                <a16:creationId xmlns:a16="http://schemas.microsoft.com/office/drawing/2014/main" id="{C7F3A938-5A6F-4787-3BB3-2240109F0C3E}"/>
               </a:ext>
             </a:extLst>
           </p:cNvPr>
@@ -4223,8 +4230,8 @@
         </p:blipFill>
         <p:spPr>
           <a:xfrm>
-            <a:off x="7787142" y="172995"/>
-            <a:ext cx="3912022" cy="1853513"/>
+            <a:off x="197709" y="2175993"/>
+            <a:ext cx="5343925" cy="3286801"/>
           </a:xfrm>
           <a:prstGeom prst="rect">
             <a:avLst/>
@@ -4233,10 +4240,10 @@
       </p:pic>
       <p:pic>
         <p:nvPicPr>
-          <p:cNvPr id="4" name="Grafik 3">
-            <a:extLst>
-              <a:ext uri="{FF2B5EF4-FFF2-40B4-BE49-F238E27FC236}">
-                <a16:creationId xmlns:a16="http://schemas.microsoft.com/office/drawing/2014/main" id="{D00268E1-BADA-7F34-341E-DDD08FDFC786}"/>
+          <p:cNvPr id="10" name="Grafik 9">
+            <a:extLst>
+              <a:ext uri="{FF2B5EF4-FFF2-40B4-BE49-F238E27FC236}">
+                <a16:creationId xmlns:a16="http://schemas.microsoft.com/office/drawing/2014/main" id="{E73BF498-D9C4-B952-6F98-279BE169DCA7}"/>
               </a:ext>
             </a:extLst>
           </p:cNvPr>
@@ -4253,48 +4260,57 @@
         </p:blipFill>
         <p:spPr>
           <a:xfrm>
-            <a:off x="395416" y="1238536"/>
-            <a:ext cx="3700526" cy="5239265"/>
+            <a:off x="6116594" y="2175993"/>
+            <a:ext cx="5343925" cy="3286801"/>
           </a:xfrm>
           <a:prstGeom prst="rect">
             <a:avLst/>
           </a:prstGeom>
         </p:spPr>
       </p:pic>
-      <p:pic>
-        <p:nvPicPr>
-          <p:cNvPr id="6" name="Grafik 5">
-            <a:extLst>
-              <a:ext uri="{FF2B5EF4-FFF2-40B4-BE49-F238E27FC236}">
-                <a16:creationId xmlns:a16="http://schemas.microsoft.com/office/drawing/2014/main" id="{339B4AB7-3F5B-8A74-5141-6160325CC5CA}"/>
-              </a:ext>
-            </a:extLst>
-          </p:cNvPr>
-          <p:cNvPicPr>
-            <a:picLocks noChangeAspect="1"/>
-          </p:cNvPicPr>
+      <p:sp>
+        <p:nvSpPr>
+          <p:cNvPr id="11" name="Textfeld 10">
+            <a:extLst>
+              <a:ext uri="{FF2B5EF4-FFF2-40B4-BE49-F238E27FC236}">
+                <a16:creationId xmlns:a16="http://schemas.microsoft.com/office/drawing/2014/main" id="{07A80F2C-FCA5-BF83-F6CB-600E140ED19A}"/>
+              </a:ext>
+            </a:extLst>
+          </p:cNvPr>
+          <p:cNvSpPr txBox="1"/>
           <p:nvPr/>
-        </p:nvPicPr>
-        <p:blipFill>
-          <a:blip r:embed="rId4"/>
-          <a:stretch>
-            <a:fillRect/>
-          </a:stretch>
-        </p:blipFill>
-        <p:spPr>
-          <a:xfrm>
-            <a:off x="4226011" y="2648562"/>
-            <a:ext cx="4090086" cy="3829239"/>
+        </p:nvSpPr>
+        <p:spPr>
+          <a:xfrm>
+            <a:off x="569440" y="5647213"/>
+            <a:ext cx="11082982" cy="923330"/>
           </a:xfrm>
           <a:prstGeom prst="rect">
             <a:avLst/>
           </a:prstGeom>
-        </p:spPr>
-      </p:pic>
+          <a:noFill/>
+        </p:spPr>
+        <p:txBody>
+          <a:bodyPr wrap="square">
+            <a:spAutoFit/>
+          </a:bodyPr>
+          <a:lstStyle/>
+          <a:p>
+            <a:pPr marL="285750" indent="-285750">
+              <a:buFont typeface="Arial" panose="020B0604020202020204" pitchFamily="34" charset="0"/>
+              <a:buChar char="•"/>
+            </a:pPr>
+            <a:r>
+              <a:rPr lang="de-DE"/>
+              <a:t>That works quite nice: Especially for fixed sparsity=0.9, we find that model to almost perfectly perform in the sparsity range of [0.95, 0.75]. Our flexibility is hence further increased: Can not only freely choose, which inputs to use, but can also use a varying number of inputs, at least in a certain range!</a:t>
+            </a:r>
+          </a:p>
+        </p:txBody>
+      </p:sp>
     </p:spTree>
     <p:extLst>
       <p:ext uri="{BB962C8B-B14F-4D97-AF65-F5344CB8AC3E}">
-        <p14:creationId xmlns:p14="http://schemas.microsoft.com/office/powerpoint/2010/main" val="1591056582"/>
+        <p14:creationId xmlns:p14="http://schemas.microsoft.com/office/powerpoint/2010/main" val="3809826001"/>
       </p:ext>
     </p:extLst>
   </p:cSld>
@@ -4336,7 +4352,7 @@
         <p:spPr>
           <a:xfrm>
             <a:off x="395416" y="172995"/>
-            <a:ext cx="11442357" cy="400110"/>
+            <a:ext cx="11442357" cy="707886"/>
           </a:xfrm>
           <a:prstGeom prst="rect">
             <a:avLst/>
@@ -4351,21 +4367,143 @@
           <a:p>
             <a:r>
               <a:rPr lang="de-DE" sz="2000" b="1"/>
-              <a:t>Game plan: </a:t>
-            </a:r>
+              <a:t>Sensitivity experiment</a:t>
+            </a:r>
+          </a:p>
+          <a:p>
             <a:r>
               <a:rPr lang="de-DE" sz="2000"/>
-              <a:t>Lots of ideas for further experiments</a:t>
-            </a:r>
-          </a:p>
-        </p:txBody>
-      </p:sp>
-      <p:sp>
-        <p:nvSpPr>
-          <p:cNvPr id="3" name="Textfeld 2">
-            <a:extLst>
-              <a:ext uri="{FF2B5EF4-FFF2-40B4-BE49-F238E27FC236}">
-                <a16:creationId xmlns:a16="http://schemas.microsoft.com/office/drawing/2014/main" id="{9777806F-28F6-3F4A-6915-B21658F6BD54}"/>
+              <a:t>Use pre-trained model on sparsity=0.9</a:t>
+            </a:r>
+          </a:p>
+        </p:txBody>
+      </p:sp>
+      <p:pic>
+        <p:nvPicPr>
+          <p:cNvPr id="2" name="Grafik 1">
+            <a:extLst>
+              <a:ext uri="{FF2B5EF4-FFF2-40B4-BE49-F238E27FC236}">
+                <a16:creationId xmlns:a16="http://schemas.microsoft.com/office/drawing/2014/main" id="{837EB077-ACE5-DC9B-A8E9-549BD038CAA6}"/>
+              </a:ext>
+            </a:extLst>
+          </p:cNvPr>
+          <p:cNvPicPr>
+            <a:picLocks noChangeAspect="1"/>
+          </p:cNvPicPr>
+          <p:nvPr/>
+        </p:nvPicPr>
+        <p:blipFill>
+          <a:blip r:embed="rId2"/>
+          <a:stretch>
+            <a:fillRect/>
+          </a:stretch>
+        </p:blipFill>
+        <p:spPr>
+          <a:xfrm>
+            <a:off x="7787142" y="172995"/>
+            <a:ext cx="3912022" cy="1853513"/>
+          </a:xfrm>
+          <a:prstGeom prst="rect">
+            <a:avLst/>
+          </a:prstGeom>
+        </p:spPr>
+      </p:pic>
+      <p:pic>
+        <p:nvPicPr>
+          <p:cNvPr id="4" name="Grafik 3">
+            <a:extLst>
+              <a:ext uri="{FF2B5EF4-FFF2-40B4-BE49-F238E27FC236}">
+                <a16:creationId xmlns:a16="http://schemas.microsoft.com/office/drawing/2014/main" id="{D00268E1-BADA-7F34-341E-DDD08FDFC786}"/>
+              </a:ext>
+            </a:extLst>
+          </p:cNvPr>
+          <p:cNvPicPr>
+            <a:picLocks noChangeAspect="1"/>
+          </p:cNvPicPr>
+          <p:nvPr/>
+        </p:nvPicPr>
+        <p:blipFill>
+          <a:blip r:embed="rId3"/>
+          <a:stretch>
+            <a:fillRect/>
+          </a:stretch>
+        </p:blipFill>
+        <p:spPr>
+          <a:xfrm>
+            <a:off x="395416" y="1238536"/>
+            <a:ext cx="3700526" cy="5239265"/>
+          </a:xfrm>
+          <a:prstGeom prst="rect">
+            <a:avLst/>
+          </a:prstGeom>
+        </p:spPr>
+      </p:pic>
+      <p:pic>
+        <p:nvPicPr>
+          <p:cNvPr id="6" name="Grafik 5">
+            <a:extLst>
+              <a:ext uri="{FF2B5EF4-FFF2-40B4-BE49-F238E27FC236}">
+                <a16:creationId xmlns:a16="http://schemas.microsoft.com/office/drawing/2014/main" id="{339B4AB7-3F5B-8A74-5141-6160325CC5CA}"/>
+              </a:ext>
+            </a:extLst>
+          </p:cNvPr>
+          <p:cNvPicPr>
+            <a:picLocks noChangeAspect="1"/>
+          </p:cNvPicPr>
+          <p:nvPr/>
+        </p:nvPicPr>
+        <p:blipFill>
+          <a:blip r:embed="rId4"/>
+          <a:stretch>
+            <a:fillRect/>
+          </a:stretch>
+        </p:blipFill>
+        <p:spPr>
+          <a:xfrm>
+            <a:off x="4226011" y="2648562"/>
+            <a:ext cx="4090086" cy="3829239"/>
+          </a:xfrm>
+          <a:prstGeom prst="rect">
+            <a:avLst/>
+          </a:prstGeom>
+        </p:spPr>
+      </p:pic>
+    </p:spTree>
+    <p:extLst>
+      <p:ext uri="{BB962C8B-B14F-4D97-AF65-F5344CB8AC3E}">
+        <p14:creationId xmlns:p14="http://schemas.microsoft.com/office/powerpoint/2010/main" val="1591056582"/>
+      </p:ext>
+    </p:extLst>
+  </p:cSld>
+  <p:clrMapOvr>
+    <a:masterClrMapping/>
+  </p:clrMapOvr>
+</p:sld>
+</file>
+
+<file path=ppt/slides/slide13.xml><?xml version="1.0" encoding="utf-8"?>
+<p:sld xmlns:a="http://schemas.openxmlformats.org/drawingml/2006/main" xmlns:r="http://schemas.openxmlformats.org/officeDocument/2006/relationships" xmlns:p="http://schemas.openxmlformats.org/presentationml/2006/main">
+  <p:cSld>
+    <p:spTree>
+      <p:nvGrpSpPr>
+        <p:cNvPr id="1" name=""/>
+        <p:cNvGrpSpPr/>
+        <p:nvPr/>
+      </p:nvGrpSpPr>
+      <p:grpSpPr>
+        <a:xfrm>
+          <a:off x="0" y="0"/>
+          <a:ext cx="0" cy="0"/>
+          <a:chOff x="0" y="0"/>
+          <a:chExt cx="0" cy="0"/>
+        </a:xfrm>
+      </p:grpSpPr>
+      <p:sp>
+        <p:nvSpPr>
+          <p:cNvPr id="5" name="Textfeld 4">
+            <a:extLst>
+              <a:ext uri="{FF2B5EF4-FFF2-40B4-BE49-F238E27FC236}">
+                <a16:creationId xmlns:a16="http://schemas.microsoft.com/office/drawing/2014/main" id="{CF75F770-AFBA-8297-A32D-C666E405A1E6}"/>
               </a:ext>
             </a:extLst>
           </p:cNvPr>
@@ -4374,8 +4512,8 @@
         </p:nvSpPr>
         <p:spPr>
           <a:xfrm>
-            <a:off x="505431" y="775695"/>
-            <a:ext cx="11442356" cy="5909310"/>
+            <a:off x="395416" y="172995"/>
+            <a:ext cx="11442357" cy="400110"/>
           </a:xfrm>
           <a:prstGeom prst="rect">
             <a:avLst/>
@@ -4388,6 +4526,45 @@
           </a:bodyPr>
           <a:lstStyle/>
           <a:p>
+            <a:r>
+              <a:rPr lang="de-DE" sz="2000" b="1"/>
+              <a:t>Game plan: </a:t>
+            </a:r>
+            <a:r>
+              <a:rPr lang="de-DE" sz="2000"/>
+              <a:t>Lots of ideas for further experiments</a:t>
+            </a:r>
+          </a:p>
+        </p:txBody>
+      </p:sp>
+      <p:sp>
+        <p:nvSpPr>
+          <p:cNvPr id="3" name="Textfeld 2">
+            <a:extLst>
+              <a:ext uri="{FF2B5EF4-FFF2-40B4-BE49-F238E27FC236}">
+                <a16:creationId xmlns:a16="http://schemas.microsoft.com/office/drawing/2014/main" id="{9777806F-28F6-3F4A-6915-B21658F6BD54}"/>
+              </a:ext>
+            </a:extLst>
+          </p:cNvPr>
+          <p:cNvSpPr txBox="1"/>
+          <p:nvPr/>
+        </p:nvSpPr>
+        <p:spPr>
+          <a:xfrm>
+            <a:off x="505431" y="676839"/>
+            <a:ext cx="11442356" cy="5909310"/>
+          </a:xfrm>
+          <a:prstGeom prst="rect">
+            <a:avLst/>
+          </a:prstGeom>
+          <a:noFill/>
+        </p:spPr>
+        <p:txBody>
+          <a:bodyPr wrap="square" rtlCol="0">
+            <a:spAutoFit/>
+          </a:bodyPr>
+          <a:lstStyle/>
+          <a:p>
             <a:pPr marL="285750" indent="-285750">
               <a:buFont typeface="Arial" panose="020B0604020202020204" pitchFamily="34" charset="0"/>
               <a:buChar char="•"/>
@@ -4420,7 +4597,7 @@
             </a:pPr>
             <a:r>
               <a:rPr lang="de-DE"/>
-              <a:t>Constistent data from 2 ESMs  10 times more training samples, 6 fields: SST, SLP, Z500, SSS, SAT, PREC</a:t>
+              <a:t>Constistent data from 2 ESMs  12 times more training samples, 6 fields: SST, SLP, Z500, SSS, SAT, PREC</a:t>
             </a:r>
           </a:p>
           <a:p>
@@ -4476,15 +4653,41 @@
             </a:pPr>
             <a:r>
               <a:rPr lang="de-DE"/>
+              <a:t>Display </a:t>
+            </a:r>
+            <a:r>
+              <a:rPr lang="de-DE" b="1"/>
+              <a:t>feature maps </a:t>
+            </a:r>
+            <a:r>
+              <a:rPr lang="de-DE"/>
+              <a:t>from various convolutions to add </a:t>
+            </a:r>
+            <a:r>
+              <a:rPr lang="de-DE" b="1"/>
+              <a:t>xAI component</a:t>
+            </a:r>
+            <a:r>
+              <a:rPr lang="de-DE"/>
+              <a:t>.</a:t>
+            </a:r>
+          </a:p>
+          <a:p>
+            <a:pPr marL="285750" indent="-285750">
+              <a:buFont typeface="Arial" panose="020B0604020202020204" pitchFamily="34" charset="0"/>
+              <a:buChar char="•"/>
+            </a:pPr>
+            <a:r>
+              <a:rPr lang="de-DE"/>
               <a:t>Include </a:t>
             </a:r>
             <a:r>
               <a:rPr lang="de-DE" b="1"/>
-              <a:t>physics-related evaluation metrics</a:t>
-            </a:r>
-            <a:r>
-              <a:rPr lang="de-DE"/>
-              <a:t>:</a:t>
+              <a:t>evaluation metrics </a:t>
+            </a:r>
+            <a:r>
+              <a:rPr lang="de-DE"/>
+              <a:t>related to physical processes and signal processing:</a:t>
             </a:r>
           </a:p>
           <a:p>
@@ -4494,23 +4697,7 @@
             </a:pPr>
             <a:r>
               <a:rPr lang="de-DE"/>
-              <a:t>Translate sparsity to </a:t>
-            </a:r>
-            <a:r>
-              <a:rPr lang="de-DE" b="1"/>
-              <a:t>minimal spatial resolution</a:t>
-            </a:r>
-            <a:r>
-              <a:rPr lang="de-DE"/>
-              <a:t>, compare to physical scales, determined by </a:t>
-            </a:r>
-            <a:r>
-              <a:rPr lang="de-DE" b="1"/>
-              <a:t>Rossby radius</a:t>
-            </a:r>
-            <a:r>
-              <a:rPr lang="de-DE"/>
-              <a:t>. Expect to loose information, if spatial resolution &lt;&lt; Rossby radius. (For sst: Eddy radius, for slp/Z500: Atmospheric scales!)</a:t>
+              <a:t>Expect to loose information, if avg. distance of sparse inputs &gt;&gt; Rossby radius. (For sst: Eddy radius, for slp/Z500: Atmospheric scales!)</a:t>
             </a:r>
           </a:p>
           <a:p>
@@ -4542,7 +4729,33 @@
             </a:r>
             <a:r>
               <a:rPr lang="de-DE"/>
-              <a:t>: slp anomaly values for re-constructed fields (y-axis) over targets (x-axis), ideally have straight line with slope 1, expect some eliptical cloud.</a:t>
+              <a:t>: slp anomaly values for re-constructed fields (y-axis) over targets (x-axis), ideally have straight line with slope 1, expect some eliptical cloud. Look for anomalies, possibly revealing </a:t>
+            </a:r>
+            <a:r>
+              <a:rPr lang="de-DE" b="1"/>
+              <a:t>artifacts at sample borders</a:t>
+            </a:r>
+            <a:r>
+              <a:rPr lang="de-DE"/>
+              <a:t>.</a:t>
+            </a:r>
+          </a:p>
+          <a:p>
+            <a:pPr marL="742950" lvl="1" indent="-285750">
+              <a:buFont typeface="Courier New" panose="02070309020205020404" pitchFamily="49" charset="0"/>
+              <a:buChar char="o"/>
+            </a:pPr>
+            <a:r>
+              <a:rPr lang="de-DE"/>
+              <a:t>Add further evaluation metrics following [Xintao et al, 2020}: </a:t>
+            </a:r>
+            <a:r>
+              <a:rPr lang="de-DE" b="1"/>
+              <a:t>Signal-to-noise ratio </a:t>
+            </a:r>
+            <a:r>
+              <a:rPr lang="de-DE"/>
+              <a:t>(SNR), peak SNR</a:t>
             </a:r>
           </a:p>
           <a:p>
@@ -4586,7 +4799,7 @@
             </a:pPr>
             <a:r>
               <a:rPr lang="de-DE"/>
-              <a:t>Other approaches:</a:t>
+              <a:t>Further extensions / different approaches:</a:t>
             </a:r>
           </a:p>
           <a:p>
@@ -4606,17 +4819,7 @@
             </a:pPr>
             <a:r>
               <a:rPr lang="de-DE"/>
-              <a:t>Graph Neural Networks</a:t>
-            </a:r>
-          </a:p>
-          <a:p>
-            <a:pPr marL="742950" lvl="1" indent="-285750">
-              <a:buFont typeface="Courier New" panose="02070309020205020404" pitchFamily="49" charset="0"/>
-              <a:buChar char="o"/>
-            </a:pPr>
-            <a:r>
-              <a:rPr lang="de-DE"/>
-              <a:t>ESC-GAN: </a:t>
+              <a:t>Graph Neural Networks, ESC-GAN: </a:t>
             </a:r>
             <a:r>
               <a:rPr lang="de-DE">
@@ -8606,7 +8809,7 @@
         <p:spPr>
           <a:xfrm>
             <a:off x="8310425" y="1607127"/>
-            <a:ext cx="2809002" cy="1200329"/>
+            <a:ext cx="2809002" cy="2308324"/>
           </a:xfrm>
           <a:prstGeom prst="rect">
             <a:avLst/>
@@ -8622,6 +8825,15 @@
             <a:r>
               <a:rPr lang="de-DE"/>
               <a:t>Clearly see training progress in predictions from untrained model and after 1, 5, 10 epochs.</a:t>
+            </a:r>
+          </a:p>
+          <a:p>
+            <a:endParaRPr lang="de-DE"/>
+          </a:p>
+          <a:p>
+            <a:r>
+              <a:rPr lang="de-DE"/>
+              <a:t>After 1 epoch, find artifacts at border of sample. No artifacts for later epochs.</a:t>
             </a:r>
           </a:p>
         </p:txBody>
@@ -8873,7 +9085,7 @@
         <p:spPr>
           <a:xfrm>
             <a:off x="8310425" y="1607127"/>
-            <a:ext cx="2809002" cy="1200329"/>
+            <a:ext cx="2809002" cy="2585323"/>
           </a:xfrm>
           <a:prstGeom prst="rect">
             <a:avLst/>
@@ -8890,6 +9102,18 @@
               <a:rPr lang="de-DE"/>
               <a:t>Clearly see training progress in predictions from untrained model and after 1, 5, 10 epochs.</a:t>
             </a:r>
+          </a:p>
+          <a:p>
+            <a:endParaRPr lang="de-DE"/>
+          </a:p>
+          <a:p>
+            <a:r>
+              <a:rPr lang="de-DE"/>
+              <a:t>After 1 epoch, find artifacts at border of sample. No artifacts for later epochs.</a:t>
+            </a:r>
+          </a:p>
+          <a:p>
+            <a:endParaRPr lang="de-DE"/>
           </a:p>
         </p:txBody>
       </p:sp>
@@ -8958,102 +9182,12 @@
           <a:chExt cx="0" cy="0"/>
         </a:xfrm>
       </p:grpSpPr>
-      <p:pic>
-        <p:nvPicPr>
-          <p:cNvPr id="2" name="Grafik 1">
-            <a:extLst>
-              <a:ext uri="{FF2B5EF4-FFF2-40B4-BE49-F238E27FC236}">
-                <a16:creationId xmlns:a16="http://schemas.microsoft.com/office/drawing/2014/main" id="{88C7AF3D-FDC6-0504-500E-4B94515858B0}"/>
-              </a:ext>
-            </a:extLst>
-          </p:cNvPr>
-          <p:cNvPicPr>
-            <a:picLocks noChangeAspect="1"/>
-          </p:cNvPicPr>
-          <p:nvPr/>
-        </p:nvPicPr>
-        <p:blipFill>
-          <a:blip r:embed="rId2"/>
-          <a:stretch>
-            <a:fillRect/>
-          </a:stretch>
-        </p:blipFill>
-        <p:spPr>
-          <a:xfrm>
-            <a:off x="4610100" y="7500"/>
-            <a:ext cx="2971800" cy="4127500"/>
-          </a:xfrm>
-          <a:prstGeom prst="rect">
-            <a:avLst/>
-          </a:prstGeom>
-        </p:spPr>
-      </p:pic>
-      <p:pic>
-        <p:nvPicPr>
-          <p:cNvPr id="3" name="Grafik 2">
-            <a:extLst>
-              <a:ext uri="{FF2B5EF4-FFF2-40B4-BE49-F238E27FC236}">
-                <a16:creationId xmlns:a16="http://schemas.microsoft.com/office/drawing/2014/main" id="{96E4B1C0-B20E-7D56-8774-5D1460FBDBE5}"/>
-              </a:ext>
-            </a:extLst>
-          </p:cNvPr>
-          <p:cNvPicPr>
-            <a:picLocks noChangeAspect="1"/>
-          </p:cNvPicPr>
-          <p:nvPr/>
-        </p:nvPicPr>
-        <p:blipFill>
-          <a:blip r:embed="rId3"/>
-          <a:stretch>
-            <a:fillRect/>
-          </a:stretch>
-        </p:blipFill>
-        <p:spPr>
-          <a:xfrm>
-            <a:off x="4610100" y="4066310"/>
-            <a:ext cx="2971800" cy="2819400"/>
-          </a:xfrm>
-          <a:prstGeom prst="rect">
-            <a:avLst/>
-          </a:prstGeom>
-        </p:spPr>
-      </p:pic>
-      <p:pic>
-        <p:nvPicPr>
-          <p:cNvPr id="5" name="Grafik 4">
-            <a:extLst>
-              <a:ext uri="{FF2B5EF4-FFF2-40B4-BE49-F238E27FC236}">
-                <a16:creationId xmlns:a16="http://schemas.microsoft.com/office/drawing/2014/main" id="{1C066422-39C0-5984-C02D-5BB705A637E6}"/>
-              </a:ext>
-            </a:extLst>
-          </p:cNvPr>
-          <p:cNvPicPr>
-            <a:picLocks noChangeAspect="1"/>
-          </p:cNvPicPr>
-          <p:nvPr/>
-        </p:nvPicPr>
-        <p:blipFill>
-          <a:blip r:embed="rId4"/>
-          <a:stretch>
-            <a:fillRect/>
-          </a:stretch>
-        </p:blipFill>
-        <p:spPr>
-          <a:xfrm>
-            <a:off x="1354282" y="7500"/>
-            <a:ext cx="2971800" cy="1320800"/>
-          </a:xfrm>
-          <a:prstGeom prst="rect">
-            <a:avLst/>
-          </a:prstGeom>
-        </p:spPr>
-      </p:pic>
-      <p:sp>
-        <p:nvSpPr>
-          <p:cNvPr id="7" name="Textfeld 6">
-            <a:extLst>
-              <a:ext uri="{FF2B5EF4-FFF2-40B4-BE49-F238E27FC236}">
-                <a16:creationId xmlns:a16="http://schemas.microsoft.com/office/drawing/2014/main" id="{A19631FC-6F47-9FCD-D26D-7A5D25D5CA95}"/>
+      <p:sp>
+        <p:nvSpPr>
+          <p:cNvPr id="4" name="Textfeld 3">
+            <a:extLst>
+              <a:ext uri="{FF2B5EF4-FFF2-40B4-BE49-F238E27FC236}">
+                <a16:creationId xmlns:a16="http://schemas.microsoft.com/office/drawing/2014/main" id="{B2EB4AD9-E0A2-FFFC-7824-30A2A61C2993}"/>
               </a:ext>
             </a:extLst>
           </p:cNvPr>
@@ -9062,8 +9196,8 @@
         </p:nvSpPr>
         <p:spPr>
           <a:xfrm>
-            <a:off x="654633" y="2369128"/>
-            <a:ext cx="2971800" cy="2585323"/>
+            <a:off x="395416" y="172995"/>
+            <a:ext cx="11442357" cy="400110"/>
           </a:xfrm>
           <a:prstGeom prst="rect">
             <a:avLst/>
@@ -9077,33 +9211,1581 @@
           <a:lstStyle/>
           <a:p>
             <a:r>
-              <a:rPr lang="de-DE"/>
-              <a:t>Show examplary </a:t>
-            </a:r>
-            <a:r>
-              <a:rPr lang="de-DE">
-                <a:solidFill>
-                  <a:srgbClr val="FF0000"/>
-                </a:solidFill>
-              </a:rPr>
-              <a:t>TRAIN</a:t>
-            </a:r>
-            <a:r>
-              <a:rPr lang="de-DE"/>
-              <a:t> target (complete and scaled data) and model prediction after 10 epochs for different sparsity settings.</a:t>
-            </a:r>
-          </a:p>
-          <a:p>
-            <a:endParaRPr lang="de-DE"/>
-          </a:p>
-          <a:p>
-            <a:r>
-              <a:rPr lang="de-DE"/>
-              <a:t>Main structure in slp anomalies is already captured for extreme sparsity (0.99).</a:t>
-            </a:r>
-          </a:p>
-        </p:txBody>
-      </p:sp>
+              <a:rPr lang="de-DE" sz="2000" b="1"/>
+              <a:t>Some words on minimal resolution, related to amount of missing values</a:t>
+            </a:r>
+          </a:p>
+        </p:txBody>
+      </p:sp>
+      <mc:AlternateContent xmlns:mc="http://schemas.openxmlformats.org/markup-compatibility/2006" xmlns:a14="http://schemas.microsoft.com/office/drawing/2010/main">
+        <mc:Choice Requires="a14">
+          <p:sp>
+            <p:nvSpPr>
+              <p:cNvPr id="6" name="Textfeld 5">
+                <a:extLst>
+                  <a:ext uri="{FF2B5EF4-FFF2-40B4-BE49-F238E27FC236}">
+                    <a16:creationId xmlns:a16="http://schemas.microsoft.com/office/drawing/2014/main" id="{3ACD287A-0F0D-CC3D-F65E-9691D697771F}"/>
+                  </a:ext>
+                </a:extLst>
+              </p:cNvPr>
+              <p:cNvSpPr txBox="1"/>
+              <p:nvPr/>
+            </p:nvSpPr>
+            <p:spPr>
+              <a:xfrm>
+                <a:off x="568411" y="1000897"/>
+                <a:ext cx="9996616" cy="646331"/>
+              </a:xfrm>
+              <a:prstGeom prst="rect">
+                <a:avLst/>
+              </a:prstGeom>
+              <a:noFill/>
+            </p:spPr>
+            <p:txBody>
+              <a:bodyPr wrap="square" rtlCol="0">
+                <a:spAutoFit/>
+              </a:bodyPr>
+              <a:lstStyle/>
+              <a:p>
+                <a:r>
+                  <a:rPr lang="de-DE"/>
+                  <a:t>We have samples on a 2.5° x 2.5° latitude-longitude grid. That gives us 72 x 144 </a:t>
+                </a:r>
+                <a14:m>
+                  <m:oMath xmlns:m="http://schemas.openxmlformats.org/officeDocument/2006/math">
+                    <m:r>
+                      <a:rPr lang="de-DE" i="1">
+                        <a:latin typeface="Cambria Math" panose="02040503050406030204" pitchFamily="18" charset="0"/>
+                        <a:ea typeface="Cambria Math" panose="02040503050406030204" pitchFamily="18" charset="0"/>
+                      </a:rPr>
+                      <m:t>≈</m:t>
+                    </m:r>
+                  </m:oMath>
+                </a14:m>
+                <a:r>
+                  <a:rPr lang="de-DE"/>
+                  <a:t> 10,000 grid points.</a:t>
+                </a:r>
+              </a:p>
+              <a:p>
+                <a:r>
+                  <a:rPr lang="de-DE"/>
+                  <a:t>The minimal spatial resolution depends on the relative amount of missing values, as follows:</a:t>
+                </a:r>
+              </a:p>
+            </p:txBody>
+          </p:sp>
+        </mc:Choice>
+        <mc:Fallback xmlns="">
+          <p:sp>
+            <p:nvSpPr>
+              <p:cNvPr id="6" name="Textfeld 5">
+                <a:extLst>
+                  <a:ext uri="{FF2B5EF4-FFF2-40B4-BE49-F238E27FC236}">
+                    <a16:creationId xmlns:a16="http://schemas.microsoft.com/office/drawing/2014/main" id="{3ACD287A-0F0D-CC3D-F65E-9691D697771F}"/>
+                  </a:ext>
+                </a:extLst>
+              </p:cNvPr>
+              <p:cNvSpPr txBox="1">
+                <a:spLocks noRot="1" noChangeAspect="1" noMove="1" noResize="1" noEditPoints="1" noAdjustHandles="1" noChangeArrowheads="1" noChangeShapeType="1" noTextEdit="1"/>
+              </p:cNvSpPr>
+              <p:nvPr/>
+            </p:nvSpPr>
+            <p:spPr>
+              <a:xfrm>
+                <a:off x="568411" y="1000897"/>
+                <a:ext cx="9996616" cy="646331"/>
+              </a:xfrm>
+              <a:prstGeom prst="rect">
+                <a:avLst/>
+              </a:prstGeom>
+              <a:blipFill>
+                <a:blip r:embed="rId2"/>
+                <a:stretch>
+                  <a:fillRect l="-508" t="-3846" b="-13462"/>
+                </a:stretch>
+              </a:blipFill>
+            </p:spPr>
+            <p:txBody>
+              <a:bodyPr/>
+              <a:lstStyle/>
+              <a:p>
+                <a:r>
+                  <a:rPr lang="de-DE">
+                    <a:noFill/>
+                  </a:rPr>
+                  <a:t> </a:t>
+                </a:r>
+              </a:p>
+            </p:txBody>
+          </p:sp>
+        </mc:Fallback>
+      </mc:AlternateContent>
+      <mc:AlternateContent xmlns:mc="http://schemas.openxmlformats.org/markup-compatibility/2006">
+        <mc:Choice xmlns:a14="http://schemas.microsoft.com/office/drawing/2010/main" Requires="a14">
+          <p:graphicFrame>
+            <p:nvGraphicFramePr>
+              <p:cNvPr id="8" name="Tabelle 8">
+                <a:extLst>
+                  <a:ext uri="{FF2B5EF4-FFF2-40B4-BE49-F238E27FC236}">
+                    <a16:creationId xmlns:a16="http://schemas.microsoft.com/office/drawing/2014/main" id="{7CC1CF43-E77B-4794-60D9-BED22DBB0C28}"/>
+                  </a:ext>
+                </a:extLst>
+              </p:cNvPr>
+              <p:cNvGraphicFramePr>
+                <a:graphicFrameLocks noGrp="1"/>
+              </p:cNvGraphicFramePr>
+              <p:nvPr>
+                <p:extLst>
+                  <p:ext uri="{D42A27DB-BD31-4B8C-83A1-F6EECF244321}">
+                    <p14:modId xmlns:p14="http://schemas.microsoft.com/office/powerpoint/2010/main" val="1307438635"/>
+                  </p:ext>
+                </p:extLst>
+              </p:nvPr>
+            </p:nvGraphicFramePr>
+            <p:xfrm>
+              <a:off x="664520" y="1955577"/>
+              <a:ext cx="5431480" cy="2946846"/>
+            </p:xfrm>
+            <a:graphic>
+              <a:graphicData uri="http://schemas.openxmlformats.org/drawingml/2006/table">
+                <a:tbl>
+                  <a:tblPr firstRow="1" bandRow="1">
+                    <a:tableStyleId>{5C22544A-7EE6-4342-B048-85BDC9FD1C3A}</a:tableStyleId>
+                  </a:tblPr>
+                  <a:tblGrid>
+                    <a:gridCol w="1053069">
+                      <a:extLst>
+                        <a:ext uri="{9D8B030D-6E8A-4147-A177-3AD203B41FA5}">
+                          <a16:colId xmlns:a16="http://schemas.microsoft.com/office/drawing/2014/main" val="1244586908"/>
+                        </a:ext>
+                      </a:extLst>
+                    </a:gridCol>
+                    <a:gridCol w="1260389">
+                      <a:extLst>
+                        <a:ext uri="{9D8B030D-6E8A-4147-A177-3AD203B41FA5}">
+                          <a16:colId xmlns:a16="http://schemas.microsoft.com/office/drawing/2014/main" val="710955370"/>
+                        </a:ext>
+                      </a:extLst>
+                    </a:gridCol>
+                    <a:gridCol w="1470454">
+                      <a:extLst>
+                        <a:ext uri="{9D8B030D-6E8A-4147-A177-3AD203B41FA5}">
+                          <a16:colId xmlns:a16="http://schemas.microsoft.com/office/drawing/2014/main" val="1282456696"/>
+                        </a:ext>
+                      </a:extLst>
+                    </a:gridCol>
+                    <a:gridCol w="1647568">
+                      <a:extLst>
+                        <a:ext uri="{9D8B030D-6E8A-4147-A177-3AD203B41FA5}">
+                          <a16:colId xmlns:a16="http://schemas.microsoft.com/office/drawing/2014/main" val="3859159606"/>
+                        </a:ext>
+                      </a:extLst>
+                    </a:gridCol>
+                  </a:tblGrid>
+                  <a:tr h="370840">
+                    <a:tc>
+                      <a:txBody>
+                        <a:bodyPr/>
+                        <a:lstStyle/>
+                        <a:p>
+                          <a:pPr algn="ctr"/>
+                          <a:r>
+                            <a:rPr lang="de-DE"/>
+                            <a:t>missing</a:t>
+                          </a:r>
+                        </a:p>
+                      </a:txBody>
+                      <a:tcPr/>
+                    </a:tc>
+                    <a:tc>
+                      <a:txBody>
+                        <a:bodyPr/>
+                        <a:lstStyle/>
+                        <a:p>
+                          <a:pPr algn="ctr"/>
+                          <a:r>
+                            <a:rPr lang="de-DE"/>
+                            <a:t># of inputs</a:t>
+                          </a:r>
+                        </a:p>
+                      </a:txBody>
+                      <a:tcPr/>
+                    </a:tc>
+                    <a:tc>
+                      <a:txBody>
+                        <a:bodyPr/>
+                        <a:lstStyle/>
+                        <a:p>
+                          <a:pPr algn="ctr"/>
+                          <a:r>
+                            <a:rPr lang="de-DE"/>
+                            <a:t>avg. distance [°]</a:t>
+                          </a:r>
+                        </a:p>
+                      </a:txBody>
+                      <a:tcPr/>
+                    </a:tc>
+                    <a:tc>
+                      <a:txBody>
+                        <a:bodyPr/>
+                        <a:lstStyle/>
+                        <a:p>
+                          <a:pPr algn="ctr"/>
+                          <a:r>
+                            <a:rPr lang="de-DE"/>
+                            <a:t>avg. distance [km]*</a:t>
+                          </a:r>
+                        </a:p>
+                      </a:txBody>
+                      <a:tcPr/>
+                    </a:tc>
+                    <a:extLst>
+                      <a:ext uri="{0D108BD9-81ED-4DB2-BD59-A6C34878D82A}">
+                        <a16:rowId xmlns:a16="http://schemas.microsoft.com/office/drawing/2014/main" val="3649107982"/>
+                      </a:ext>
+                    </a:extLst>
+                  </a:tr>
+                  <a:tr h="370840">
+                    <a:tc>
+                      <a:txBody>
+                        <a:bodyPr/>
+                        <a:lstStyle/>
+                        <a:p>
+                          <a:pPr algn="ctr"/>
+                          <a:r>
+                            <a:rPr lang="de-DE"/>
+                            <a:t>0%</a:t>
+                          </a:r>
+                        </a:p>
+                      </a:txBody>
+                      <a:tcPr/>
+                    </a:tc>
+                    <a:tc>
+                      <a:txBody>
+                        <a:bodyPr/>
+                        <a:lstStyle/>
+                        <a:p>
+                          <a:pPr algn="ctr"/>
+                          <a:r>
+                            <a:rPr lang="de-DE"/>
+                            <a:t>10,000</a:t>
+                          </a:r>
+                        </a:p>
+                      </a:txBody>
+                      <a:tcPr/>
+                    </a:tc>
+                    <a:tc>
+                      <a:txBody>
+                        <a:bodyPr/>
+                        <a:lstStyle/>
+                        <a:p>
+                          <a:pPr algn="ctr"/>
+                          <a14:m>
+                            <m:oMathPara xmlns:m="http://schemas.openxmlformats.org/officeDocument/2006/math">
+                              <m:oMathParaPr>
+                                <m:jc m:val="centerGroup"/>
+                              </m:oMathParaPr>
+                              <m:oMath xmlns:m="http://schemas.openxmlformats.org/officeDocument/2006/math">
+                                <m:r>
+                                  <a:rPr lang="de-DE" b="0" i="1">
+                                    <a:latin typeface="Cambria Math" panose="02040503050406030204" pitchFamily="18" charset="0"/>
+                                    <a:ea typeface="Cambria Math" panose="02040503050406030204" pitchFamily="18" charset="0"/>
+                                  </a:rPr>
+                                  <m:t>2.5°</m:t>
+                                </m:r>
+                              </m:oMath>
+                            </m:oMathPara>
+                          </a14:m>
+                          <a:endParaRPr lang="de-DE"/>
+                        </a:p>
+                      </a:txBody>
+                      <a:tcPr/>
+                    </a:tc>
+                    <a:tc>
+                      <a:txBody>
+                        <a:bodyPr/>
+                        <a:lstStyle/>
+                        <a:p>
+                          <a:pPr algn="ctr"/>
+                          <a:r>
+                            <a:rPr lang="de-DE"/>
+                            <a:t>278 km</a:t>
+                          </a:r>
+                        </a:p>
+                      </a:txBody>
+                      <a:tcPr/>
+                    </a:tc>
+                    <a:extLst>
+                      <a:ext uri="{0D108BD9-81ED-4DB2-BD59-A6C34878D82A}">
+                        <a16:rowId xmlns:a16="http://schemas.microsoft.com/office/drawing/2014/main" val="3671143672"/>
+                      </a:ext>
+                    </a:extLst>
+                  </a:tr>
+                  <a:tr h="370840">
+                    <a:tc>
+                      <a:txBody>
+                        <a:bodyPr/>
+                        <a:lstStyle/>
+                        <a:p>
+                          <a:pPr algn="ctr"/>
+                          <a:r>
+                            <a:rPr lang="de-DE"/>
+                            <a:t>50%</a:t>
+                          </a:r>
+                        </a:p>
+                      </a:txBody>
+                      <a:tcPr/>
+                    </a:tc>
+                    <a:tc>
+                      <a:txBody>
+                        <a:bodyPr/>
+                        <a:lstStyle/>
+                        <a:p>
+                          <a:pPr algn="ctr"/>
+                          <a:r>
+                            <a:rPr lang="de-DE"/>
+                            <a:t>5,000</a:t>
+                          </a:r>
+                        </a:p>
+                      </a:txBody>
+                      <a:tcPr/>
+                    </a:tc>
+                    <a:tc>
+                      <a:txBody>
+                        <a:bodyPr/>
+                        <a:lstStyle/>
+                        <a:p>
+                          <a:pPr algn="ctr"/>
+                          <a14:m>
+                            <m:oMathPara xmlns:m="http://schemas.openxmlformats.org/officeDocument/2006/math">
+                              <m:oMathParaPr>
+                                <m:jc m:val="centerGroup"/>
+                              </m:oMathParaPr>
+                              <m:oMath xmlns:m="http://schemas.openxmlformats.org/officeDocument/2006/math">
+                                <m:rad>
+                                  <m:radPr>
+                                    <m:degHide m:val="on"/>
+                                    <m:ctrlPr>
+                                      <a:rPr lang="de-DE" i="1">
+                                        <a:latin typeface="Cambria Math" panose="02040503050406030204" pitchFamily="18" charset="0"/>
+                                      </a:rPr>
+                                    </m:ctrlPr>
+                                  </m:radPr>
+                                  <m:deg/>
+                                  <m:e>
+                                    <m:r>
+                                      <a:rPr lang="de-DE" b="0" i="1">
+                                        <a:latin typeface="Cambria Math" panose="02040503050406030204" pitchFamily="18" charset="0"/>
+                                      </a:rPr>
+                                      <m:t>2</m:t>
+                                    </m:r>
+                                  </m:e>
+                                </m:rad>
+                                <m:r>
+                                  <a:rPr lang="de-DE" i="1">
+                                    <a:latin typeface="Cambria Math" panose="02040503050406030204" pitchFamily="18" charset="0"/>
+                                    <a:ea typeface="Cambria Math" panose="02040503050406030204" pitchFamily="18" charset="0"/>
+                                  </a:rPr>
+                                  <m:t>∙</m:t>
+                                </m:r>
+                                <m:r>
+                                  <a:rPr lang="de-DE" b="0" i="1">
+                                    <a:latin typeface="Cambria Math" panose="02040503050406030204" pitchFamily="18" charset="0"/>
+                                    <a:ea typeface="Cambria Math" panose="02040503050406030204" pitchFamily="18" charset="0"/>
+                                  </a:rPr>
+                                  <m:t>2.5°</m:t>
+                                </m:r>
+                              </m:oMath>
+                            </m:oMathPara>
+                          </a14:m>
+                          <a:endParaRPr lang="de-DE"/>
+                        </a:p>
+                      </a:txBody>
+                      <a:tcPr/>
+                    </a:tc>
+                    <a:tc>
+                      <a:txBody>
+                        <a:bodyPr/>
+                        <a:lstStyle/>
+                        <a:p>
+                          <a:pPr algn="ctr"/>
+                          <a:r>
+                            <a:rPr lang="de-DE"/>
+                            <a:t>393 km</a:t>
+                          </a:r>
+                        </a:p>
+                      </a:txBody>
+                      <a:tcPr/>
+                    </a:tc>
+                    <a:extLst>
+                      <a:ext uri="{0D108BD9-81ED-4DB2-BD59-A6C34878D82A}">
+                        <a16:rowId xmlns:a16="http://schemas.microsoft.com/office/drawing/2014/main" val="2065331838"/>
+                      </a:ext>
+                    </a:extLst>
+                  </a:tr>
+                  <a:tr h="370840">
+                    <a:tc>
+                      <a:txBody>
+                        <a:bodyPr/>
+                        <a:lstStyle/>
+                        <a:p>
+                          <a:pPr algn="ctr"/>
+                          <a:r>
+                            <a:rPr lang="de-DE"/>
+                            <a:t>75%</a:t>
+                          </a:r>
+                        </a:p>
+                      </a:txBody>
+                      <a:tcPr/>
+                    </a:tc>
+                    <a:tc>
+                      <a:txBody>
+                        <a:bodyPr/>
+                        <a:lstStyle/>
+                        <a:p>
+                          <a:pPr algn="ctr"/>
+                          <a:r>
+                            <a:rPr lang="de-DE"/>
+                            <a:t>2,500</a:t>
+                          </a:r>
+                        </a:p>
+                      </a:txBody>
+                      <a:tcPr/>
+                    </a:tc>
+                    <a:tc>
+                      <a:txBody>
+                        <a:bodyPr/>
+                        <a:lstStyle/>
+                        <a:p>
+                          <a:pPr marL="0" marR="0" lvl="0" indent="0" algn="ctr" defTabSz="914400" rtl="0" eaLnBrk="1" fontAlgn="auto" latinLnBrk="0" hangingPunct="1">
+                            <a:lnSpc>
+                              <a:spcPct val="100000"/>
+                            </a:lnSpc>
+                            <a:spcBef>
+                              <a:spcPts val="0"/>
+                            </a:spcBef>
+                            <a:spcAft>
+                              <a:spcPts val="0"/>
+                            </a:spcAft>
+                            <a:buClrTx/>
+                            <a:buSzTx/>
+                            <a:buFontTx/>
+                            <a:buNone/>
+                            <a:tabLst/>
+                            <a:defRPr/>
+                          </a:pPr>
+                          <a:r>
+                            <a:rPr lang="de-DE">
+                              <a:ea typeface="Cambria Math" panose="02040503050406030204" pitchFamily="18" charset="0"/>
+                            </a:rPr>
+                            <a:t>2</a:t>
+                          </a:r>
+                          <a:r>
+                            <a:rPr lang="de-DE" baseline="0">
+                              <a:ea typeface="Cambria Math" panose="02040503050406030204" pitchFamily="18" charset="0"/>
+                            </a:rPr>
+                            <a:t> </a:t>
+                          </a:r>
+                          <a14:m>
+                            <m:oMath xmlns:m="http://schemas.openxmlformats.org/officeDocument/2006/math">
+                              <m:r>
+                                <a:rPr lang="de-DE" i="1">
+                                  <a:latin typeface="Cambria Math" panose="02040503050406030204" pitchFamily="18" charset="0"/>
+                                  <a:ea typeface="Cambria Math" panose="02040503050406030204" pitchFamily="18" charset="0"/>
+                                </a:rPr>
+                                <m:t>∙</m:t>
+                              </m:r>
+                              <m:r>
+                                <a:rPr lang="de-DE" b="0" i="1">
+                                  <a:latin typeface="Cambria Math" panose="02040503050406030204" pitchFamily="18" charset="0"/>
+                                  <a:ea typeface="Cambria Math" panose="02040503050406030204" pitchFamily="18" charset="0"/>
+                                </a:rPr>
+                                <m:t>2.5°</m:t>
+                              </m:r>
+                            </m:oMath>
+                          </a14:m>
+                          <a:endParaRPr lang="de-DE"/>
+                        </a:p>
+                      </a:txBody>
+                      <a:tcPr/>
+                    </a:tc>
+                    <a:tc>
+                      <a:txBody>
+                        <a:bodyPr/>
+                        <a:lstStyle/>
+                        <a:p>
+                          <a:pPr algn="ctr"/>
+                          <a:r>
+                            <a:rPr lang="de-DE"/>
+                            <a:t>556 km</a:t>
+                          </a:r>
+                        </a:p>
+                      </a:txBody>
+                      <a:tcPr/>
+                    </a:tc>
+                    <a:extLst>
+                      <a:ext uri="{0D108BD9-81ED-4DB2-BD59-A6C34878D82A}">
+                        <a16:rowId xmlns:a16="http://schemas.microsoft.com/office/drawing/2014/main" val="3389969000"/>
+                      </a:ext>
+                    </a:extLst>
+                  </a:tr>
+                  <a:tr h="370840">
+                    <a:tc>
+                      <a:txBody>
+                        <a:bodyPr/>
+                        <a:lstStyle/>
+                        <a:p>
+                          <a:pPr algn="ctr"/>
+                          <a:r>
+                            <a:rPr lang="de-DE"/>
+                            <a:t>90%</a:t>
+                          </a:r>
+                        </a:p>
+                      </a:txBody>
+                      <a:tcPr/>
+                    </a:tc>
+                    <a:tc>
+                      <a:txBody>
+                        <a:bodyPr/>
+                        <a:lstStyle/>
+                        <a:p>
+                          <a:pPr algn="ctr"/>
+                          <a:r>
+                            <a:rPr lang="de-DE"/>
+                            <a:t>1,000</a:t>
+                          </a:r>
+                        </a:p>
+                      </a:txBody>
+                      <a:tcPr/>
+                    </a:tc>
+                    <a:tc>
+                      <a:txBody>
+                        <a:bodyPr/>
+                        <a:lstStyle/>
+                        <a:p>
+                          <a:pPr marL="0" marR="0" lvl="0" indent="0" algn="ctr" defTabSz="914400" rtl="0" eaLnBrk="1" fontAlgn="auto" latinLnBrk="0" hangingPunct="1">
+                            <a:lnSpc>
+                              <a:spcPct val="100000"/>
+                            </a:lnSpc>
+                            <a:spcBef>
+                              <a:spcPts val="0"/>
+                            </a:spcBef>
+                            <a:spcAft>
+                              <a:spcPts val="0"/>
+                            </a:spcAft>
+                            <a:buClrTx/>
+                            <a:buSzTx/>
+                            <a:buFontTx/>
+                            <a:buNone/>
+                            <a:tabLst/>
+                            <a:defRPr/>
+                          </a:pPr>
+                          <a14:m>
+                            <m:oMathPara xmlns:m="http://schemas.openxmlformats.org/officeDocument/2006/math">
+                              <m:oMathParaPr>
+                                <m:jc m:val="centerGroup"/>
+                              </m:oMathParaPr>
+                              <m:oMath xmlns:m="http://schemas.openxmlformats.org/officeDocument/2006/math">
+                                <m:rad>
+                                  <m:radPr>
+                                    <m:degHide m:val="on"/>
+                                    <m:ctrlPr>
+                                      <a:rPr lang="de-DE" i="1">
+                                        <a:latin typeface="Cambria Math" panose="02040503050406030204" pitchFamily="18" charset="0"/>
+                                      </a:rPr>
+                                    </m:ctrlPr>
+                                  </m:radPr>
+                                  <m:deg/>
+                                  <m:e>
+                                    <m:r>
+                                      <a:rPr lang="de-DE" b="0" i="1">
+                                        <a:latin typeface="Cambria Math" panose="02040503050406030204" pitchFamily="18" charset="0"/>
+                                      </a:rPr>
+                                      <m:t>10</m:t>
+                                    </m:r>
+                                  </m:e>
+                                </m:rad>
+                                <m:r>
+                                  <a:rPr lang="de-DE" i="1">
+                                    <a:latin typeface="Cambria Math" panose="02040503050406030204" pitchFamily="18" charset="0"/>
+                                    <a:ea typeface="Cambria Math" panose="02040503050406030204" pitchFamily="18" charset="0"/>
+                                  </a:rPr>
+                                  <m:t>∙</m:t>
+                                </m:r>
+                                <m:r>
+                                  <a:rPr lang="de-DE" b="0" i="1">
+                                    <a:latin typeface="Cambria Math" panose="02040503050406030204" pitchFamily="18" charset="0"/>
+                                    <a:ea typeface="Cambria Math" panose="02040503050406030204" pitchFamily="18" charset="0"/>
+                                  </a:rPr>
+                                  <m:t>2.5°</m:t>
+                                </m:r>
+                              </m:oMath>
+                            </m:oMathPara>
+                          </a14:m>
+                          <a:endParaRPr lang="de-DE"/>
+                        </a:p>
+                      </a:txBody>
+                      <a:tcPr/>
+                    </a:tc>
+                    <a:tc>
+                      <a:txBody>
+                        <a:bodyPr/>
+                        <a:lstStyle/>
+                        <a:p>
+                          <a:pPr algn="ctr"/>
+                          <a:r>
+                            <a:rPr lang="de-DE"/>
+                            <a:t>879 km</a:t>
+                          </a:r>
+                        </a:p>
+                      </a:txBody>
+                      <a:tcPr/>
+                    </a:tc>
+                    <a:extLst>
+                      <a:ext uri="{0D108BD9-81ED-4DB2-BD59-A6C34878D82A}">
+                        <a16:rowId xmlns:a16="http://schemas.microsoft.com/office/drawing/2014/main" val="2519567620"/>
+                      </a:ext>
+                    </a:extLst>
+                  </a:tr>
+                  <a:tr h="370840">
+                    <a:tc>
+                      <a:txBody>
+                        <a:bodyPr/>
+                        <a:lstStyle/>
+                        <a:p>
+                          <a:pPr algn="ctr"/>
+                          <a:r>
+                            <a:rPr lang="de-DE"/>
+                            <a:t>95%</a:t>
+                          </a:r>
+                        </a:p>
+                      </a:txBody>
+                      <a:tcPr/>
+                    </a:tc>
+                    <a:tc>
+                      <a:txBody>
+                        <a:bodyPr/>
+                        <a:lstStyle/>
+                        <a:p>
+                          <a:pPr algn="ctr"/>
+                          <a:r>
+                            <a:rPr lang="de-DE"/>
+                            <a:t>500</a:t>
+                          </a:r>
+                        </a:p>
+                      </a:txBody>
+                      <a:tcPr/>
+                    </a:tc>
+                    <a:tc>
+                      <a:txBody>
+                        <a:bodyPr/>
+                        <a:lstStyle/>
+                        <a:p>
+                          <a:pPr marL="0" marR="0" lvl="0" indent="0" algn="ctr" defTabSz="914400" rtl="0" eaLnBrk="1" fontAlgn="auto" latinLnBrk="0" hangingPunct="1">
+                            <a:lnSpc>
+                              <a:spcPct val="100000"/>
+                            </a:lnSpc>
+                            <a:spcBef>
+                              <a:spcPts val="0"/>
+                            </a:spcBef>
+                            <a:spcAft>
+                              <a:spcPts val="0"/>
+                            </a:spcAft>
+                            <a:buClrTx/>
+                            <a:buSzTx/>
+                            <a:buFontTx/>
+                            <a:buNone/>
+                            <a:tabLst/>
+                            <a:defRPr/>
+                          </a:pPr>
+                          <a14:m>
+                            <m:oMathPara xmlns:m="http://schemas.openxmlformats.org/officeDocument/2006/math">
+                              <m:oMathParaPr>
+                                <m:jc m:val="centerGroup"/>
+                              </m:oMathParaPr>
+                              <m:oMath xmlns:m="http://schemas.openxmlformats.org/officeDocument/2006/math">
+                                <m:rad>
+                                  <m:radPr>
+                                    <m:degHide m:val="on"/>
+                                    <m:ctrlPr>
+                                      <a:rPr lang="de-DE" i="1">
+                                        <a:latin typeface="Cambria Math" panose="02040503050406030204" pitchFamily="18" charset="0"/>
+                                      </a:rPr>
+                                    </m:ctrlPr>
+                                  </m:radPr>
+                                  <m:deg/>
+                                  <m:e>
+                                    <m:r>
+                                      <a:rPr lang="de-DE" b="0" i="1">
+                                        <a:latin typeface="Cambria Math" panose="02040503050406030204" pitchFamily="18" charset="0"/>
+                                      </a:rPr>
+                                      <m:t>20</m:t>
+                                    </m:r>
+                                  </m:e>
+                                </m:rad>
+                                <m:r>
+                                  <a:rPr lang="de-DE" i="1">
+                                    <a:latin typeface="Cambria Math" panose="02040503050406030204" pitchFamily="18" charset="0"/>
+                                    <a:ea typeface="Cambria Math" panose="02040503050406030204" pitchFamily="18" charset="0"/>
+                                  </a:rPr>
+                                  <m:t>∙</m:t>
+                                </m:r>
+                                <m:r>
+                                  <a:rPr lang="de-DE" b="0" i="1">
+                                    <a:latin typeface="Cambria Math" panose="02040503050406030204" pitchFamily="18" charset="0"/>
+                                    <a:ea typeface="Cambria Math" panose="02040503050406030204" pitchFamily="18" charset="0"/>
+                                  </a:rPr>
+                                  <m:t>2.5°</m:t>
+                                </m:r>
+                              </m:oMath>
+                            </m:oMathPara>
+                          </a14:m>
+                          <a:endParaRPr lang="de-DE"/>
+                        </a:p>
+                      </a:txBody>
+                      <a:tcPr/>
+                    </a:tc>
+                    <a:tc>
+                      <a:txBody>
+                        <a:bodyPr/>
+                        <a:lstStyle/>
+                        <a:p>
+                          <a:pPr algn="ctr"/>
+                          <a:r>
+                            <a:rPr lang="de-DE"/>
+                            <a:t>1,243 km</a:t>
+                          </a:r>
+                        </a:p>
+                      </a:txBody>
+                      <a:tcPr/>
+                    </a:tc>
+                    <a:extLst>
+                      <a:ext uri="{0D108BD9-81ED-4DB2-BD59-A6C34878D82A}">
+                        <a16:rowId xmlns:a16="http://schemas.microsoft.com/office/drawing/2014/main" val="3496902626"/>
+                      </a:ext>
+                    </a:extLst>
+                  </a:tr>
+                  <a:tr h="370840">
+                    <a:tc>
+                      <a:txBody>
+                        <a:bodyPr/>
+                        <a:lstStyle/>
+                        <a:p>
+                          <a:pPr algn="ctr"/>
+                          <a:r>
+                            <a:rPr lang="de-DE"/>
+                            <a:t>99%</a:t>
+                          </a:r>
+                        </a:p>
+                      </a:txBody>
+                      <a:tcPr/>
+                    </a:tc>
+                    <a:tc>
+                      <a:txBody>
+                        <a:bodyPr/>
+                        <a:lstStyle/>
+                        <a:p>
+                          <a:pPr algn="ctr"/>
+                          <a:r>
+                            <a:rPr lang="de-DE"/>
+                            <a:t>100</a:t>
+                          </a:r>
+                        </a:p>
+                      </a:txBody>
+                      <a:tcPr/>
+                    </a:tc>
+                    <a:tc>
+                      <a:txBody>
+                        <a:bodyPr/>
+                        <a:lstStyle/>
+                        <a:p>
+                          <a:pPr marL="0" marR="0" lvl="0" indent="0" algn="ctr" defTabSz="914400" rtl="0" eaLnBrk="1" fontAlgn="auto" latinLnBrk="0" hangingPunct="1">
+                            <a:lnSpc>
+                              <a:spcPct val="100000"/>
+                            </a:lnSpc>
+                            <a:spcBef>
+                              <a:spcPts val="0"/>
+                            </a:spcBef>
+                            <a:spcAft>
+                              <a:spcPts val="0"/>
+                            </a:spcAft>
+                            <a:buClrTx/>
+                            <a:buSzTx/>
+                            <a:buFontTx/>
+                            <a:buNone/>
+                            <a:tabLst/>
+                            <a:defRPr/>
+                          </a:pPr>
+                          <a:r>
+                            <a:rPr lang="de-DE">
+                              <a:ea typeface="Cambria Math" panose="02040503050406030204" pitchFamily="18" charset="0"/>
+                            </a:rPr>
+                            <a:t>10</a:t>
+                          </a:r>
+                          <a:r>
+                            <a:rPr lang="de-DE" baseline="0">
+                              <a:ea typeface="Cambria Math" panose="02040503050406030204" pitchFamily="18" charset="0"/>
+                            </a:rPr>
+                            <a:t> </a:t>
+                          </a:r>
+                          <a14:m>
+                            <m:oMath xmlns:m="http://schemas.openxmlformats.org/officeDocument/2006/math">
+                              <m:r>
+                                <a:rPr lang="de-DE" i="1">
+                                  <a:latin typeface="Cambria Math" panose="02040503050406030204" pitchFamily="18" charset="0"/>
+                                  <a:ea typeface="Cambria Math" panose="02040503050406030204" pitchFamily="18" charset="0"/>
+                                </a:rPr>
+                                <m:t>∙</m:t>
+                              </m:r>
+                              <m:r>
+                                <a:rPr lang="de-DE" b="0" i="1">
+                                  <a:latin typeface="Cambria Math" panose="02040503050406030204" pitchFamily="18" charset="0"/>
+                                  <a:ea typeface="Cambria Math" panose="02040503050406030204" pitchFamily="18" charset="0"/>
+                                </a:rPr>
+                                <m:t>2.5°</m:t>
+                              </m:r>
+                            </m:oMath>
+                          </a14:m>
+                          <a:endParaRPr lang="de-DE"/>
+                        </a:p>
+                      </a:txBody>
+                      <a:tcPr/>
+                    </a:tc>
+                    <a:tc>
+                      <a:txBody>
+                        <a:bodyPr/>
+                        <a:lstStyle/>
+                        <a:p>
+                          <a:pPr algn="ctr"/>
+                          <a:r>
+                            <a:rPr lang="de-DE"/>
+                            <a:t>2,780 km</a:t>
+                          </a:r>
+                        </a:p>
+                      </a:txBody>
+                      <a:tcPr/>
+                    </a:tc>
+                    <a:extLst>
+                      <a:ext uri="{0D108BD9-81ED-4DB2-BD59-A6C34878D82A}">
+                        <a16:rowId xmlns:a16="http://schemas.microsoft.com/office/drawing/2014/main" val="2499715092"/>
+                      </a:ext>
+                    </a:extLst>
+                  </a:tr>
+                </a:tbl>
+              </a:graphicData>
+            </a:graphic>
+          </p:graphicFrame>
+        </mc:Choice>
+        <mc:Fallback>
+          <p:graphicFrame>
+            <p:nvGraphicFramePr>
+              <p:cNvPr id="8" name="Tabelle 8">
+                <a:extLst>
+                  <a:ext uri="{FF2B5EF4-FFF2-40B4-BE49-F238E27FC236}">
+                    <a16:creationId xmlns:a16="http://schemas.microsoft.com/office/drawing/2014/main" id="{7CC1CF43-E77B-4794-60D9-BED22DBB0C28}"/>
+                  </a:ext>
+                </a:extLst>
+              </p:cNvPr>
+              <p:cNvGraphicFramePr>
+                <a:graphicFrameLocks noGrp="1"/>
+              </p:cNvGraphicFramePr>
+              <p:nvPr>
+                <p:extLst>
+                  <p:ext uri="{D42A27DB-BD31-4B8C-83A1-F6EECF244321}">
+                    <p14:modId xmlns:p14="http://schemas.microsoft.com/office/powerpoint/2010/main" val="1307438635"/>
+                  </p:ext>
+                </p:extLst>
+              </p:nvPr>
+            </p:nvGraphicFramePr>
+            <p:xfrm>
+              <a:off x="664520" y="1955577"/>
+              <a:ext cx="5431480" cy="2946846"/>
+            </p:xfrm>
+            <a:graphic>
+              <a:graphicData uri="http://schemas.openxmlformats.org/drawingml/2006/table">
+                <a:tbl>
+                  <a:tblPr firstRow="1" bandRow="1">
+                    <a:tableStyleId>{5C22544A-7EE6-4342-B048-85BDC9FD1C3A}</a:tableStyleId>
+                  </a:tblPr>
+                  <a:tblGrid>
+                    <a:gridCol w="1053069">
+                      <a:extLst>
+                        <a:ext uri="{9D8B030D-6E8A-4147-A177-3AD203B41FA5}">
+                          <a16:colId xmlns:a16="http://schemas.microsoft.com/office/drawing/2014/main" val="1244586908"/>
+                        </a:ext>
+                      </a:extLst>
+                    </a:gridCol>
+                    <a:gridCol w="1260389">
+                      <a:extLst>
+                        <a:ext uri="{9D8B030D-6E8A-4147-A177-3AD203B41FA5}">
+                          <a16:colId xmlns:a16="http://schemas.microsoft.com/office/drawing/2014/main" val="710955370"/>
+                        </a:ext>
+                      </a:extLst>
+                    </a:gridCol>
+                    <a:gridCol w="1470454">
+                      <a:extLst>
+                        <a:ext uri="{9D8B030D-6E8A-4147-A177-3AD203B41FA5}">
+                          <a16:colId xmlns:a16="http://schemas.microsoft.com/office/drawing/2014/main" val="1282456696"/>
+                        </a:ext>
+                      </a:extLst>
+                    </a:gridCol>
+                    <a:gridCol w="1647568">
+                      <a:extLst>
+                        <a:ext uri="{9D8B030D-6E8A-4147-A177-3AD203B41FA5}">
+                          <a16:colId xmlns:a16="http://schemas.microsoft.com/office/drawing/2014/main" val="3859159606"/>
+                        </a:ext>
+                      </a:extLst>
+                    </a:gridCol>
+                  </a:tblGrid>
+                  <a:tr h="640080">
+                    <a:tc>
+                      <a:txBody>
+                        <a:bodyPr/>
+                        <a:lstStyle/>
+                        <a:p>
+                          <a:pPr algn="ctr"/>
+                          <a:r>
+                            <a:rPr lang="de-DE"/>
+                            <a:t>missing</a:t>
+                          </a:r>
+                        </a:p>
+                      </a:txBody>
+                      <a:tcPr/>
+                    </a:tc>
+                    <a:tc>
+                      <a:txBody>
+                        <a:bodyPr/>
+                        <a:lstStyle/>
+                        <a:p>
+                          <a:pPr algn="ctr"/>
+                          <a:r>
+                            <a:rPr lang="de-DE"/>
+                            <a:t># of inputs</a:t>
+                          </a:r>
+                        </a:p>
+                      </a:txBody>
+                      <a:tcPr/>
+                    </a:tc>
+                    <a:tc>
+                      <a:txBody>
+                        <a:bodyPr/>
+                        <a:lstStyle/>
+                        <a:p>
+                          <a:pPr algn="ctr"/>
+                          <a:r>
+                            <a:rPr lang="de-DE"/>
+                            <a:t>avg. distance [°]</a:t>
+                          </a:r>
+                        </a:p>
+                      </a:txBody>
+                      <a:tcPr/>
+                    </a:tc>
+                    <a:tc>
+                      <a:txBody>
+                        <a:bodyPr/>
+                        <a:lstStyle/>
+                        <a:p>
+                          <a:pPr algn="ctr"/>
+                          <a:r>
+                            <a:rPr lang="de-DE"/>
+                            <a:t>avg. distance [km]*</a:t>
+                          </a:r>
+                        </a:p>
+                      </a:txBody>
+                      <a:tcPr/>
+                    </a:tc>
+                    <a:extLst>
+                      <a:ext uri="{0D108BD9-81ED-4DB2-BD59-A6C34878D82A}">
+                        <a16:rowId xmlns:a16="http://schemas.microsoft.com/office/drawing/2014/main" val="3649107982"/>
+                      </a:ext>
+                    </a:extLst>
+                  </a:tr>
+                  <a:tr h="370840">
+                    <a:tc>
+                      <a:txBody>
+                        <a:bodyPr/>
+                        <a:lstStyle/>
+                        <a:p>
+                          <a:pPr algn="ctr"/>
+                          <a:r>
+                            <a:rPr lang="de-DE"/>
+                            <a:t>0%</a:t>
+                          </a:r>
+                        </a:p>
+                      </a:txBody>
+                      <a:tcPr/>
+                    </a:tc>
+                    <a:tc>
+                      <a:txBody>
+                        <a:bodyPr/>
+                        <a:lstStyle/>
+                        <a:p>
+                          <a:pPr algn="ctr"/>
+                          <a:r>
+                            <a:rPr lang="de-DE"/>
+                            <a:t>10,000</a:t>
+                          </a:r>
+                        </a:p>
+                      </a:txBody>
+                      <a:tcPr/>
+                    </a:tc>
+                    <a:tc>
+                      <a:txBody>
+                        <a:bodyPr/>
+                        <a:lstStyle/>
+                        <a:p>
+                          <a:endParaRPr lang="de-DE"/>
+                        </a:p>
+                      </a:txBody>
+                      <a:tcPr>
+                        <a:blipFill>
+                          <a:blip r:embed="rId3"/>
+                          <a:stretch>
+                            <a:fillRect l="-157759" t="-182759" r="-114655" b="-555172"/>
+                          </a:stretch>
+                        </a:blipFill>
+                      </a:tcPr>
+                    </a:tc>
+                    <a:tc>
+                      <a:txBody>
+                        <a:bodyPr/>
+                        <a:lstStyle/>
+                        <a:p>
+                          <a:pPr algn="ctr"/>
+                          <a:r>
+                            <a:rPr lang="de-DE"/>
+                            <a:t>278 km</a:t>
+                          </a:r>
+                        </a:p>
+                      </a:txBody>
+                      <a:tcPr/>
+                    </a:tc>
+                    <a:extLst>
+                      <a:ext uri="{0D108BD9-81ED-4DB2-BD59-A6C34878D82A}">
+                        <a16:rowId xmlns:a16="http://schemas.microsoft.com/office/drawing/2014/main" val="3671143672"/>
+                      </a:ext>
+                    </a:extLst>
+                  </a:tr>
+                  <a:tr h="398082">
+                    <a:tc>
+                      <a:txBody>
+                        <a:bodyPr/>
+                        <a:lstStyle/>
+                        <a:p>
+                          <a:pPr algn="ctr"/>
+                          <a:r>
+                            <a:rPr lang="de-DE"/>
+                            <a:t>50%</a:t>
+                          </a:r>
+                        </a:p>
+                      </a:txBody>
+                      <a:tcPr/>
+                    </a:tc>
+                    <a:tc>
+                      <a:txBody>
+                        <a:bodyPr/>
+                        <a:lstStyle/>
+                        <a:p>
+                          <a:pPr algn="ctr"/>
+                          <a:r>
+                            <a:rPr lang="de-DE"/>
+                            <a:t>5,000</a:t>
+                          </a:r>
+                        </a:p>
+                      </a:txBody>
+                      <a:tcPr/>
+                    </a:tc>
+                    <a:tc>
+                      <a:txBody>
+                        <a:bodyPr/>
+                        <a:lstStyle/>
+                        <a:p>
+                          <a:endParaRPr lang="de-DE"/>
+                        </a:p>
+                      </a:txBody>
+                      <a:tcPr>
+                        <a:blipFill>
+                          <a:blip r:embed="rId3"/>
+                          <a:stretch>
+                            <a:fillRect l="-157759" t="-256250" r="-114655" b="-403125"/>
+                          </a:stretch>
+                        </a:blipFill>
+                      </a:tcPr>
+                    </a:tc>
+                    <a:tc>
+                      <a:txBody>
+                        <a:bodyPr/>
+                        <a:lstStyle/>
+                        <a:p>
+                          <a:pPr algn="ctr"/>
+                          <a:r>
+                            <a:rPr lang="de-DE"/>
+                            <a:t>393 km</a:t>
+                          </a:r>
+                        </a:p>
+                      </a:txBody>
+                      <a:tcPr/>
+                    </a:tc>
+                    <a:extLst>
+                      <a:ext uri="{0D108BD9-81ED-4DB2-BD59-A6C34878D82A}">
+                        <a16:rowId xmlns:a16="http://schemas.microsoft.com/office/drawing/2014/main" val="2065331838"/>
+                      </a:ext>
+                    </a:extLst>
+                  </a:tr>
+                  <a:tr h="370840">
+                    <a:tc>
+                      <a:txBody>
+                        <a:bodyPr/>
+                        <a:lstStyle/>
+                        <a:p>
+                          <a:pPr algn="ctr"/>
+                          <a:r>
+                            <a:rPr lang="de-DE"/>
+                            <a:t>75%</a:t>
+                          </a:r>
+                        </a:p>
+                      </a:txBody>
+                      <a:tcPr/>
+                    </a:tc>
+                    <a:tc>
+                      <a:txBody>
+                        <a:bodyPr/>
+                        <a:lstStyle/>
+                        <a:p>
+                          <a:pPr algn="ctr"/>
+                          <a:r>
+                            <a:rPr lang="de-DE"/>
+                            <a:t>2,500</a:t>
+                          </a:r>
+                        </a:p>
+                      </a:txBody>
+                      <a:tcPr/>
+                    </a:tc>
+                    <a:tc>
+                      <a:txBody>
+                        <a:bodyPr/>
+                        <a:lstStyle/>
+                        <a:p>
+                          <a:endParaRPr lang="de-DE"/>
+                        </a:p>
+                      </a:txBody>
+                      <a:tcPr>
+                        <a:blipFill>
+                          <a:blip r:embed="rId3"/>
+                          <a:stretch>
+                            <a:fillRect l="-157759" t="-393103" r="-114655" b="-344828"/>
+                          </a:stretch>
+                        </a:blipFill>
+                      </a:tcPr>
+                    </a:tc>
+                    <a:tc>
+                      <a:txBody>
+                        <a:bodyPr/>
+                        <a:lstStyle/>
+                        <a:p>
+                          <a:pPr algn="ctr"/>
+                          <a:r>
+                            <a:rPr lang="de-DE"/>
+                            <a:t>556 km</a:t>
+                          </a:r>
+                        </a:p>
+                      </a:txBody>
+                      <a:tcPr/>
+                    </a:tc>
+                    <a:extLst>
+                      <a:ext uri="{0D108BD9-81ED-4DB2-BD59-A6C34878D82A}">
+                        <a16:rowId xmlns:a16="http://schemas.microsoft.com/office/drawing/2014/main" val="3389969000"/>
+                      </a:ext>
+                    </a:extLst>
+                  </a:tr>
+                  <a:tr h="398082">
+                    <a:tc>
+                      <a:txBody>
+                        <a:bodyPr/>
+                        <a:lstStyle/>
+                        <a:p>
+                          <a:pPr algn="ctr"/>
+                          <a:r>
+                            <a:rPr lang="de-DE"/>
+                            <a:t>90%</a:t>
+                          </a:r>
+                        </a:p>
+                      </a:txBody>
+                      <a:tcPr/>
+                    </a:tc>
+                    <a:tc>
+                      <a:txBody>
+                        <a:bodyPr/>
+                        <a:lstStyle/>
+                        <a:p>
+                          <a:pPr algn="ctr"/>
+                          <a:r>
+                            <a:rPr lang="de-DE"/>
+                            <a:t>1,000</a:t>
+                          </a:r>
+                        </a:p>
+                      </a:txBody>
+                      <a:tcPr/>
+                    </a:tc>
+                    <a:tc>
+                      <a:txBody>
+                        <a:bodyPr/>
+                        <a:lstStyle/>
+                        <a:p>
+                          <a:endParaRPr lang="de-DE"/>
+                        </a:p>
+                      </a:txBody>
+                      <a:tcPr>
+                        <a:blipFill>
+                          <a:blip r:embed="rId3"/>
+                          <a:stretch>
+                            <a:fillRect l="-157759" t="-446875" r="-114655" b="-212500"/>
+                          </a:stretch>
+                        </a:blipFill>
+                      </a:tcPr>
+                    </a:tc>
+                    <a:tc>
+                      <a:txBody>
+                        <a:bodyPr/>
+                        <a:lstStyle/>
+                        <a:p>
+                          <a:pPr algn="ctr"/>
+                          <a:r>
+                            <a:rPr lang="de-DE"/>
+                            <a:t>879 km</a:t>
+                          </a:r>
+                        </a:p>
+                      </a:txBody>
+                      <a:tcPr/>
+                    </a:tc>
+                    <a:extLst>
+                      <a:ext uri="{0D108BD9-81ED-4DB2-BD59-A6C34878D82A}">
+                        <a16:rowId xmlns:a16="http://schemas.microsoft.com/office/drawing/2014/main" val="2519567620"/>
+                      </a:ext>
+                    </a:extLst>
+                  </a:tr>
+                  <a:tr h="398082">
+                    <a:tc>
+                      <a:txBody>
+                        <a:bodyPr/>
+                        <a:lstStyle/>
+                        <a:p>
+                          <a:pPr algn="ctr"/>
+                          <a:r>
+                            <a:rPr lang="de-DE"/>
+                            <a:t>95%</a:t>
+                          </a:r>
+                        </a:p>
+                      </a:txBody>
+                      <a:tcPr/>
+                    </a:tc>
+                    <a:tc>
+                      <a:txBody>
+                        <a:bodyPr/>
+                        <a:lstStyle/>
+                        <a:p>
+                          <a:pPr algn="ctr"/>
+                          <a:r>
+                            <a:rPr lang="de-DE"/>
+                            <a:t>500</a:t>
+                          </a:r>
+                        </a:p>
+                      </a:txBody>
+                      <a:tcPr/>
+                    </a:tc>
+                    <a:tc>
+                      <a:txBody>
+                        <a:bodyPr/>
+                        <a:lstStyle/>
+                        <a:p>
+                          <a:endParaRPr lang="de-DE"/>
+                        </a:p>
+                      </a:txBody>
+                      <a:tcPr>
+                        <a:blipFill>
+                          <a:blip r:embed="rId3"/>
+                          <a:stretch>
+                            <a:fillRect l="-157759" t="-546875" r="-114655" b="-112500"/>
+                          </a:stretch>
+                        </a:blipFill>
+                      </a:tcPr>
+                    </a:tc>
+                    <a:tc>
+                      <a:txBody>
+                        <a:bodyPr/>
+                        <a:lstStyle/>
+                        <a:p>
+                          <a:pPr algn="ctr"/>
+                          <a:r>
+                            <a:rPr lang="de-DE"/>
+                            <a:t>1,243 km</a:t>
+                          </a:r>
+                        </a:p>
+                      </a:txBody>
+                      <a:tcPr/>
+                    </a:tc>
+                    <a:extLst>
+                      <a:ext uri="{0D108BD9-81ED-4DB2-BD59-A6C34878D82A}">
+                        <a16:rowId xmlns:a16="http://schemas.microsoft.com/office/drawing/2014/main" val="3496902626"/>
+                      </a:ext>
+                    </a:extLst>
+                  </a:tr>
+                  <a:tr h="370840">
+                    <a:tc>
+                      <a:txBody>
+                        <a:bodyPr/>
+                        <a:lstStyle/>
+                        <a:p>
+                          <a:pPr algn="ctr"/>
+                          <a:r>
+                            <a:rPr lang="de-DE"/>
+                            <a:t>99%</a:t>
+                          </a:r>
+                        </a:p>
+                      </a:txBody>
+                      <a:tcPr/>
+                    </a:tc>
+                    <a:tc>
+                      <a:txBody>
+                        <a:bodyPr/>
+                        <a:lstStyle/>
+                        <a:p>
+                          <a:pPr algn="ctr"/>
+                          <a:r>
+                            <a:rPr lang="de-DE"/>
+                            <a:t>100</a:t>
+                          </a:r>
+                        </a:p>
+                      </a:txBody>
+                      <a:tcPr/>
+                    </a:tc>
+                    <a:tc>
+                      <a:txBody>
+                        <a:bodyPr/>
+                        <a:lstStyle/>
+                        <a:p>
+                          <a:endParaRPr lang="de-DE"/>
+                        </a:p>
+                      </a:txBody>
+                      <a:tcPr>
+                        <a:blipFill>
+                          <a:blip r:embed="rId3"/>
+                          <a:stretch>
+                            <a:fillRect l="-157759" t="-713793" r="-114655" b="-24138"/>
+                          </a:stretch>
+                        </a:blipFill>
+                      </a:tcPr>
+                    </a:tc>
+                    <a:tc>
+                      <a:txBody>
+                        <a:bodyPr/>
+                        <a:lstStyle/>
+                        <a:p>
+                          <a:pPr algn="ctr"/>
+                          <a:r>
+                            <a:rPr lang="de-DE"/>
+                            <a:t>2,780 km</a:t>
+                          </a:r>
+                        </a:p>
+                      </a:txBody>
+                      <a:tcPr/>
+                    </a:tc>
+                    <a:extLst>
+                      <a:ext uri="{0D108BD9-81ED-4DB2-BD59-A6C34878D82A}">
+                        <a16:rowId xmlns:a16="http://schemas.microsoft.com/office/drawing/2014/main" val="2499715092"/>
+                      </a:ext>
+                    </a:extLst>
+                  </a:tr>
+                </a:tbl>
+              </a:graphicData>
+            </a:graphic>
+          </p:graphicFrame>
+        </mc:Fallback>
+      </mc:AlternateContent>
+      <p:sp>
+        <p:nvSpPr>
+          <p:cNvPr id="9" name="Textfeld 8">
+            <a:extLst>
+              <a:ext uri="{FF2B5EF4-FFF2-40B4-BE49-F238E27FC236}">
+                <a16:creationId xmlns:a16="http://schemas.microsoft.com/office/drawing/2014/main" id="{179B610A-7CA0-52B4-2E2B-E5EF21C6AB39}"/>
+              </a:ext>
+            </a:extLst>
+          </p:cNvPr>
+          <p:cNvSpPr txBox="1"/>
+          <p:nvPr/>
+        </p:nvSpPr>
+        <p:spPr>
+          <a:xfrm>
+            <a:off x="259491" y="6038674"/>
+            <a:ext cx="2891482" cy="646331"/>
+          </a:xfrm>
+          <a:prstGeom prst="rect">
+            <a:avLst/>
+          </a:prstGeom>
+          <a:noFill/>
+        </p:spPr>
+        <p:txBody>
+          <a:bodyPr wrap="square" rtlCol="0">
+            <a:spAutoFit/>
+          </a:bodyPr>
+          <a:lstStyle/>
+          <a:p>
+            <a:r>
+              <a:rPr lang="de-DE"/>
+              <a:t>*depending on latitude, here: close to equator</a:t>
+            </a:r>
+          </a:p>
+        </p:txBody>
+      </p:sp>
+      <mc:AlternateContent xmlns:mc="http://schemas.openxmlformats.org/markup-compatibility/2006">
+        <mc:Choice xmlns:a14="http://schemas.microsoft.com/office/drawing/2010/main" Requires="a14">
+          <p:sp>
+            <p:nvSpPr>
+              <p:cNvPr id="2" name="Textfeld 1">
+                <a:extLst>
+                  <a:ext uri="{FF2B5EF4-FFF2-40B4-BE49-F238E27FC236}">
+                    <a16:creationId xmlns:a16="http://schemas.microsoft.com/office/drawing/2014/main" id="{64120B0F-29CA-FDD6-5585-93D35C711939}"/>
+                  </a:ext>
+                </a:extLst>
+              </p:cNvPr>
+              <p:cNvSpPr txBox="1"/>
+              <p:nvPr/>
+            </p:nvSpPr>
+            <p:spPr>
+              <a:xfrm>
+                <a:off x="6250460" y="1937830"/>
+                <a:ext cx="5587313" cy="2585323"/>
+              </a:xfrm>
+              <a:prstGeom prst="rect">
+                <a:avLst/>
+              </a:prstGeom>
+              <a:noFill/>
+            </p:spPr>
+            <p:txBody>
+              <a:bodyPr wrap="square" rtlCol="0">
+                <a:spAutoFit/>
+              </a:bodyPr>
+              <a:lstStyle/>
+              <a:p>
+                <a:r>
+                  <a:rPr lang="de-DE"/>
+                  <a:t>Need to put the spatial resolution in context to Rossby radius, that determines the length scale for processes within the Ocean and Atmosphere.</a:t>
+                </a:r>
+              </a:p>
+              <a:p>
+                <a:endParaRPr lang="de-DE"/>
+              </a:p>
+              <a:p>
+                <a:r>
+                  <a:rPr lang="de-DE"/>
+                  <a:t>For atmospheric processes, have R</a:t>
+                </a:r>
+                <a:r>
+                  <a:rPr lang="de-DE" baseline="-25000"/>
+                  <a:t>a</a:t>
+                </a:r>
+                <a14:m>
+                  <m:oMath xmlns:m="http://schemas.openxmlformats.org/officeDocument/2006/math">
+                    <m:r>
+                      <a:rPr lang="de-DE" i="1">
+                        <a:latin typeface="Cambria Math" panose="02040503050406030204" pitchFamily="18" charset="0"/>
+                        <a:ea typeface="Cambria Math" panose="02040503050406030204" pitchFamily="18" charset="0"/>
+                      </a:rPr>
+                      <m:t>≈</m:t>
+                    </m:r>
+                  </m:oMath>
+                </a14:m>
+                <a:r>
+                  <a:rPr lang="de-DE"/>
+                  <a:t>1,000 km, whereas</a:t>
+                </a:r>
+              </a:p>
+              <a:p>
+                <a:r>
+                  <a:rPr lang="de-DE"/>
+                  <a:t>for the Ocean, we find R</a:t>
+                </a:r>
+                <a:r>
+                  <a:rPr lang="de-DE" baseline="-25000"/>
+                  <a:t>o</a:t>
+                </a:r>
+                <a14:m>
+                  <m:oMath xmlns:m="http://schemas.openxmlformats.org/officeDocument/2006/math">
+                    <m:r>
+                      <a:rPr lang="de-DE" i="1">
+                        <a:latin typeface="Cambria Math" panose="02040503050406030204" pitchFamily="18" charset="0"/>
+                        <a:ea typeface="Cambria Math" panose="02040503050406030204" pitchFamily="18" charset="0"/>
+                      </a:rPr>
+                      <m:t>≈</m:t>
+                    </m:r>
+                  </m:oMath>
+                </a14:m>
+                <a:r>
+                  <a:rPr lang="de-DE"/>
+                  <a:t>200 km*.</a:t>
+                </a:r>
+              </a:p>
+              <a:p>
+                <a:endParaRPr lang="de-DE"/>
+              </a:p>
+              <a:p>
+                <a:r>
+                  <a:rPr lang="de-DE">
+                    <a:sym typeface="Wingdings" pitchFamily="2" charset="2"/>
+                  </a:rPr>
+                  <a:t> Expect to have trouble with reconstruction of slp samples with relative amount of missing values &gt; 95%.</a:t>
+                </a:r>
+                <a:endParaRPr lang="de-DE"/>
+              </a:p>
+            </p:txBody>
+          </p:sp>
+        </mc:Choice>
+        <mc:Fallback>
+          <p:sp>
+            <p:nvSpPr>
+              <p:cNvPr id="2" name="Textfeld 1">
+                <a:extLst>
+                  <a:ext uri="{FF2B5EF4-FFF2-40B4-BE49-F238E27FC236}">
+                    <a16:creationId xmlns:a16="http://schemas.microsoft.com/office/drawing/2014/main" id="{64120B0F-29CA-FDD6-5585-93D35C711939}"/>
+                  </a:ext>
+                </a:extLst>
+              </p:cNvPr>
+              <p:cNvSpPr txBox="1">
+                <a:spLocks noRot="1" noChangeAspect="1" noMove="1" noResize="1" noEditPoints="1" noAdjustHandles="1" noChangeArrowheads="1" noChangeShapeType="1" noTextEdit="1"/>
+              </p:cNvSpPr>
+              <p:nvPr/>
+            </p:nvSpPr>
+            <p:spPr>
+              <a:xfrm>
+                <a:off x="6250460" y="1937830"/>
+                <a:ext cx="5587313" cy="2585323"/>
+              </a:xfrm>
+              <a:prstGeom prst="rect">
+                <a:avLst/>
+              </a:prstGeom>
+              <a:blipFill>
+                <a:blip r:embed="rId4"/>
+                <a:stretch>
+                  <a:fillRect l="-907" t="-976" b="-2927"/>
+                </a:stretch>
+              </a:blipFill>
+            </p:spPr>
+            <p:txBody>
+              <a:bodyPr/>
+              <a:lstStyle/>
+              <a:p>
+                <a:r>
+                  <a:rPr lang="de-DE">
+                    <a:noFill/>
+                  </a:rPr>
+                  <a:t> </a:t>
+                </a:r>
+              </a:p>
+            </p:txBody>
+          </p:sp>
+        </mc:Fallback>
+      </mc:AlternateContent>
     </p:spTree>
     <p:extLst>
       <p:ext uri="{BB962C8B-B14F-4D97-AF65-F5344CB8AC3E}">
@@ -9136,10 +10818,10 @@
       </p:grpSpPr>
       <p:pic>
         <p:nvPicPr>
-          <p:cNvPr id="4" name="Grafik 3">
-            <a:extLst>
-              <a:ext uri="{FF2B5EF4-FFF2-40B4-BE49-F238E27FC236}">
-                <a16:creationId xmlns:a16="http://schemas.microsoft.com/office/drawing/2014/main" id="{C6337D89-8604-4876-95A3-65823FE39821}"/>
+          <p:cNvPr id="2" name="Grafik 1">
+            <a:extLst>
+              <a:ext uri="{FF2B5EF4-FFF2-40B4-BE49-F238E27FC236}">
+                <a16:creationId xmlns:a16="http://schemas.microsoft.com/office/drawing/2014/main" id="{88C7AF3D-FDC6-0504-500E-4B94515858B0}"/>
               </a:ext>
             </a:extLst>
           </p:cNvPr>
@@ -9156,8 +10838,8 @@
         </p:blipFill>
         <p:spPr>
           <a:xfrm>
-            <a:off x="1620981" y="11541"/>
-            <a:ext cx="2971800" cy="1320800"/>
+            <a:off x="4610100" y="7500"/>
+            <a:ext cx="2971800" cy="4127500"/>
           </a:xfrm>
           <a:prstGeom prst="rect">
             <a:avLst/>
@@ -9166,10 +10848,10 @@
       </p:pic>
       <p:pic>
         <p:nvPicPr>
-          <p:cNvPr id="6" name="Grafik 5">
-            <a:extLst>
-              <a:ext uri="{FF2B5EF4-FFF2-40B4-BE49-F238E27FC236}">
-                <a16:creationId xmlns:a16="http://schemas.microsoft.com/office/drawing/2014/main" id="{7F1FE91D-D56A-D4A0-2B3B-7B323B273875}"/>
+          <p:cNvPr id="3" name="Grafik 2">
+            <a:extLst>
+              <a:ext uri="{FF2B5EF4-FFF2-40B4-BE49-F238E27FC236}">
+                <a16:creationId xmlns:a16="http://schemas.microsoft.com/office/drawing/2014/main" id="{96E4B1C0-B20E-7D56-8774-5D1460FBDBE5}"/>
               </a:ext>
             </a:extLst>
           </p:cNvPr>
@@ -9186,8 +10868,8 @@
         </p:blipFill>
         <p:spPr>
           <a:xfrm>
-            <a:off x="4748646" y="11541"/>
-            <a:ext cx="2971800" cy="4064000"/>
+            <a:off x="4610100" y="4066310"/>
+            <a:ext cx="2971800" cy="2819400"/>
           </a:xfrm>
           <a:prstGeom prst="rect">
             <a:avLst/>
@@ -9196,10 +10878,10 @@
       </p:pic>
       <p:pic>
         <p:nvPicPr>
-          <p:cNvPr id="7" name="Grafik 6">
-            <a:extLst>
-              <a:ext uri="{FF2B5EF4-FFF2-40B4-BE49-F238E27FC236}">
-                <a16:creationId xmlns:a16="http://schemas.microsoft.com/office/drawing/2014/main" id="{1DE14BB0-35CE-7624-67B1-E3184B947DF2}"/>
+          <p:cNvPr id="5" name="Grafik 4">
+            <a:extLst>
+              <a:ext uri="{FF2B5EF4-FFF2-40B4-BE49-F238E27FC236}">
+                <a16:creationId xmlns:a16="http://schemas.microsoft.com/office/drawing/2014/main" id="{1C066422-39C0-5984-C02D-5BB705A637E6}"/>
               </a:ext>
             </a:extLst>
           </p:cNvPr>
@@ -9216,8 +10898,8 @@
         </p:blipFill>
         <p:spPr>
           <a:xfrm>
-            <a:off x="4748646" y="4054753"/>
-            <a:ext cx="2971800" cy="2794000"/>
+            <a:off x="1354282" y="7500"/>
+            <a:ext cx="2971800" cy="1320800"/>
           </a:xfrm>
           <a:prstGeom prst="rect">
             <a:avLst/>
@@ -9226,10 +10908,10 @@
       </p:pic>
       <p:sp>
         <p:nvSpPr>
-          <p:cNvPr id="8" name="Textfeld 7">
-            <a:extLst>
-              <a:ext uri="{FF2B5EF4-FFF2-40B4-BE49-F238E27FC236}">
-                <a16:creationId xmlns:a16="http://schemas.microsoft.com/office/drawing/2014/main" id="{88153A3A-5B45-EA3C-FD64-7036DFA9C11C}"/>
+          <p:cNvPr id="7" name="Textfeld 6">
+            <a:extLst>
+              <a:ext uri="{FF2B5EF4-FFF2-40B4-BE49-F238E27FC236}">
+                <a16:creationId xmlns:a16="http://schemas.microsoft.com/office/drawing/2014/main" id="{A19631FC-6F47-9FCD-D26D-7A5D25D5CA95}"/>
               </a:ext>
             </a:extLst>
           </p:cNvPr>
@@ -9238,7 +10920,7 @@
         </p:nvSpPr>
         <p:spPr>
           <a:xfrm>
-            <a:off x="1465116" y="3228110"/>
+            <a:off x="654633" y="2369128"/>
             <a:ext cx="2971800" cy="2585323"/>
           </a:xfrm>
           <a:prstGeom prst="rect">
@@ -9262,7 +10944,7 @@
                   <a:srgbClr val="FF0000"/>
                 </a:solidFill>
               </a:rPr>
-              <a:t>VALIDATION</a:t>
+              <a:t>TRAIN</a:t>
             </a:r>
             <a:r>
               <a:rPr lang="de-DE"/>
@@ -9275,7 +10957,7 @@
           <a:p>
             <a:r>
               <a:rPr lang="de-DE"/>
-              <a:t>Main structure in slp anomalies is only captured from sparsity &gt;= 0.95.</a:t>
+              <a:t>Main structure in slp anomalies is already captured for extreme sparsity (0.99).</a:t>
             </a:r>
           </a:p>
         </p:txBody>
@@ -9283,7 +10965,7 @@
     </p:spTree>
     <p:extLst>
       <p:ext uri="{BB962C8B-B14F-4D97-AF65-F5344CB8AC3E}">
-        <p14:creationId xmlns:p14="http://schemas.microsoft.com/office/powerpoint/2010/main" val="2505157189"/>
+        <p14:creationId xmlns:p14="http://schemas.microsoft.com/office/powerpoint/2010/main" val="1376636317"/>
       </p:ext>
     </p:extLst>
   </p:cSld>

</xml_diff>

<commit_message>
Update presentation: Add ideas from PI meeting Jan 20th, 2023
</commit_message>
<xml_diff>
--- a/presentations/unet_4conv_slp_realworld.pptx
+++ b/presentations/unet_4conv_slp_realworld.pptx
@@ -5,7 +5,7 @@
     <p:sldMasterId id="2147483648" r:id="rId1"/>
   </p:sldMasterIdLst>
   <p:notesMasterIdLst>
-    <p:notesMasterId r:id="rId15"/>
+    <p:notesMasterId r:id="rId16"/>
   </p:notesMasterIdLst>
   <p:sldIdLst>
     <p:sldId id="256" r:id="rId2"/>
@@ -21,6 +21,7 @@
     <p:sldId id="265" r:id="rId12"/>
     <p:sldId id="266" r:id="rId13"/>
     <p:sldId id="268" r:id="rId14"/>
+    <p:sldId id="270" r:id="rId15"/>
   </p:sldIdLst>
   <p:sldSz cx="12192000" cy="6858000"/>
   <p:notesSz cx="6858000" cy="9144000"/>
@@ -208,7 +209,7 @@
           </a:lstStyle>
           <a:p>
             <a:fld id="{B35BE548-DE05-8149-9395-93E03CC73C13}" type="datetimeFigureOut">
-              <a:t>19.01.23</a:t>
+              <a:t>20.01.23</a:t>
             </a:fld>
             <a:endParaRPr lang="de-DE"/>
           </a:p>
@@ -787,7 +788,7 @@
           <a:lstStyle/>
           <a:p>
             <a:fld id="{F7A3446A-3617-0E4A-A439-6DD0C73FFDE1}" type="datetimeFigureOut">
-              <a:t>19.01.23</a:t>
+              <a:t>20.01.23</a:t>
             </a:fld>
             <a:endParaRPr lang="de-DE"/>
           </a:p>
@@ -983,7 +984,7 @@
           <a:lstStyle/>
           <a:p>
             <a:fld id="{F7A3446A-3617-0E4A-A439-6DD0C73FFDE1}" type="datetimeFigureOut">
-              <a:t>19.01.23</a:t>
+              <a:t>20.01.23</a:t>
             </a:fld>
             <a:endParaRPr lang="de-DE"/>
           </a:p>
@@ -1189,7 +1190,7 @@
           <a:lstStyle/>
           <a:p>
             <a:fld id="{F7A3446A-3617-0E4A-A439-6DD0C73FFDE1}" type="datetimeFigureOut">
-              <a:t>19.01.23</a:t>
+              <a:t>20.01.23</a:t>
             </a:fld>
             <a:endParaRPr lang="de-DE"/>
           </a:p>
@@ -1385,7 +1386,7 @@
           <a:lstStyle/>
           <a:p>
             <a:fld id="{F7A3446A-3617-0E4A-A439-6DD0C73FFDE1}" type="datetimeFigureOut">
-              <a:t>19.01.23</a:t>
+              <a:t>20.01.23</a:t>
             </a:fld>
             <a:endParaRPr lang="de-DE"/>
           </a:p>
@@ -1658,7 +1659,7 @@
           <a:lstStyle/>
           <a:p>
             <a:fld id="{F7A3446A-3617-0E4A-A439-6DD0C73FFDE1}" type="datetimeFigureOut">
-              <a:t>19.01.23</a:t>
+              <a:t>20.01.23</a:t>
             </a:fld>
             <a:endParaRPr lang="de-DE"/>
           </a:p>
@@ -1921,7 +1922,7 @@
           <a:lstStyle/>
           <a:p>
             <a:fld id="{F7A3446A-3617-0E4A-A439-6DD0C73FFDE1}" type="datetimeFigureOut">
-              <a:t>19.01.23</a:t>
+              <a:t>20.01.23</a:t>
             </a:fld>
             <a:endParaRPr lang="de-DE"/>
           </a:p>
@@ -2331,7 +2332,7 @@
           <a:lstStyle/>
           <a:p>
             <a:fld id="{F7A3446A-3617-0E4A-A439-6DD0C73FFDE1}" type="datetimeFigureOut">
-              <a:t>19.01.23</a:t>
+              <a:t>20.01.23</a:t>
             </a:fld>
             <a:endParaRPr lang="de-DE"/>
           </a:p>
@@ -2470,7 +2471,7 @@
           <a:lstStyle/>
           <a:p>
             <a:fld id="{F7A3446A-3617-0E4A-A439-6DD0C73FFDE1}" type="datetimeFigureOut">
-              <a:t>19.01.23</a:t>
+              <a:t>20.01.23</a:t>
             </a:fld>
             <a:endParaRPr lang="de-DE"/>
           </a:p>
@@ -2581,7 +2582,7 @@
           <a:lstStyle/>
           <a:p>
             <a:fld id="{F7A3446A-3617-0E4A-A439-6DD0C73FFDE1}" type="datetimeFigureOut">
-              <a:t>19.01.23</a:t>
+              <a:t>20.01.23</a:t>
             </a:fld>
             <a:endParaRPr lang="de-DE"/>
           </a:p>
@@ -2890,7 +2891,7 @@
           <a:lstStyle/>
           <a:p>
             <a:fld id="{F7A3446A-3617-0E4A-A439-6DD0C73FFDE1}" type="datetimeFigureOut">
-              <a:t>19.01.23</a:t>
+              <a:t>20.01.23</a:t>
             </a:fld>
             <a:endParaRPr lang="de-DE"/>
           </a:p>
@@ -3176,7 +3177,7 @@
           <a:lstStyle/>
           <a:p>
             <a:fld id="{F7A3446A-3617-0E4A-A439-6DD0C73FFDE1}" type="datetimeFigureOut">
-              <a:t>19.01.23</a:t>
+              <a:t>20.01.23</a:t>
             </a:fld>
             <a:endParaRPr lang="de-DE"/>
           </a:p>
@@ -3415,7 +3416,7 @@
           </a:lstStyle>
           <a:p>
             <a:fld id="{F7A3446A-3617-0E4A-A439-6DD0C73FFDE1}" type="datetimeFigureOut">
-              <a:t>19.01.23</a:t>
+              <a:t>20.01.23</a:t>
             </a:fld>
             <a:endParaRPr lang="de-DE"/>
           </a:p>
@@ -4512,7 +4513,7 @@
         </p:nvSpPr>
         <p:spPr>
           <a:xfrm>
-            <a:off x="395416" y="172995"/>
+            <a:off x="395416" y="65415"/>
             <a:ext cx="11442357" cy="400110"/>
           </a:xfrm>
           <a:prstGeom prst="rect">
@@ -4551,8 +4552,8 @@
         </p:nvSpPr>
         <p:spPr>
           <a:xfrm>
-            <a:off x="505431" y="676839"/>
-            <a:ext cx="11442356" cy="5909310"/>
+            <a:off x="505431" y="440163"/>
+            <a:ext cx="11442356" cy="6463308"/>
           </a:xfrm>
           <a:prstGeom prst="rect">
             <a:avLst/>
@@ -4665,11 +4666,11 @@
             </a:r>
             <a:r>
               <a:rPr lang="de-DE" b="1"/>
-              <a:t>xAI component</a:t>
-            </a:r>
-            <a:r>
-              <a:rPr lang="de-DE"/>
-              <a:t>.</a:t>
+              <a:t>xAI component: </a:t>
+            </a:r>
+            <a:r>
+              <a:rPr lang="de-DE"/>
+              <a:t>Do we find different spatial scales accorging to latitude? That could prove, that models learns cos(lat) dependency.</a:t>
             </a:r>
           </a:p>
           <a:p>
@@ -4747,6 +4748,24 @@
             </a:pPr>
             <a:r>
               <a:rPr lang="de-DE"/>
+              <a:t>Also check </a:t>
+            </a:r>
+            <a:r>
+              <a:rPr lang="de-DE" b="1"/>
+              <a:t>histograms of slp anomalies </a:t>
+            </a:r>
+            <a:r>
+              <a:rPr lang="de-DE"/>
+              <a:t>for targets vs. predictions, to check if model captures physics.</a:t>
+            </a:r>
+          </a:p>
+          <a:p>
+            <a:pPr marL="742950" lvl="1" indent="-285750">
+              <a:buFont typeface="Courier New" panose="02070309020205020404" pitchFamily="49" charset="0"/>
+              <a:buChar char="o"/>
+            </a:pPr>
+            <a:r>
+              <a:rPr lang="de-DE"/>
               <a:t>Add further evaluation metrics following [Xiantao et al, 2020}: </a:t>
             </a:r>
             <a:r>
@@ -4848,6 +4867,343 @@
     <p:extLst>
       <p:ext uri="{BB962C8B-B14F-4D97-AF65-F5344CB8AC3E}">
         <p14:creationId xmlns:p14="http://schemas.microsoft.com/office/powerpoint/2010/main" val="504235501"/>
+      </p:ext>
+    </p:extLst>
+  </p:cSld>
+  <p:clrMapOvr>
+    <a:masterClrMapping/>
+  </p:clrMapOvr>
+</p:sld>
+</file>
+
+<file path=ppt/slides/slide14.xml><?xml version="1.0" encoding="utf-8"?>
+<p:sld xmlns:a="http://schemas.openxmlformats.org/drawingml/2006/main" xmlns:r="http://schemas.openxmlformats.org/officeDocument/2006/relationships" xmlns:p="http://schemas.openxmlformats.org/presentationml/2006/main">
+  <p:cSld>
+    <p:spTree>
+      <p:nvGrpSpPr>
+        <p:cNvPr id="1" name=""/>
+        <p:cNvGrpSpPr/>
+        <p:nvPr/>
+      </p:nvGrpSpPr>
+      <p:grpSpPr>
+        <a:xfrm>
+          <a:off x="0" y="0"/>
+          <a:ext cx="0" cy="0"/>
+          <a:chOff x="0" y="0"/>
+          <a:chExt cx="0" cy="0"/>
+        </a:xfrm>
+      </p:grpSpPr>
+      <p:sp>
+        <p:nvSpPr>
+          <p:cNvPr id="5" name="Textfeld 4">
+            <a:extLst>
+              <a:ext uri="{FF2B5EF4-FFF2-40B4-BE49-F238E27FC236}">
+                <a16:creationId xmlns:a16="http://schemas.microsoft.com/office/drawing/2014/main" id="{CF75F770-AFBA-8297-A32D-C666E405A1E6}"/>
+              </a:ext>
+            </a:extLst>
+          </p:cNvPr>
+          <p:cNvSpPr txBox="1"/>
+          <p:nvPr/>
+        </p:nvSpPr>
+        <p:spPr>
+          <a:xfrm>
+            <a:off x="395416" y="76173"/>
+            <a:ext cx="11442357" cy="400110"/>
+          </a:xfrm>
+          <a:prstGeom prst="rect">
+            <a:avLst/>
+          </a:prstGeom>
+          <a:noFill/>
+        </p:spPr>
+        <p:txBody>
+          <a:bodyPr wrap="square" rtlCol="0">
+            <a:spAutoFit/>
+          </a:bodyPr>
+          <a:lstStyle/>
+          <a:p>
+            <a:r>
+              <a:rPr lang="de-DE" sz="2000" b="1"/>
+              <a:t>Remarks from PI-Meeting </a:t>
+            </a:r>
+            <a:r>
+              <a:rPr lang="de-DE" sz="2000"/>
+              <a:t>(Jan 20th, 2023): Even more ideas…</a:t>
+            </a:r>
+          </a:p>
+        </p:txBody>
+      </p:sp>
+      <p:sp>
+        <p:nvSpPr>
+          <p:cNvPr id="3" name="Textfeld 2">
+            <a:extLst>
+              <a:ext uri="{FF2B5EF4-FFF2-40B4-BE49-F238E27FC236}">
+                <a16:creationId xmlns:a16="http://schemas.microsoft.com/office/drawing/2014/main" id="{9777806F-28F6-3F4A-6915-B21658F6BD54}"/>
+              </a:ext>
+            </a:extLst>
+          </p:cNvPr>
+          <p:cNvSpPr txBox="1"/>
+          <p:nvPr/>
+        </p:nvSpPr>
+        <p:spPr>
+          <a:xfrm>
+            <a:off x="505430" y="450921"/>
+            <a:ext cx="11442357" cy="6494085"/>
+          </a:xfrm>
+          <a:prstGeom prst="rect">
+            <a:avLst/>
+          </a:prstGeom>
+          <a:noFill/>
+        </p:spPr>
+        <p:txBody>
+          <a:bodyPr wrap="square" rtlCol="0">
+            <a:spAutoFit/>
+          </a:bodyPr>
+          <a:lstStyle/>
+          <a:p>
+            <a:pPr marL="285750" indent="-285750">
+              <a:buFont typeface="Arial" panose="020B0604020202020204" pitchFamily="34" charset="0"/>
+              <a:buChar char="•"/>
+            </a:pPr>
+            <a:r>
+              <a:rPr lang="de-DE" sz="1600"/>
+              <a:t>Use realistic sampling for missing_mask, rather than random:</a:t>
+            </a:r>
+          </a:p>
+          <a:p>
+            <a:pPr marL="742950" lvl="1" indent="-285750">
+              <a:buFont typeface="Courier New" panose="02070309020205020404" pitchFamily="49" charset="0"/>
+              <a:buChar char="o"/>
+            </a:pPr>
+            <a:r>
+              <a:rPr lang="de-DE" sz="1600"/>
+              <a:t> </a:t>
+            </a:r>
+            <a:r>
+              <a:rPr lang="de-DE" sz="1600" b="1"/>
+              <a:t>slp</a:t>
+            </a:r>
+            <a:r>
+              <a:rPr lang="de-DE" sz="1600"/>
+              <a:t> is measured from ships </a:t>
+            </a:r>
+            <a:r>
+              <a:rPr lang="de-DE" sz="1600">
+                <a:sym typeface="Wingdings" pitchFamily="2" charset="2"/>
+              </a:rPr>
+              <a:t> favors variable missing_mask. Plus have fixed stations, preferably over land in the Northern hemisphere  Should reflect that in sampling of inputs, to have realistic sampling instead of random.</a:t>
+            </a:r>
+          </a:p>
+          <a:p>
+            <a:pPr marL="742950" lvl="1" indent="-285750">
+              <a:buFont typeface="Courier New" panose="02070309020205020404" pitchFamily="49" charset="0"/>
+              <a:buChar char="o"/>
+            </a:pPr>
+            <a:r>
+              <a:rPr lang="de-DE" sz="1600" b="1">
+                <a:sym typeface="Wingdings" pitchFamily="2" charset="2"/>
+              </a:rPr>
+              <a:t>sst</a:t>
+            </a:r>
+            <a:r>
+              <a:rPr lang="de-DE" sz="1600">
+                <a:sym typeface="Wingdings" pitchFamily="2" charset="2"/>
+              </a:rPr>
+              <a:t> is hindered by cloud coverage, average coverage of 20% (see </a:t>
+            </a:r>
+            <a:r>
+              <a:rPr lang="de-DE" sz="1600">
+                <a:hlinkClick r:id="rId2"/>
+              </a:rPr>
+              <a:t>http://www-das.uwyo.edu/~geerts/cwx/notes/chap11/sst0026.gif</a:t>
+            </a:r>
+            <a:r>
+              <a:rPr lang="de-DE" sz="1600"/>
+              <a:t> --&gt; Typical Satellite Sparsity</a:t>
+            </a:r>
+            <a:r>
+              <a:rPr lang="de-DE" sz="1600">
+                <a:sym typeface="Wingdings" pitchFamily="2" charset="2"/>
+              </a:rPr>
+              <a:t>). Realistic sampling would have missing regions or blobs, instead of randomly missing grid points. But clouds move fast, compared to changes in sst. Martin‘s advice: Check related work from satellite imagery community. They might have some imputation strategies or ways to eliminate clouds?!</a:t>
+            </a:r>
+            <a:r>
+              <a:rPr lang="de-DE" sz="1600"/>
+              <a:t> </a:t>
+            </a:r>
+          </a:p>
+          <a:p>
+            <a:pPr marL="742950" lvl="1" indent="-285750">
+              <a:buFont typeface="Courier New" panose="02070309020205020404" pitchFamily="49" charset="0"/>
+              <a:buChar char="o"/>
+            </a:pPr>
+            <a:r>
+              <a:rPr lang="de-DE" sz="1600"/>
+              <a:t>Also try </a:t>
+            </a:r>
+            <a:r>
+              <a:rPr lang="de-DE" sz="1600" b="1"/>
+              <a:t>latitude-dependent missing_mask</a:t>
+            </a:r>
+            <a:r>
+              <a:rPr lang="de-DE" sz="1600"/>
+              <a:t>,  to have equal weight on equal spatial scales.</a:t>
+            </a:r>
+          </a:p>
+          <a:p>
+            <a:pPr marL="285750" indent="-285750">
+              <a:buFont typeface="Arial" panose="020B0604020202020204" pitchFamily="34" charset="0"/>
+              <a:buChar char="•"/>
+            </a:pPr>
+            <a:r>
+              <a:rPr lang="de-DE" sz="1600"/>
+              <a:t>Right now, have only single input channel. Could extend to have </a:t>
+            </a:r>
+            <a:r>
+              <a:rPr lang="de-DE" sz="1600" b="1"/>
+              <a:t>multi-channel inputs</a:t>
+            </a:r>
+            <a:r>
+              <a:rPr lang="de-DE" sz="1600"/>
+              <a:t>. Either by adding time dimension (feed resent XX months of slp to infer current slp) or by adding further features (e.g. infer sst from slp and Z500).</a:t>
+            </a:r>
+          </a:p>
+          <a:p>
+            <a:pPr marL="285750" indent="-285750">
+              <a:buFont typeface="Arial" panose="020B0604020202020204" pitchFamily="34" charset="0"/>
+              <a:buChar char="•"/>
+            </a:pPr>
+            <a:r>
+              <a:rPr lang="de-DE" sz="1600"/>
+              <a:t>As Martin mentioned: Rossby radius determines some minimal spatial scale for geostrophy (?), some balance with coriolis force (?). Atmospheric processes mostly happen on much larger scales (multiples of Rossby radius). However, Rossby radius is good physical interpretation link!</a:t>
+            </a:r>
+          </a:p>
+          <a:p>
+            <a:pPr marL="285750" indent="-285750">
+              <a:buFont typeface="Arial" panose="020B0604020202020204" pitchFamily="34" charset="0"/>
+              <a:buChar char="•"/>
+            </a:pPr>
+            <a:r>
+              <a:rPr lang="de-DE" sz="1600"/>
+              <a:t>Additionally, it is of interest, how many degrees of freedom we have in slp fields, related to spatial autocorrelation. In other words: If we miss 95% of the inputs, we probably don‘t lose 95% of the contained information, due to redundancy and (auto)correlation. But where is the limit? How many inputs do we need, to restore „full“ information? As estimate, look for the number of independent EOF modes.</a:t>
+            </a:r>
+          </a:p>
+          <a:p>
+            <a:pPr marL="285750" indent="-285750">
+              <a:buFont typeface="Arial" panose="020B0604020202020204" pitchFamily="34" charset="0"/>
+              <a:buChar char="•"/>
+            </a:pPr>
+            <a:r>
+              <a:rPr lang="de-DE" sz="1600"/>
+              <a:t>That directly leads to </a:t>
+            </a:r>
+            <a:r>
+              <a:rPr lang="de-DE" sz="1600" b="1"/>
+              <a:t>another important xAI application</a:t>
+            </a:r>
+            <a:r>
+              <a:rPr lang="de-DE" sz="1600"/>
+              <a:t>: Which are the most relevant grid points for global reconstruction? In other words: Where do we need to measure, to significantly improve prediction quality – in a data-driven way? </a:t>
+            </a:r>
+            <a:r>
+              <a:rPr lang="de-DE" sz="1600">
+                <a:sym typeface="Wingdings" pitchFamily="2" charset="2"/>
+              </a:rPr>
+              <a:t> “Sampling policy!“</a:t>
+            </a:r>
+          </a:p>
+          <a:p>
+            <a:pPr marL="285750" indent="-285750">
+              <a:buFont typeface="Arial" panose="020B0604020202020204" pitchFamily="34" charset="0"/>
+              <a:buChar char="•"/>
+            </a:pPr>
+            <a:r>
+              <a:rPr lang="de-DE" sz="1600">
+                <a:sym typeface="Wingdings" pitchFamily="2" charset="2"/>
+              </a:rPr>
+              <a:t>Right now, we have some 2D rectangle projection of the World. That fits the needs of a CNN. But wouldn‘t it be better, to have some </a:t>
+            </a:r>
+            <a:r>
+              <a:rPr lang="de-DE" sz="1600" b="1">
+                <a:sym typeface="Wingdings" pitchFamily="2" charset="2"/>
+              </a:rPr>
+              <a:t>elliptical projection </a:t>
+            </a:r>
+            <a:r>
+              <a:rPr lang="de-DE" sz="1600">
+                <a:sym typeface="Wingdings" pitchFamily="2" charset="2"/>
+              </a:rPr>
+              <a:t>with less inputs, the higher the latitude? Fill the borders with zeros, to have 2D rectangle again. Or further extension: Have </a:t>
+            </a:r>
+            <a:r>
+              <a:rPr lang="de-DE" sz="1600" b="1">
+                <a:sym typeface="Wingdings" pitchFamily="2" charset="2"/>
+              </a:rPr>
+              <a:t>periodic border conditions</a:t>
+            </a:r>
+            <a:r>
+              <a:rPr lang="de-DE" sz="1600">
+                <a:sym typeface="Wingdings" pitchFamily="2" charset="2"/>
+              </a:rPr>
+              <a:t>, but that could be tricky and more an application for a Graph Neural Network.</a:t>
+            </a:r>
+          </a:p>
+          <a:p>
+            <a:pPr marL="285750" indent="-285750">
+              <a:buFont typeface="Arial" panose="020B0604020202020204" pitchFamily="34" charset="0"/>
+              <a:buChar char="•"/>
+            </a:pPr>
+            <a:r>
+              <a:rPr lang="de-DE" sz="1600">
+                <a:sym typeface="Wingdings" pitchFamily="2" charset="2"/>
+              </a:rPr>
+              <a:t>Could also try U-Net on </a:t>
+            </a:r>
+            <a:r>
+              <a:rPr lang="de-DE" sz="1600" b="1">
+                <a:sym typeface="Wingdings" pitchFamily="2" charset="2"/>
+              </a:rPr>
+              <a:t>ssh data</a:t>
+            </a:r>
+            <a:r>
+              <a:rPr lang="de-DE" sz="1600">
+                <a:sym typeface="Wingdings" pitchFamily="2" charset="2"/>
+              </a:rPr>
+              <a:t>, e.g. from high-resolution NEMO run. Find many more eddies on smaller scales, compared to atmospheric cyclones. Could then work with only an extract, to neglect grid distortion with latitude. (</a:t>
+            </a:r>
+            <a:r>
+              <a:rPr lang="de-DE" sz="1600">
+                <a:sym typeface="Wingdings" pitchFamily="2" charset="2"/>
+                <a:hlinkClick r:id="rId3"/>
+              </a:rPr>
+              <a:t>https://academiccommons.columbia.edu/doi/10.7916/d8-bngk-r215</a:t>
+            </a:r>
+            <a:r>
+              <a:rPr lang="de-DE" sz="1600">
+                <a:sym typeface="Wingdings" pitchFamily="2" charset="2"/>
+              </a:rPr>
+              <a:t> and </a:t>
+            </a:r>
+            <a:r>
+              <a:rPr lang="de-DE" sz="1600">
+                <a:sym typeface="Wingdings" pitchFamily="2" charset="2"/>
+                <a:hlinkClick r:id="rId4"/>
+              </a:rPr>
+              <a:t>https://github.com/rabernat/local_stencil_ml_examples/</a:t>
+            </a:r>
+            <a:r>
+              <a:rPr lang="de-DE" sz="1600">
+                <a:sym typeface="Wingdings" pitchFamily="2" charset="2"/>
+              </a:rPr>
+              <a:t>)</a:t>
+            </a:r>
+            <a:endParaRPr lang="de-DE"/>
+          </a:p>
+        </p:txBody>
+      </p:sp>
+    </p:spTree>
+    <p:extLst>
+      <p:ext uri="{BB962C8B-B14F-4D97-AF65-F5344CB8AC3E}">
+        <p14:creationId xmlns:p14="http://schemas.microsoft.com/office/powerpoint/2010/main" val="133921739"/>
       </p:ext>
     </p:extLst>
   </p:cSld>
@@ -4982,7 +5338,7 @@
             </a:r>
             <a:r>
               <a:rPr lang="de-DE"/>
-              <a:t> from [0.99, 0.9, 0.95, 0.75, 0.5], over 10 epochs.</a:t>
+              <a:t> from [0.99, 0.95, 0.9, 0.75, 0.5], over 10 epochs.</a:t>
             </a:r>
           </a:p>
           <a:p>
@@ -5070,6 +5426,93 @@
             <a:r>
               <a:rPr lang="de-DE" sz="2000" b="1"/>
               <a:t>Get an impression of inputs and targets: What do we deal with?</a:t>
+            </a:r>
+          </a:p>
+        </p:txBody>
+      </p:sp>
+      <p:sp>
+        <p:nvSpPr>
+          <p:cNvPr id="4" name="Rechteck 3">
+            <a:extLst>
+              <a:ext uri="{FF2B5EF4-FFF2-40B4-BE49-F238E27FC236}">
+                <a16:creationId xmlns:a16="http://schemas.microsoft.com/office/drawing/2014/main" id="{73F9BD88-73A1-F9A7-76D6-1F056B3452AF}"/>
+              </a:ext>
+            </a:extLst>
+          </p:cNvPr>
+          <p:cNvSpPr/>
+          <p:nvPr/>
+        </p:nvSpPr>
+        <p:spPr>
+          <a:xfrm>
+            <a:off x="5696465" y="1447612"/>
+            <a:ext cx="222421" cy="4644269"/>
+          </a:xfrm>
+          <a:prstGeom prst="rect">
+            <a:avLst/>
+          </a:prstGeom>
+          <a:solidFill>
+            <a:schemeClr val="bg1"/>
+          </a:solidFill>
+          <a:ln>
+            <a:noFill/>
+          </a:ln>
+        </p:spPr>
+        <p:style>
+          <a:lnRef idx="2">
+            <a:schemeClr val="accent1">
+              <a:shade val="50000"/>
+            </a:schemeClr>
+          </a:lnRef>
+          <a:fillRef idx="1">
+            <a:schemeClr val="accent1"/>
+          </a:fillRef>
+          <a:effectRef idx="0">
+            <a:schemeClr val="accent1"/>
+          </a:effectRef>
+          <a:fontRef idx="minor">
+            <a:schemeClr val="lt1"/>
+          </a:fontRef>
+        </p:style>
+        <p:txBody>
+          <a:bodyPr rtlCol="0" anchor="ctr"/>
+          <a:lstStyle/>
+          <a:p>
+            <a:pPr algn="ctr"/>
+            <a:endParaRPr lang="de-DE"/>
+          </a:p>
+        </p:txBody>
+      </p:sp>
+      <p:sp>
+        <p:nvSpPr>
+          <p:cNvPr id="6" name="Textfeld 5">
+            <a:extLst>
+              <a:ext uri="{FF2B5EF4-FFF2-40B4-BE49-F238E27FC236}">
+                <a16:creationId xmlns:a16="http://schemas.microsoft.com/office/drawing/2014/main" id="{7D5288E0-3991-3ABB-E5A2-9122CB18483E}"/>
+              </a:ext>
+            </a:extLst>
+          </p:cNvPr>
+          <p:cNvSpPr txBox="1"/>
+          <p:nvPr/>
+        </p:nvSpPr>
+        <p:spPr>
+          <a:xfrm>
+            <a:off x="2335427" y="6481688"/>
+            <a:ext cx="2137719" cy="338554"/>
+          </a:xfrm>
+          <a:prstGeom prst="rect">
+            <a:avLst/>
+          </a:prstGeom>
+          <a:noFill/>
+        </p:spPr>
+        <p:txBody>
+          <a:bodyPr wrap="square" rtlCol="0">
+            <a:spAutoFit/>
+          </a:bodyPr>
+          <a:lstStyle/>
+          <a:p>
+            <a:r>
+              <a:rPr lang="de-DE" sz="1600"/>
+              <a:t>Longitude [°E]</a:t>
             </a:r>
           </a:p>
         </p:txBody>
@@ -8280,7 +8723,7 @@
         <p:spPr>
           <a:xfrm>
             <a:off x="560174" y="1215387"/>
-            <a:ext cx="11191102" cy="3416320"/>
+            <a:ext cx="11191102" cy="3693319"/>
           </a:xfrm>
           <a:prstGeom prst="rect">
             <a:avLst/>
@@ -8319,7 +8762,7 @@
             </a:r>
             <a:r>
               <a:rPr lang="de-DE"/>
-              <a:t>, according to szenario to have limitet number of measurements from stations, that are fixed in their location. Fast to train, low ressources required.</a:t>
+              <a:t>, according to szenario to have limited number of measurements from stations, that are fixed in their location. Fast to train, low ressources required. Expect good performance, since ANN always gets the same grid points as inputs.</a:t>
             </a:r>
           </a:p>
           <a:p>
@@ -8611,7 +9054,7 @@
 </file>
 
 <file path=ppt/slides/slide6.xml><?xml version="1.0" encoding="utf-8"?>
-<p:sld xmlns:a="http://schemas.openxmlformats.org/drawingml/2006/main" xmlns:r="http://schemas.openxmlformats.org/officeDocument/2006/relationships" xmlns:p="http://schemas.openxmlformats.org/presentationml/2006/main">
+<p:sld xmlns:a="http://schemas.openxmlformats.org/drawingml/2006/main" xmlns:r="http://schemas.openxmlformats.org/officeDocument/2006/relationships" xmlns:p="http://schemas.openxmlformats.org/presentationml/2006/main" show="0">
   <p:cSld>
     <p:spTree>
       <p:nvGrpSpPr>
@@ -10638,8 +11081,8 @@
           </a:p>
         </p:txBody>
       </p:sp>
-      <mc:AlternateContent xmlns:mc="http://schemas.openxmlformats.org/markup-compatibility/2006" xmlns:a14="http://schemas.microsoft.com/office/drawing/2010/main">
-        <mc:Choice Requires="a14">
+      <mc:AlternateContent xmlns:mc="http://schemas.openxmlformats.org/markup-compatibility/2006">
+        <mc:Choice xmlns:a14="http://schemas.microsoft.com/office/drawing/2010/main" Requires="a14">
           <p:sp>
             <p:nvSpPr>
               <p:cNvPr id="2" name="Textfeld 1">
@@ -10670,7 +11113,7 @@
               <a:p>
                 <a:r>
                   <a:rPr lang="de-DE"/>
-                  <a:t>Need to put the spatial resolution in context to Rossby radius, that determines the length scale for processes within the Ocean and Atmosphere.</a:t>
+                  <a:t>Need to put the spatial resolution in context to Rossby radius, that determines the length scale for rotational processes within the Ocean and Atmosphere.</a:t>
                 </a:r>
               </a:p>
               <a:p>
@@ -10679,7 +11122,7 @@
               <a:p>
                 <a:r>
                   <a:rPr lang="de-DE"/>
-                  <a:t>For atmospheric processes, have R</a:t>
+                  <a:t>For atmospheric processes (cyclones), have R</a:t>
                 </a:r>
                 <a:r>
                   <a:rPr lang="de-DE" baseline="-25000"/>
@@ -10698,13 +11141,7 @@
                 </a14:m>
                 <a:r>
                   <a:rPr lang="de-DE"/>
-                  <a:t>1,000 km, whereas</a:t>
-                </a:r>
-              </a:p>
-              <a:p>
-                <a:r>
-                  <a:rPr lang="de-DE"/>
-                  <a:t>for the Ocean, we find R</a:t>
+                  <a:t>1,000 km, whereas for the Ocean (eddies), we find R</a:t>
                 </a:r>
                 <a:r>
                   <a:rPr lang="de-DE" baseline="-25000"/>
@@ -10741,7 +11178,7 @@
             </p:txBody>
           </p:sp>
         </mc:Choice>
-        <mc:Fallback xmlns="">
+        <mc:Fallback>
           <p:sp>
             <p:nvSpPr>
               <p:cNvPr id="2" name="Textfeld 1">
@@ -10767,7 +11204,7 @@
               <a:blipFill>
                 <a:blip r:embed="rId4"/>
                 <a:stretch>
-                  <a:fillRect l="-907" t="-976" b="-2927"/>
+                  <a:fillRect l="-907" t="-976" r="-680" b="-2927"/>
                 </a:stretch>
               </a:blipFill>
             </p:spPr>
@@ -10800,7 +11237,7 @@
 </file>
 
 <file path=ppt/slides/slide9.xml><?xml version="1.0" encoding="utf-8"?>
-<p:sld xmlns:a="http://schemas.openxmlformats.org/drawingml/2006/main" xmlns:r="http://schemas.openxmlformats.org/officeDocument/2006/relationships" xmlns:p="http://schemas.openxmlformats.org/presentationml/2006/main">
+<p:sld xmlns:a="http://schemas.openxmlformats.org/drawingml/2006/main" xmlns:r="http://schemas.openxmlformats.org/officeDocument/2006/relationships" xmlns:p="http://schemas.openxmlformats.org/presentationml/2006/main" show="0">
   <p:cSld>
     <p:spTree>
       <p:nvGrpSpPr>

</xml_diff>